<commit_message>
Modified 90 min Präsi
ein paar Folien hinzugefügt
</commit_message>
<xml_diff>
--- a/Präsentation-90min/Präsentation-90min.pptx
+++ b/Präsentation-90min/Präsentation-90min.pptx
@@ -5,12 +5,16 @@
     <p:sldMasterId id="2147483660" r:id="rId1"/>
   </p:sldMasterIdLst>
   <p:notesMasterIdLst>
-    <p:notesMasterId r:id="rId5"/>
+    <p:notesMasterId r:id="rId9"/>
   </p:notesMasterIdLst>
   <p:sldIdLst>
     <p:sldId id="270" r:id="rId2"/>
     <p:sldId id="257" r:id="rId3"/>
     <p:sldId id="271" r:id="rId4"/>
+    <p:sldId id="272" r:id="rId5"/>
+    <p:sldId id="273" r:id="rId6"/>
+    <p:sldId id="274" r:id="rId7"/>
+    <p:sldId id="275" r:id="rId8"/>
   </p:sldIdLst>
   <p:sldSz cx="9144000" cy="6858000" type="screen4x3"/>
   <p:notesSz cx="6858000" cy="9144000"/>
@@ -109,7 +113,38 @@
       </a:defRPr>
     </a:lvl9pPr>
   </p:defaultTextStyle>
+  <p:extLst>
+    <p:ext uri="{EFAFB233-063F-42B5-8137-9DF3F51BA10A}">
+      <p15:sldGuideLst xmlns:p15="http://schemas.microsoft.com/office/powerpoint/2012/main"/>
+    </p:ext>
+  </p:extLst>
 </p:presentation>
+</file>
+
+<file path=ppt/commentAuthors.xml><?xml version="1.0" encoding="utf-8"?>
+<p:cmAuthorLst xmlns:a="http://schemas.openxmlformats.org/drawingml/2006/main" xmlns:r="http://schemas.openxmlformats.org/officeDocument/2006/relationships" xmlns:p="http://schemas.openxmlformats.org/presentationml/2006/main">
+  <p:cmAuthor id="1" name="Lennart Kaussen" initials="LK" lastIdx="3" clrIdx="0">
+    <p:extLst>
+      <p:ext uri="{19B8F6BF-5375-455C-9EA6-DF929625EA0E}">
+        <p15:presenceInfo xmlns:p15="http://schemas.microsoft.com/office/powerpoint/2012/main" userId="2e5805316ca2118f" providerId="Windows Live"/>
+      </p:ext>
+    </p:extLst>
+  </p:cmAuthor>
+</p:cmAuthorLst>
+</file>
+
+<file path=ppt/comments/comment1.xml><?xml version="1.0" encoding="utf-8"?>
+<p:cmLst xmlns:a="http://schemas.openxmlformats.org/drawingml/2006/main" xmlns:r="http://schemas.openxmlformats.org/officeDocument/2006/relationships" xmlns:p="http://schemas.openxmlformats.org/presentationml/2006/main">
+  <p:cm authorId="1" dt="2020-03-06T14:13:58.395" idx="3">
+    <p:pos x="1036" y="343"/>
+    <p:text>wie groß soll die abgrenzung zwischen init .git sein?</p:text>
+    <p:extLst>
+      <p:ext uri="{C676402C-5697-4E1C-873F-D02D1690AC5C}">
+        <p15:threadingInfo xmlns:p15="http://schemas.microsoft.com/office/powerpoint/2012/main" timeZoneBias="-60"/>
+      </p:ext>
+    </p:extLst>
+  </p:cm>
+</p:cmLst>
 </file>
 
 <file path=ppt/notesMasters/notesMaster1.xml><?xml version="1.0" encoding="utf-8"?>
@@ -194,7 +229,7 @@
           <a:p>
             <a:fld id="{A1E1CD49-93F9-4EB7-9AB7-31369D3CCD5D}" type="datetimeFigureOut">
               <a:rPr lang="de-DE" smtClean="0"/>
-              <a:t>03.03.2020</a:t>
+              <a:t>06.03.2020</a:t>
             </a:fld>
             <a:endParaRPr lang="de-DE"/>
           </a:p>
@@ -592,7 +627,7 @@
           <a:p>
             <a:fld id="{7CDC51D4-4F8D-402A-BD06-90531D3D0B0E}" type="datetime1">
               <a:rPr lang="de-DE" smtClean="0"/>
-              <a:t>03.03.2020</a:t>
+              <a:t>06.03.2020</a:t>
             </a:fld>
             <a:endParaRPr lang="de-DE"/>
           </a:p>
@@ -762,7 +797,7 @@
           <a:p>
             <a:fld id="{3608FC1D-F958-4804-B298-25E0F93B1193}" type="datetime1">
               <a:rPr lang="de-DE" smtClean="0"/>
-              <a:t>03.03.2020</a:t>
+              <a:t>06.03.2020</a:t>
             </a:fld>
             <a:endParaRPr lang="de-DE"/>
           </a:p>
@@ -942,7 +977,7 @@
           <a:p>
             <a:fld id="{853E26B7-2C61-49BA-838E-19A37BCD9623}" type="datetime1">
               <a:rPr lang="de-DE" smtClean="0"/>
-              <a:t>03.03.2020</a:t>
+              <a:t>06.03.2020</a:t>
             </a:fld>
             <a:endParaRPr lang="de-DE"/>
           </a:p>
@@ -1237,7 +1272,7 @@
             <a:fld id="{6F7941D6-DDCD-4FEB-B76A-6EA7C7E1DF91}" type="datetime1">
               <a:rPr lang="de-DE" smtClean="0"/>
               <a:pPr/>
-              <a:t>03.03.2020</a:t>
+              <a:t>06.03.2020</a:t>
             </a:fld>
             <a:endParaRPr lang="de-DE" dirty="0"/>
           </a:p>
@@ -2012,7 +2047,7 @@
           <a:p>
             <a:fld id="{625025DE-6FE8-4EA0-83A6-6CAFC8B06972}" type="datetime1">
               <a:rPr lang="de-DE" smtClean="0"/>
-              <a:t>03.03.2020</a:t>
+              <a:t>06.03.2020</a:t>
             </a:fld>
             <a:endParaRPr lang="de-DE"/>
           </a:p>
@@ -2379,7 +2414,7 @@
           <a:p>
             <a:fld id="{247D6157-A9C6-4111-84CF-F4ABC9BB74CD}" type="datetime1">
               <a:rPr lang="de-DE" smtClean="0"/>
-              <a:t>03.03.2020</a:t>
+              <a:t>06.03.2020</a:t>
             </a:fld>
             <a:endParaRPr lang="de-DE"/>
           </a:p>
@@ -2497,7 +2532,7 @@
           <a:p>
             <a:fld id="{8EBDA223-4612-4606-8A30-596D72469CD7}" type="datetime1">
               <a:rPr lang="de-DE" smtClean="0"/>
-              <a:t>03.03.2020</a:t>
+              <a:t>06.03.2020</a:t>
             </a:fld>
             <a:endParaRPr lang="de-DE"/>
           </a:p>
@@ -2592,7 +2627,7 @@
           <a:p>
             <a:fld id="{5C800F00-9786-41ED-9D90-88F7ADE0F2B0}" type="datetime1">
               <a:rPr lang="de-DE" smtClean="0"/>
-              <a:t>03.03.2020</a:t>
+              <a:t>06.03.2020</a:t>
             </a:fld>
             <a:endParaRPr lang="de-DE"/>
           </a:p>
@@ -2869,7 +2904,7 @@
           <a:p>
             <a:fld id="{DE94FA33-7DFF-4544-8A2D-E09A4E33D92E}" type="datetime1">
               <a:rPr lang="de-DE" smtClean="0"/>
-              <a:t>03.03.2020</a:t>
+              <a:t>06.03.2020</a:t>
             </a:fld>
             <a:endParaRPr lang="de-DE"/>
           </a:p>
@@ -3126,7 +3161,7 @@
           <a:p>
             <a:fld id="{10F76841-BABD-4AE4-8760-966DF476109C}" type="datetime1">
               <a:rPr lang="de-DE" smtClean="0"/>
-              <a:t>03.03.2020</a:t>
+              <a:t>06.03.2020</a:t>
             </a:fld>
             <a:endParaRPr lang="de-DE"/>
           </a:p>
@@ -3339,7 +3374,7 @@
           <a:p>
             <a:fld id="{34C5C537-7C07-410D-9EF1-F90075952502}" type="datetime1">
               <a:rPr lang="de-DE" smtClean="0"/>
-              <a:t>03.03.2020</a:t>
+              <a:t>06.03.2020</a:t>
             </a:fld>
             <a:endParaRPr lang="de-DE"/>
           </a:p>
@@ -4232,7 +4267,7 @@
           <a:p>
             <a:fld id="{6F7941D6-DDCD-4FEB-B76A-6EA7C7E1DF91}" type="datetime1">
               <a:rPr lang="de-DE" smtClean="0"/>
-              <a:t>03.03.2020</a:t>
+              <a:t>06.03.2020</a:t>
             </a:fld>
             <a:endParaRPr lang="de-DE" dirty="0"/>
           </a:p>
@@ -4643,6 +4678,716 @@
     <p:extLst>
       <p:ext uri="{BB962C8B-B14F-4D97-AF65-F5344CB8AC3E}">
         <p14:creationId xmlns:p14="http://schemas.microsoft.com/office/powerpoint/2010/main" val="4009144003"/>
+      </p:ext>
+    </p:extLst>
+  </p:cSld>
+  <p:clrMapOvr>
+    <a:masterClrMapping/>
+  </p:clrMapOvr>
+</p:sld>
+</file>
+
+<file path=ppt/slides/slide4.xml><?xml version="1.0" encoding="utf-8"?>
+<p:sld xmlns:a="http://schemas.openxmlformats.org/drawingml/2006/main" xmlns:r="http://schemas.openxmlformats.org/officeDocument/2006/relationships" xmlns:p="http://schemas.openxmlformats.org/presentationml/2006/main">
+  <p:cSld>
+    <p:spTree>
+      <p:nvGrpSpPr>
+        <p:cNvPr id="1" name=""/>
+        <p:cNvGrpSpPr/>
+        <p:nvPr/>
+      </p:nvGrpSpPr>
+      <p:grpSpPr>
+        <a:xfrm>
+          <a:off x="0" y="0"/>
+          <a:ext cx="0" cy="0"/>
+          <a:chOff x="0" y="0"/>
+          <a:chExt cx="0" cy="0"/>
+        </a:xfrm>
+      </p:grpSpPr>
+      <p:sp>
+        <p:nvSpPr>
+          <p:cNvPr id="2" name="Inhaltsplatzhalter 1">
+            <a:extLst>
+              <a:ext uri="{FF2B5EF4-FFF2-40B4-BE49-F238E27FC236}">
+                <a16:creationId xmlns:a16="http://schemas.microsoft.com/office/drawing/2014/main" id="{16684379-E404-4E8F-9741-934D7728F904}"/>
+              </a:ext>
+            </a:extLst>
+          </p:cNvPr>
+          <p:cNvSpPr>
+            <a:spLocks noGrp="1"/>
+          </p:cNvSpPr>
+          <p:nvPr>
+            <p:ph idx="13"/>
+          </p:nvPr>
+        </p:nvSpPr>
+        <p:spPr/>
+        <p:txBody>
+          <a:bodyPr/>
+          <a:lstStyle/>
+          <a:p>
+            <a:endParaRPr lang="de-DE"/>
+          </a:p>
+        </p:txBody>
+      </p:sp>
+      <p:sp>
+        <p:nvSpPr>
+          <p:cNvPr id="3" name="Titel 2">
+            <a:extLst>
+              <a:ext uri="{FF2B5EF4-FFF2-40B4-BE49-F238E27FC236}">
+                <a16:creationId xmlns:a16="http://schemas.microsoft.com/office/drawing/2014/main" id="{B6852DF4-67D0-4FB0-BD9E-EF1E8DE7C36A}"/>
+              </a:ext>
+            </a:extLst>
+          </p:cNvPr>
+          <p:cNvSpPr>
+            <a:spLocks noGrp="1"/>
+          </p:cNvSpPr>
+          <p:nvPr>
+            <p:ph type="title" idx="4294967295"/>
+          </p:nvPr>
+        </p:nvSpPr>
+        <p:spPr/>
+        <p:txBody>
+          <a:bodyPr/>
+          <a:lstStyle/>
+          <a:p>
+            <a:r>
+              <a:rPr lang="de-DE" dirty="0"/>
+              <a:t>.</a:t>
+            </a:r>
+            <a:r>
+              <a:rPr lang="de-DE" dirty="0" err="1"/>
+              <a:t>git</a:t>
+            </a:r>
+            <a:endParaRPr lang="de-DE" dirty="0"/>
+          </a:p>
+        </p:txBody>
+      </p:sp>
+    </p:spTree>
+    <p:extLst>
+      <p:ext uri="{BB962C8B-B14F-4D97-AF65-F5344CB8AC3E}">
+        <p14:creationId xmlns:p14="http://schemas.microsoft.com/office/powerpoint/2010/main" val="3965178447"/>
+      </p:ext>
+    </p:extLst>
+  </p:cSld>
+  <p:clrMapOvr>
+    <a:masterClrMapping/>
+  </p:clrMapOvr>
+</p:sld>
+</file>
+
+<file path=ppt/slides/slide5.xml><?xml version="1.0" encoding="utf-8"?>
+<p:sld xmlns:a="http://schemas.openxmlformats.org/drawingml/2006/main" xmlns:r="http://schemas.openxmlformats.org/officeDocument/2006/relationships" xmlns:p="http://schemas.openxmlformats.org/presentationml/2006/main">
+  <p:cSld>
+    <p:spTree>
+      <p:nvGrpSpPr>
+        <p:cNvPr id="1" name=""/>
+        <p:cNvGrpSpPr/>
+        <p:nvPr/>
+      </p:nvGrpSpPr>
+      <p:grpSpPr>
+        <a:xfrm>
+          <a:off x="0" y="0"/>
+          <a:ext cx="0" cy="0"/>
+          <a:chOff x="0" y="0"/>
+          <a:chExt cx="0" cy="0"/>
+        </a:xfrm>
+      </p:grpSpPr>
+      <p:sp>
+        <p:nvSpPr>
+          <p:cNvPr id="2" name="Inhaltsplatzhalter 1">
+            <a:extLst>
+              <a:ext uri="{FF2B5EF4-FFF2-40B4-BE49-F238E27FC236}">
+                <a16:creationId xmlns:a16="http://schemas.microsoft.com/office/drawing/2014/main" id="{E684B207-B778-44AB-85B9-C492BBABE453}"/>
+              </a:ext>
+            </a:extLst>
+          </p:cNvPr>
+          <p:cNvSpPr>
+            <a:spLocks noGrp="1"/>
+          </p:cNvSpPr>
+          <p:nvPr>
+            <p:ph idx="13"/>
+          </p:nvPr>
+        </p:nvSpPr>
+        <p:spPr/>
+        <p:txBody>
+          <a:bodyPr/>
+          <a:lstStyle/>
+          <a:p>
+            <a:r>
+              <a:rPr lang="de-DE" dirty="0"/>
+              <a:t>Ermöglicht Einstellungen am Projektarchiv</a:t>
+            </a:r>
+          </a:p>
+          <a:p>
+            <a:r>
+              <a:rPr lang="de-DE" dirty="0"/>
+              <a:t>Hinterlegung von persönlichen Daten:</a:t>
+            </a:r>
+          </a:p>
+          <a:p>
+            <a:pPr lvl="1"/>
+            <a:r>
+              <a:rPr lang="de-DE" dirty="0"/>
+              <a:t>Name: </a:t>
+            </a:r>
+            <a:r>
+              <a:rPr lang="en-US" b="1" i="1" dirty="0"/>
+              <a:t>git config --global user.name "&lt;Name&gt;"</a:t>
+            </a:r>
+          </a:p>
+          <a:p>
+            <a:pPr lvl="1"/>
+            <a:r>
+              <a:rPr lang="en-US" dirty="0"/>
+              <a:t>E-Mail: </a:t>
+            </a:r>
+            <a:r>
+              <a:rPr lang="en-US" b="1" i="1" dirty="0"/>
+              <a:t>git config --global </a:t>
+            </a:r>
+            <a:r>
+              <a:rPr lang="en-US" b="1" i="1" dirty="0" err="1"/>
+              <a:t>user.email</a:t>
+            </a:r>
+            <a:r>
+              <a:rPr lang="en-US" b="1" i="1" dirty="0"/>
+              <a:t> "&lt;E-Mail&gt;“</a:t>
+            </a:r>
+          </a:p>
+          <a:p>
+            <a:r>
+              <a:rPr lang="de-DE" dirty="0"/>
+              <a:t>Einstellung auch innerhalb der Datei möglich:</a:t>
+            </a:r>
+          </a:p>
+          <a:p>
+            <a:pPr lvl="1"/>
+            <a:r>
+              <a:rPr lang="de-DE" b="1" i="1" dirty="0" err="1"/>
+              <a:t>git</a:t>
+            </a:r>
+            <a:r>
+              <a:rPr lang="de-DE" b="1" i="1" dirty="0"/>
+              <a:t> </a:t>
+            </a:r>
+            <a:r>
+              <a:rPr lang="de-DE" b="1" i="1" dirty="0" err="1"/>
+              <a:t>config</a:t>
+            </a:r>
+            <a:r>
+              <a:rPr lang="de-DE" b="1" i="1" dirty="0"/>
+              <a:t> --global –</a:t>
+            </a:r>
+            <a:r>
+              <a:rPr lang="de-DE" b="1" i="1" dirty="0" err="1"/>
+              <a:t>edit</a:t>
+            </a:r>
+            <a:endParaRPr lang="de-DE" b="1" i="1" dirty="0"/>
+          </a:p>
+          <a:p>
+            <a:r>
+              <a:rPr lang="de-DE" dirty="0"/>
+              <a:t>Alias für Befehle angeben:</a:t>
+            </a:r>
+          </a:p>
+          <a:p>
+            <a:pPr lvl="1"/>
+            <a:r>
+              <a:rPr lang="de-DE" b="1" i="1" dirty="0" err="1"/>
+              <a:t>git</a:t>
+            </a:r>
+            <a:r>
+              <a:rPr lang="de-DE" b="1" i="1" dirty="0"/>
+              <a:t> </a:t>
+            </a:r>
+            <a:r>
+              <a:rPr lang="de-DE" b="1" i="1" dirty="0" err="1"/>
+              <a:t>config</a:t>
+            </a:r>
+            <a:r>
+              <a:rPr lang="de-DE" b="1" i="1" dirty="0"/>
+              <a:t> alias.</a:t>
+            </a:r>
+            <a:r>
+              <a:rPr lang="en-US" b="1" i="1" dirty="0"/>
+              <a:t> "</a:t>
+            </a:r>
+            <a:r>
+              <a:rPr lang="de-DE" b="1" i="1" dirty="0"/>
+              <a:t>&lt;Alias Name&gt;</a:t>
+            </a:r>
+            <a:r>
+              <a:rPr lang="en-US" b="1" i="1" dirty="0"/>
+              <a:t>"</a:t>
+            </a:r>
+            <a:r>
+              <a:rPr lang="de-DE" b="1" i="1" dirty="0"/>
+              <a:t> </a:t>
+            </a:r>
+            <a:r>
+              <a:rPr lang="en-US" b="1" i="1" dirty="0"/>
+              <a:t>"</a:t>
+            </a:r>
+            <a:r>
+              <a:rPr lang="de-DE" b="1" i="1" dirty="0"/>
+              <a:t>&lt;</a:t>
+            </a:r>
+            <a:r>
+              <a:rPr lang="de-DE" b="1" i="1" dirty="0" err="1"/>
+              <a:t>Git</a:t>
+            </a:r>
+            <a:r>
+              <a:rPr lang="de-DE" b="1" i="1" dirty="0"/>
+              <a:t> Kommando&gt;</a:t>
+            </a:r>
+            <a:r>
+              <a:rPr lang="en-US" b="1" i="1" dirty="0"/>
+              <a:t>"</a:t>
+            </a:r>
+            <a:endParaRPr lang="de-DE" b="1" i="1" dirty="0"/>
+          </a:p>
+          <a:p>
+            <a:r>
+              <a:rPr lang="de-DE" dirty="0"/>
+              <a:t>Einstellungen </a:t>
+            </a:r>
+            <a:r>
+              <a:rPr lang="de-DE" dirty="0" err="1"/>
+              <a:t>einshehen</a:t>
+            </a:r>
+            <a:r>
+              <a:rPr lang="de-DE" dirty="0"/>
+              <a:t>:</a:t>
+            </a:r>
+          </a:p>
+          <a:p>
+            <a:pPr lvl="1"/>
+            <a:r>
+              <a:rPr lang="de-DE" b="1" i="1" dirty="0" err="1"/>
+              <a:t>git</a:t>
+            </a:r>
+            <a:r>
+              <a:rPr lang="de-DE" b="1" i="1" dirty="0"/>
+              <a:t> </a:t>
+            </a:r>
+            <a:r>
+              <a:rPr lang="de-DE" b="1" i="1" dirty="0" err="1"/>
+              <a:t>config</a:t>
+            </a:r>
+            <a:r>
+              <a:rPr lang="de-DE" b="1" i="1" dirty="0"/>
+              <a:t> –</a:t>
+            </a:r>
+            <a:r>
+              <a:rPr lang="de-DE" b="1" i="1" dirty="0" err="1"/>
+              <a:t>list</a:t>
+            </a:r>
+            <a:endParaRPr lang="de-DE" b="1" i="1" dirty="0"/>
+          </a:p>
+        </p:txBody>
+      </p:sp>
+      <p:sp>
+        <p:nvSpPr>
+          <p:cNvPr id="3" name="Titel 2">
+            <a:extLst>
+              <a:ext uri="{FF2B5EF4-FFF2-40B4-BE49-F238E27FC236}">
+                <a16:creationId xmlns:a16="http://schemas.microsoft.com/office/drawing/2014/main" id="{7C2C9F7D-80F5-4EED-9D00-DE6431CB7CDC}"/>
+              </a:ext>
+            </a:extLst>
+          </p:cNvPr>
+          <p:cNvSpPr>
+            <a:spLocks noGrp="1"/>
+          </p:cNvSpPr>
+          <p:nvPr>
+            <p:ph type="title" idx="4294967295"/>
+          </p:nvPr>
+        </p:nvSpPr>
+        <p:spPr/>
+        <p:txBody>
+          <a:bodyPr/>
+          <a:lstStyle/>
+          <a:p>
+            <a:r>
+              <a:rPr lang="de-DE" dirty="0" err="1"/>
+              <a:t>Config</a:t>
+            </a:r>
+            <a:r>
+              <a:rPr lang="de-DE" dirty="0"/>
+              <a:t> / </a:t>
+            </a:r>
+            <a:r>
+              <a:rPr lang="de-DE" dirty="0" err="1"/>
+              <a:t>gitignore</a:t>
+            </a:r>
+            <a:endParaRPr lang="de-DE" dirty="0"/>
+          </a:p>
+        </p:txBody>
+      </p:sp>
+      <p:pic>
+        <p:nvPicPr>
+          <p:cNvPr id="4" name="Grafik 3">
+            <a:extLst>
+              <a:ext uri="{FF2B5EF4-FFF2-40B4-BE49-F238E27FC236}">
+                <a16:creationId xmlns:a16="http://schemas.microsoft.com/office/drawing/2014/main" id="{180575CE-AC59-4766-921C-12BFF5D18F7E}"/>
+              </a:ext>
+            </a:extLst>
+          </p:cNvPr>
+          <p:cNvPicPr>
+            <a:picLocks noChangeAspect="1"/>
+          </p:cNvPicPr>
+          <p:nvPr/>
+        </p:nvPicPr>
+        <p:blipFill>
+          <a:blip r:embed="rId2"/>
+          <a:stretch>
+            <a:fillRect/>
+          </a:stretch>
+        </p:blipFill>
+        <p:spPr>
+          <a:xfrm>
+            <a:off x="2794952" y="4818093"/>
+            <a:ext cx="4292328" cy="1153515"/>
+          </a:xfrm>
+          <a:prstGeom prst="rect">
+            <a:avLst/>
+          </a:prstGeom>
+        </p:spPr>
+      </p:pic>
+    </p:spTree>
+    <p:extLst>
+      <p:ext uri="{BB962C8B-B14F-4D97-AF65-F5344CB8AC3E}">
+        <p14:creationId xmlns:p14="http://schemas.microsoft.com/office/powerpoint/2010/main" val="3496437379"/>
+      </p:ext>
+    </p:extLst>
+  </p:cSld>
+  <p:clrMapOvr>
+    <a:masterClrMapping/>
+  </p:clrMapOvr>
+</p:sld>
+</file>
+
+<file path=ppt/slides/slide6.xml><?xml version="1.0" encoding="utf-8"?>
+<p:sld xmlns:a="http://schemas.openxmlformats.org/drawingml/2006/main" xmlns:r="http://schemas.openxmlformats.org/officeDocument/2006/relationships" xmlns:p="http://schemas.openxmlformats.org/presentationml/2006/main">
+  <p:cSld>
+    <p:spTree>
+      <p:nvGrpSpPr>
+        <p:cNvPr id="1" name=""/>
+        <p:cNvGrpSpPr/>
+        <p:nvPr/>
+      </p:nvGrpSpPr>
+      <p:grpSpPr>
+        <a:xfrm>
+          <a:off x="0" y="0"/>
+          <a:ext cx="0" cy="0"/>
+          <a:chOff x="0" y="0"/>
+          <a:chExt cx="0" cy="0"/>
+        </a:xfrm>
+      </p:grpSpPr>
+      <p:sp>
+        <p:nvSpPr>
+          <p:cNvPr id="2" name="Inhaltsplatzhalter 1">
+            <a:extLst>
+              <a:ext uri="{FF2B5EF4-FFF2-40B4-BE49-F238E27FC236}">
+                <a16:creationId xmlns:a16="http://schemas.microsoft.com/office/drawing/2014/main" id="{7B063AF5-4A8A-4315-88D3-75A5DCAA9E56}"/>
+              </a:ext>
+            </a:extLst>
+          </p:cNvPr>
+          <p:cNvSpPr>
+            <a:spLocks noGrp="1"/>
+          </p:cNvSpPr>
+          <p:nvPr>
+            <p:ph idx="13"/>
+          </p:nvPr>
+        </p:nvSpPr>
+        <p:spPr/>
+        <p:txBody>
+          <a:bodyPr/>
+          <a:lstStyle/>
+          <a:p>
+            <a:r>
+              <a:rPr lang="de-DE" dirty="0"/>
+              <a:t>Ermöglicht Ausblendung von Dateien, die nicht versioniert werden sollen</a:t>
+            </a:r>
+          </a:p>
+          <a:p>
+            <a:r>
+              <a:rPr lang="de-DE" dirty="0"/>
+              <a:t>Diese Dateien werden in .</a:t>
+            </a:r>
+            <a:r>
+              <a:rPr lang="de-DE" dirty="0" err="1"/>
+              <a:t>gitignore</a:t>
+            </a:r>
+            <a:r>
+              <a:rPr lang="de-DE" dirty="0"/>
+              <a:t> zeilenweise angegeben</a:t>
+            </a:r>
+          </a:p>
+          <a:p>
+            <a:endParaRPr lang="de-DE" dirty="0"/>
+          </a:p>
+          <a:p>
+            <a:endParaRPr lang="de-DE" dirty="0"/>
+          </a:p>
+          <a:p>
+            <a:endParaRPr lang="de-DE" dirty="0"/>
+          </a:p>
+          <a:p>
+            <a:r>
+              <a:rPr lang="de-DE" dirty="0"/>
+              <a:t>In der Abbildungen werden </a:t>
+            </a:r>
+          </a:p>
+          <a:p>
+            <a:pPr lvl="1"/>
+            <a:r>
+              <a:rPr lang="de-DE" dirty="0" err="1"/>
+              <a:t>object</a:t>
+            </a:r>
+            <a:r>
+              <a:rPr lang="de-DE" dirty="0"/>
+              <a:t>-Dateien</a:t>
+            </a:r>
+          </a:p>
+          <a:p>
+            <a:pPr lvl="1"/>
+            <a:r>
+              <a:rPr lang="de-DE" dirty="0"/>
+              <a:t>Dateien, welche mit einer Tilde enden</a:t>
+            </a:r>
+          </a:p>
+          <a:p>
+            <a:pPr lvl="1"/>
+            <a:r>
+              <a:rPr lang="de-DE" dirty="0"/>
+              <a:t>Programm </a:t>
+            </a:r>
+            <a:r>
+              <a:rPr lang="de-DE" dirty="0" err="1"/>
+              <a:t>geo</a:t>
+            </a:r>
+            <a:endParaRPr lang="de-DE" dirty="0"/>
+          </a:p>
+          <a:p>
+            <a:r>
+              <a:rPr lang="de-DE" dirty="0"/>
+              <a:t>Ausgeblendet</a:t>
+            </a:r>
+          </a:p>
+          <a:p>
+            <a:endParaRPr lang="de-DE" dirty="0"/>
+          </a:p>
+          <a:p>
+            <a:pPr lvl="1"/>
+            <a:endParaRPr lang="de-DE" dirty="0"/>
+          </a:p>
+          <a:p>
+            <a:endParaRPr lang="de-DE" dirty="0"/>
+          </a:p>
+        </p:txBody>
+      </p:sp>
+      <p:sp>
+        <p:nvSpPr>
+          <p:cNvPr id="3" name="Titel 2">
+            <a:extLst>
+              <a:ext uri="{FF2B5EF4-FFF2-40B4-BE49-F238E27FC236}">
+                <a16:creationId xmlns:a16="http://schemas.microsoft.com/office/drawing/2014/main" id="{E674E382-A7F7-4C5E-BE6B-589CB0EB1416}"/>
+              </a:ext>
+            </a:extLst>
+          </p:cNvPr>
+          <p:cNvSpPr>
+            <a:spLocks noGrp="1"/>
+          </p:cNvSpPr>
+          <p:nvPr>
+            <p:ph type="title" idx="4294967295"/>
+          </p:nvPr>
+        </p:nvSpPr>
+        <p:spPr/>
+        <p:txBody>
+          <a:bodyPr/>
+          <a:lstStyle/>
+          <a:p>
+            <a:r>
+              <a:rPr lang="de-DE" dirty="0"/>
+              <a:t>Datei .</a:t>
+            </a:r>
+            <a:r>
+              <a:rPr lang="de-DE" dirty="0" err="1"/>
+              <a:t>gitignore</a:t>
+            </a:r>
+            <a:endParaRPr lang="de-DE" dirty="0"/>
+          </a:p>
+        </p:txBody>
+      </p:sp>
+      <p:pic>
+        <p:nvPicPr>
+          <p:cNvPr id="4" name="Grafik 3">
+            <a:extLst>
+              <a:ext uri="{FF2B5EF4-FFF2-40B4-BE49-F238E27FC236}">
+                <a16:creationId xmlns:a16="http://schemas.microsoft.com/office/drawing/2014/main" id="{072B0763-9D56-4398-A550-F74A18EBFF78}"/>
+              </a:ext>
+            </a:extLst>
+          </p:cNvPr>
+          <p:cNvPicPr>
+            <a:picLocks noChangeAspect="1"/>
+          </p:cNvPicPr>
+          <p:nvPr/>
+        </p:nvPicPr>
+        <p:blipFill>
+          <a:blip r:embed="rId2"/>
+          <a:stretch>
+            <a:fillRect/>
+          </a:stretch>
+        </p:blipFill>
+        <p:spPr>
+          <a:xfrm>
+            <a:off x="2837479" y="2704474"/>
+            <a:ext cx="3469042" cy="632247"/>
+          </a:xfrm>
+          <a:prstGeom prst="rect">
+            <a:avLst/>
+          </a:prstGeom>
+        </p:spPr>
+      </p:pic>
+      <p:sp>
+        <p:nvSpPr>
+          <p:cNvPr id="5" name="Rechteck 4">
+            <a:extLst>
+              <a:ext uri="{FF2B5EF4-FFF2-40B4-BE49-F238E27FC236}">
+                <a16:creationId xmlns:a16="http://schemas.microsoft.com/office/drawing/2014/main" id="{3DF4D30B-2839-438B-93BE-1476A4B0C745}"/>
+              </a:ext>
+            </a:extLst>
+          </p:cNvPr>
+          <p:cNvSpPr/>
+          <p:nvPr/>
+        </p:nvSpPr>
+        <p:spPr>
+          <a:xfrm>
+            <a:off x="722415" y="4731390"/>
+            <a:ext cx="578841" cy="444617"/>
+          </a:xfrm>
+          <a:prstGeom prst="rect">
+            <a:avLst/>
+          </a:prstGeom>
+          <a:solidFill>
+            <a:schemeClr val="bg1"/>
+          </a:solidFill>
+          <a:ln>
+            <a:noFill/>
+          </a:ln>
+        </p:spPr>
+        <p:style>
+          <a:lnRef idx="2">
+            <a:schemeClr val="accent1">
+              <a:shade val="50000"/>
+            </a:schemeClr>
+          </a:lnRef>
+          <a:fillRef idx="1">
+            <a:schemeClr val="accent1"/>
+          </a:fillRef>
+          <a:effectRef idx="0">
+            <a:schemeClr val="accent1"/>
+          </a:effectRef>
+          <a:fontRef idx="minor">
+            <a:schemeClr val="lt1"/>
+          </a:fontRef>
+        </p:style>
+        <p:txBody>
+          <a:bodyPr rtlCol="0" anchor="ctr"/>
+          <a:lstStyle/>
+          <a:p>
+            <a:pPr algn="ctr"/>
+            <a:endParaRPr lang="de-DE"/>
+          </a:p>
+        </p:txBody>
+      </p:sp>
+    </p:spTree>
+    <p:extLst>
+      <p:ext uri="{BB962C8B-B14F-4D97-AF65-F5344CB8AC3E}">
+        <p14:creationId xmlns:p14="http://schemas.microsoft.com/office/powerpoint/2010/main" val="2492536315"/>
+      </p:ext>
+    </p:extLst>
+  </p:cSld>
+  <p:clrMapOvr>
+    <a:masterClrMapping/>
+  </p:clrMapOvr>
+</p:sld>
+</file>
+
+<file path=ppt/slides/slide7.xml><?xml version="1.0" encoding="utf-8"?>
+<p:sld xmlns:a="http://schemas.openxmlformats.org/drawingml/2006/main" xmlns:r="http://schemas.openxmlformats.org/officeDocument/2006/relationships" xmlns:p="http://schemas.openxmlformats.org/presentationml/2006/main">
+  <p:cSld>
+    <p:spTree>
+      <p:nvGrpSpPr>
+        <p:cNvPr id="1" name=""/>
+        <p:cNvGrpSpPr/>
+        <p:nvPr/>
+      </p:nvGrpSpPr>
+      <p:grpSpPr>
+        <a:xfrm>
+          <a:off x="0" y="0"/>
+          <a:ext cx="0" cy="0"/>
+          <a:chOff x="0" y="0"/>
+          <a:chExt cx="0" cy="0"/>
+        </a:xfrm>
+      </p:grpSpPr>
+      <p:sp>
+        <p:nvSpPr>
+          <p:cNvPr id="2" name="Inhaltsplatzhalter 1">
+            <a:extLst>
+              <a:ext uri="{FF2B5EF4-FFF2-40B4-BE49-F238E27FC236}">
+                <a16:creationId xmlns:a16="http://schemas.microsoft.com/office/drawing/2014/main" id="{14481AD2-FFD5-43C0-9E6D-FE125D0E6632}"/>
+              </a:ext>
+            </a:extLst>
+          </p:cNvPr>
+          <p:cNvSpPr>
+            <a:spLocks noGrp="1"/>
+          </p:cNvSpPr>
+          <p:nvPr>
+            <p:ph idx="13"/>
+          </p:nvPr>
+        </p:nvSpPr>
+        <p:spPr/>
+        <p:txBody>
+          <a:bodyPr/>
+          <a:lstStyle/>
+          <a:p>
+            <a:endParaRPr lang="de-DE" dirty="0"/>
+          </a:p>
+        </p:txBody>
+      </p:sp>
+      <p:sp>
+        <p:nvSpPr>
+          <p:cNvPr id="3" name="Titel 2">
+            <a:extLst>
+              <a:ext uri="{FF2B5EF4-FFF2-40B4-BE49-F238E27FC236}">
+                <a16:creationId xmlns:a16="http://schemas.microsoft.com/office/drawing/2014/main" id="{86A5B1D2-4489-46B6-BA0B-18E4C8627EA8}"/>
+              </a:ext>
+            </a:extLst>
+          </p:cNvPr>
+          <p:cNvSpPr>
+            <a:spLocks noGrp="1"/>
+          </p:cNvSpPr>
+          <p:nvPr>
+            <p:ph type="title" idx="4294967295"/>
+          </p:nvPr>
+        </p:nvSpPr>
+        <p:spPr/>
+        <p:txBody>
+          <a:bodyPr/>
+          <a:lstStyle/>
+          <a:p>
+            <a:r>
+              <a:rPr lang="de-DE" dirty="0"/>
+              <a:t>Index</a:t>
+            </a:r>
+          </a:p>
+        </p:txBody>
+      </p:sp>
+    </p:spTree>
+    <p:extLst>
+      <p:ext uri="{BB962C8B-B14F-4D97-AF65-F5344CB8AC3E}">
+        <p14:creationId xmlns:p14="http://schemas.microsoft.com/office/powerpoint/2010/main" val="2123715963"/>
       </p:ext>
     </p:extLst>
   </p:cSld>

</xml_diff>

<commit_message>
Modified 90 min Präsi / deleted Änderungsdatei doku
</commit_message>
<xml_diff>
--- a/Präsentation-90min/Präsentation-90min.pptx
+++ b/Präsentation-90min/Präsentation-90min.pptx
@@ -5,16 +5,47 @@
     <p:sldMasterId id="2147483660" r:id="rId1"/>
   </p:sldMasterIdLst>
   <p:notesMasterIdLst>
-    <p:notesMasterId r:id="rId9"/>
+    <p:notesMasterId r:id="rId40"/>
   </p:notesMasterIdLst>
   <p:sldIdLst>
-    <p:sldId id="270" r:id="rId2"/>
-    <p:sldId id="257" r:id="rId3"/>
+    <p:sldId id="257" r:id="rId2"/>
+    <p:sldId id="270" r:id="rId3"/>
     <p:sldId id="271" r:id="rId4"/>
     <p:sldId id="272" r:id="rId5"/>
     <p:sldId id="273" r:id="rId6"/>
     <p:sldId id="274" r:id="rId7"/>
     <p:sldId id="275" r:id="rId8"/>
+    <p:sldId id="277" r:id="rId9"/>
+    <p:sldId id="276" r:id="rId10"/>
+    <p:sldId id="278" r:id="rId11"/>
+    <p:sldId id="279" r:id="rId12"/>
+    <p:sldId id="280" r:id="rId13"/>
+    <p:sldId id="281" r:id="rId14"/>
+    <p:sldId id="282" r:id="rId15"/>
+    <p:sldId id="283" r:id="rId16"/>
+    <p:sldId id="284" r:id="rId17"/>
+    <p:sldId id="285" r:id="rId18"/>
+    <p:sldId id="286" r:id="rId19"/>
+    <p:sldId id="287" r:id="rId20"/>
+    <p:sldId id="288" r:id="rId21"/>
+    <p:sldId id="289" r:id="rId22"/>
+    <p:sldId id="290" r:id="rId23"/>
+    <p:sldId id="291" r:id="rId24"/>
+    <p:sldId id="293" r:id="rId25"/>
+    <p:sldId id="292" r:id="rId26"/>
+    <p:sldId id="295" r:id="rId27"/>
+    <p:sldId id="297" r:id="rId28"/>
+    <p:sldId id="298" r:id="rId29"/>
+    <p:sldId id="299" r:id="rId30"/>
+    <p:sldId id="300" r:id="rId31"/>
+    <p:sldId id="301" r:id="rId32"/>
+    <p:sldId id="303" r:id="rId33"/>
+    <p:sldId id="302" r:id="rId34"/>
+    <p:sldId id="304" r:id="rId35"/>
+    <p:sldId id="305" r:id="rId36"/>
+    <p:sldId id="306" r:id="rId37"/>
+    <p:sldId id="308" r:id="rId38"/>
+    <p:sldId id="307" r:id="rId39"/>
   </p:sldIdLst>
   <p:sldSz cx="9144000" cy="6858000" type="screen4x3"/>
   <p:notesSz cx="6858000" cy="9144000"/>
@@ -229,7 +260,7 @@
           <a:p>
             <a:fld id="{A1E1CD49-93F9-4EB7-9AB7-31369D3CCD5D}" type="datetimeFigureOut">
               <a:rPr lang="de-DE" smtClean="0"/>
-              <a:t>06.03.2020</a:t>
+              <a:t>07.03.2020</a:t>
             </a:fld>
             <a:endParaRPr lang="de-DE"/>
           </a:p>
@@ -627,7 +658,7 @@
           <a:p>
             <a:fld id="{7CDC51D4-4F8D-402A-BD06-90531D3D0B0E}" type="datetime1">
               <a:rPr lang="de-DE" smtClean="0"/>
-              <a:t>06.03.2020</a:t>
+              <a:t>07.03.2020</a:t>
             </a:fld>
             <a:endParaRPr lang="de-DE"/>
           </a:p>
@@ -797,7 +828,7 @@
           <a:p>
             <a:fld id="{3608FC1D-F958-4804-B298-25E0F93B1193}" type="datetime1">
               <a:rPr lang="de-DE" smtClean="0"/>
-              <a:t>06.03.2020</a:t>
+              <a:t>07.03.2020</a:t>
             </a:fld>
             <a:endParaRPr lang="de-DE"/>
           </a:p>
@@ -977,7 +1008,7 @@
           <a:p>
             <a:fld id="{853E26B7-2C61-49BA-838E-19A37BCD9623}" type="datetime1">
               <a:rPr lang="de-DE" smtClean="0"/>
-              <a:t>06.03.2020</a:t>
+              <a:t>07.03.2020</a:t>
             </a:fld>
             <a:endParaRPr lang="de-DE"/>
           </a:p>
@@ -1272,7 +1303,7 @@
             <a:fld id="{6F7941D6-DDCD-4FEB-B76A-6EA7C7E1DF91}" type="datetime1">
               <a:rPr lang="de-DE" smtClean="0"/>
               <a:pPr/>
-              <a:t>06.03.2020</a:t>
+              <a:t>07.03.2020</a:t>
             </a:fld>
             <a:endParaRPr lang="de-DE" dirty="0"/>
           </a:p>
@@ -1402,10 +1433,9 @@
           </a:lstStyle>
           <a:p>
             <a:r>
-              <a:rPr lang="de-DE"/>
+              <a:rPr lang="de-DE" dirty="0"/>
               <a:t>Git Tutorial</a:t>
             </a:r>
-            <a:endParaRPr lang="de-DE" dirty="0"/>
           </a:p>
         </p:txBody>
       </p:sp>
@@ -1747,38 +1777,6 @@
           </a:prstGeom>
         </p:spPr>
       </p:pic>
-      <p:sp>
-        <p:nvSpPr>
-          <p:cNvPr id="8" name="Textfeld 7">
-            <a:extLst>
-              <a:ext uri="{FF2B5EF4-FFF2-40B4-BE49-F238E27FC236}">
-                <a16:creationId xmlns:a16="http://schemas.microsoft.com/office/drawing/2014/main" id="{61BBD87B-DE29-4548-9905-E69EBF5F82C4}"/>
-              </a:ext>
-            </a:extLst>
-          </p:cNvPr>
-          <p:cNvSpPr txBox="1"/>
-          <p:nvPr userDrawn="1"/>
-        </p:nvSpPr>
-        <p:spPr>
-          <a:xfrm>
-            <a:off x="1099455" y="2708371"/>
-            <a:ext cx="5869577" cy="492443"/>
-          </a:xfrm>
-          <a:prstGeom prst="rect">
-            <a:avLst/>
-          </a:prstGeom>
-          <a:noFill/>
-        </p:spPr>
-        <p:txBody>
-          <a:bodyPr wrap="square" rtlCol="0">
-            <a:spAutoFit/>
-          </a:bodyPr>
-          <a:lstStyle/>
-          <a:p>
-            <a:endParaRPr lang="de-DE" sz="2600" dirty="0"/>
-          </a:p>
-        </p:txBody>
-      </p:sp>
       <p:cxnSp>
         <p:nvCxnSpPr>
           <p:cNvPr id="9" name="Gerader Verbinder 8">
@@ -1863,6 +1861,48 @@
           </a:fontRef>
         </p:style>
       </p:cxnSp>
+      <p:sp>
+        <p:nvSpPr>
+          <p:cNvPr id="12" name="Titel 11">
+            <a:extLst>
+              <a:ext uri="{FF2B5EF4-FFF2-40B4-BE49-F238E27FC236}">
+                <a16:creationId xmlns:a16="http://schemas.microsoft.com/office/drawing/2014/main" id="{62FE974D-81CC-4F03-8BF9-50F6A6D3CC2F}"/>
+              </a:ext>
+            </a:extLst>
+          </p:cNvPr>
+          <p:cNvSpPr>
+            <a:spLocks noGrp="1"/>
+          </p:cNvSpPr>
+          <p:nvPr>
+            <p:ph type="title"/>
+          </p:nvPr>
+        </p:nvSpPr>
+        <p:spPr>
+          <a:xfrm>
+            <a:off x="1100138" y="2708276"/>
+            <a:ext cx="5868987" cy="492124"/>
+          </a:xfrm>
+        </p:spPr>
+        <p:txBody>
+          <a:bodyPr>
+            <a:normAutofit/>
+          </a:bodyPr>
+          <a:lstStyle>
+            <a:lvl1pPr>
+              <a:defRPr sz="2600">
+                <a:latin typeface="Arial" panose="020B0604020202020204" pitchFamily="34" charset="0"/>
+                <a:cs typeface="Arial" panose="020B0604020202020204" pitchFamily="34" charset="0"/>
+              </a:defRPr>
+            </a:lvl1pPr>
+          </a:lstStyle>
+          <a:p>
+            <a:r>
+              <a:rPr lang="de-DE" dirty="0"/>
+              <a:t>Mastertitelformat bearbeiten</a:t>
+            </a:r>
+          </a:p>
+        </p:txBody>
+      </p:sp>
     </p:spTree>
     <p:extLst>
       <p:ext uri="{BB962C8B-B14F-4D97-AF65-F5344CB8AC3E}">
@@ -1909,7 +1949,7 @@
           <a:lstStyle/>
           <a:p>
             <a:r>
-              <a:rPr lang="de-DE"/>
+              <a:rPr lang="de-DE" dirty="0"/>
               <a:t>Mastertitelformat bearbeiten</a:t>
             </a:r>
             <a:endParaRPr lang="en-US" dirty="0"/>
@@ -2047,7 +2087,7 @@
           <a:p>
             <a:fld id="{625025DE-6FE8-4EA0-83A6-6CAFC8B06972}" type="datetime1">
               <a:rPr lang="de-DE" smtClean="0"/>
-              <a:t>06.03.2020</a:t>
+              <a:t>07.03.2020</a:t>
             </a:fld>
             <a:endParaRPr lang="de-DE"/>
           </a:p>
@@ -2414,7 +2454,7 @@
           <a:p>
             <a:fld id="{247D6157-A9C6-4111-84CF-F4ABC9BB74CD}" type="datetime1">
               <a:rPr lang="de-DE" smtClean="0"/>
-              <a:t>06.03.2020</a:t>
+              <a:t>07.03.2020</a:t>
             </a:fld>
             <a:endParaRPr lang="de-DE"/>
           </a:p>
@@ -2532,7 +2572,7 @@
           <a:p>
             <a:fld id="{8EBDA223-4612-4606-8A30-596D72469CD7}" type="datetime1">
               <a:rPr lang="de-DE" smtClean="0"/>
-              <a:t>06.03.2020</a:t>
+              <a:t>07.03.2020</a:t>
             </a:fld>
             <a:endParaRPr lang="de-DE"/>
           </a:p>
@@ -2627,7 +2667,7 @@
           <a:p>
             <a:fld id="{5C800F00-9786-41ED-9D90-88F7ADE0F2B0}" type="datetime1">
               <a:rPr lang="de-DE" smtClean="0"/>
-              <a:t>06.03.2020</a:t>
+              <a:t>07.03.2020</a:t>
             </a:fld>
             <a:endParaRPr lang="de-DE"/>
           </a:p>
@@ -2904,7 +2944,7 @@
           <a:p>
             <a:fld id="{DE94FA33-7DFF-4544-8A2D-E09A4E33D92E}" type="datetime1">
               <a:rPr lang="de-DE" smtClean="0"/>
-              <a:t>06.03.2020</a:t>
+              <a:t>07.03.2020</a:t>
             </a:fld>
             <a:endParaRPr lang="de-DE"/>
           </a:p>
@@ -3161,7 +3201,7 @@
           <a:p>
             <a:fld id="{10F76841-BABD-4AE4-8760-966DF476109C}" type="datetime1">
               <a:rPr lang="de-DE" smtClean="0"/>
-              <a:t>06.03.2020</a:t>
+              <a:t>07.03.2020</a:t>
             </a:fld>
             <a:endParaRPr lang="de-DE"/>
           </a:p>
@@ -3374,7 +3414,7 @@
           <a:p>
             <a:fld id="{34C5C537-7C07-410D-9EF1-F90075952502}" type="datetime1">
               <a:rPr lang="de-DE" smtClean="0"/>
-              <a:t>06.03.2020</a:t>
+              <a:t>07.03.2020</a:t>
             </a:fld>
             <a:endParaRPr lang="de-DE"/>
           </a:p>
@@ -3782,6 +3822,1444 @@
           <a:chExt cx="0" cy="0"/>
         </a:xfrm>
       </p:grpSpPr>
+      <p:sp>
+        <p:nvSpPr>
+          <p:cNvPr id="3" name="Inhaltsplatzhalter 2">
+            <a:extLst>
+              <a:ext uri="{FF2B5EF4-FFF2-40B4-BE49-F238E27FC236}">
+                <a16:creationId xmlns:a16="http://schemas.microsoft.com/office/drawing/2014/main" id="{BA550CEE-E433-4CF3-98B1-3DF82889D543}"/>
+              </a:ext>
+            </a:extLst>
+          </p:cNvPr>
+          <p:cNvSpPr>
+            <a:spLocks noGrp="1"/>
+          </p:cNvSpPr>
+          <p:nvPr>
+            <p:ph idx="13"/>
+          </p:nvPr>
+        </p:nvSpPr>
+        <p:spPr/>
+        <p:txBody>
+          <a:bodyPr>
+            <a:normAutofit/>
+          </a:bodyPr>
+          <a:lstStyle/>
+          <a:p>
+            <a:r>
+              <a:rPr lang="de-DE" sz="2000" dirty="0">
+                <a:latin typeface="Arial" panose="020B0604020202020204" pitchFamily="34" charset="0"/>
+                <a:cs typeface="Arial" panose="020B0604020202020204" pitchFamily="34" charset="0"/>
+              </a:rPr>
+              <a:t>Wird mit Kommando </a:t>
+            </a:r>
+            <a:r>
+              <a:rPr lang="de-DE" sz="2000" b="1" i="1" dirty="0" err="1">
+                <a:latin typeface="Arial" panose="020B0604020202020204" pitchFamily="34" charset="0"/>
+                <a:cs typeface="Arial" panose="020B0604020202020204" pitchFamily="34" charset="0"/>
+              </a:rPr>
+              <a:t>apt-get</a:t>
+            </a:r>
+            <a:r>
+              <a:rPr lang="de-DE" sz="2000" b="1" i="1" dirty="0">
+                <a:latin typeface="Arial" panose="020B0604020202020204" pitchFamily="34" charset="0"/>
+                <a:cs typeface="Arial" panose="020B0604020202020204" pitchFamily="34" charset="0"/>
+              </a:rPr>
+              <a:t> </a:t>
+            </a:r>
+            <a:r>
+              <a:rPr lang="de-DE" sz="2000" dirty="0">
+                <a:latin typeface="Arial" panose="020B0604020202020204" pitchFamily="34" charset="0"/>
+                <a:cs typeface="Arial" panose="020B0604020202020204" pitchFamily="34" charset="0"/>
+              </a:rPr>
+              <a:t>heruntergeladen und installiert</a:t>
+            </a:r>
+          </a:p>
+          <a:p>
+            <a:pPr lvl="1"/>
+            <a:r>
+              <a:rPr lang="de-DE" sz="1600" dirty="0">
+                <a:latin typeface="Arial" panose="020B0604020202020204" pitchFamily="34" charset="0"/>
+                <a:cs typeface="Arial" panose="020B0604020202020204" pitchFamily="34" charset="0"/>
+              </a:rPr>
+              <a:t>Zuerst müssen Referenzen erneuert werden</a:t>
+            </a:r>
+          </a:p>
+          <a:p>
+            <a:pPr marL="457200" lvl="1" indent="0">
+              <a:buNone/>
+            </a:pPr>
+            <a:r>
+              <a:rPr lang="de-DE" sz="1600" dirty="0">
+                <a:latin typeface="Arial" panose="020B0604020202020204" pitchFamily="34" charset="0"/>
+                <a:cs typeface="Arial" panose="020B0604020202020204" pitchFamily="34" charset="0"/>
+              </a:rPr>
+              <a:t>	Kommando: </a:t>
+            </a:r>
+            <a:r>
+              <a:rPr lang="de-DE" sz="1600" b="1" i="1" dirty="0" err="1">
+                <a:latin typeface="Arial" panose="020B0604020202020204" pitchFamily="34" charset="0"/>
+                <a:cs typeface="Arial" panose="020B0604020202020204" pitchFamily="34" charset="0"/>
+              </a:rPr>
+              <a:t>sudo</a:t>
+            </a:r>
+            <a:r>
+              <a:rPr lang="de-DE" sz="1600" b="1" i="1" dirty="0">
+                <a:latin typeface="Arial" panose="020B0604020202020204" pitchFamily="34" charset="0"/>
+                <a:cs typeface="Arial" panose="020B0604020202020204" pitchFamily="34" charset="0"/>
+              </a:rPr>
+              <a:t> </a:t>
+            </a:r>
+            <a:r>
+              <a:rPr lang="de-DE" sz="1600" b="1" i="1" dirty="0" err="1">
+                <a:latin typeface="Arial" panose="020B0604020202020204" pitchFamily="34" charset="0"/>
+                <a:cs typeface="Arial" panose="020B0604020202020204" pitchFamily="34" charset="0"/>
+              </a:rPr>
+              <a:t>apt-get</a:t>
+            </a:r>
+            <a:r>
+              <a:rPr lang="de-DE" sz="1600" b="1" i="1" dirty="0">
+                <a:latin typeface="Arial" panose="020B0604020202020204" pitchFamily="34" charset="0"/>
+                <a:cs typeface="Arial" panose="020B0604020202020204" pitchFamily="34" charset="0"/>
+              </a:rPr>
+              <a:t> update</a:t>
+            </a:r>
+          </a:p>
+          <a:p>
+            <a:pPr lvl="1"/>
+            <a:r>
+              <a:rPr lang="de-DE" sz="1600" dirty="0">
+                <a:latin typeface="Arial" panose="020B0604020202020204" pitchFamily="34" charset="0"/>
+                <a:cs typeface="Arial" panose="020B0604020202020204" pitchFamily="34" charset="0"/>
+              </a:rPr>
+              <a:t>Danach kann Git installiert werden</a:t>
+            </a:r>
+          </a:p>
+          <a:p>
+            <a:pPr marL="457200" lvl="1" indent="0">
+              <a:buNone/>
+            </a:pPr>
+            <a:r>
+              <a:rPr lang="de-DE" sz="1600" dirty="0">
+                <a:latin typeface="Arial" panose="020B0604020202020204" pitchFamily="34" charset="0"/>
+                <a:cs typeface="Arial" panose="020B0604020202020204" pitchFamily="34" charset="0"/>
+              </a:rPr>
+              <a:t>	Kommando: </a:t>
+            </a:r>
+            <a:r>
+              <a:rPr lang="de-DE" sz="1600" b="1" i="1" dirty="0" err="1">
+                <a:latin typeface="Arial" panose="020B0604020202020204" pitchFamily="34" charset="0"/>
+                <a:cs typeface="Arial" panose="020B0604020202020204" pitchFamily="34" charset="0"/>
+              </a:rPr>
+              <a:t>sudo</a:t>
+            </a:r>
+            <a:r>
+              <a:rPr lang="de-DE" sz="1600" b="1" i="1" dirty="0">
+                <a:latin typeface="Arial" panose="020B0604020202020204" pitchFamily="34" charset="0"/>
+                <a:cs typeface="Arial" panose="020B0604020202020204" pitchFamily="34" charset="0"/>
+              </a:rPr>
+              <a:t> </a:t>
+            </a:r>
+            <a:r>
+              <a:rPr lang="de-DE" sz="1600" b="1" i="1" dirty="0" err="1">
+                <a:latin typeface="Arial" panose="020B0604020202020204" pitchFamily="34" charset="0"/>
+                <a:cs typeface="Arial" panose="020B0604020202020204" pitchFamily="34" charset="0"/>
+              </a:rPr>
+              <a:t>apt-get</a:t>
+            </a:r>
+            <a:r>
+              <a:rPr lang="de-DE" sz="1600" b="1" i="1" dirty="0">
+                <a:latin typeface="Arial" panose="020B0604020202020204" pitchFamily="34" charset="0"/>
+                <a:cs typeface="Arial" panose="020B0604020202020204" pitchFamily="34" charset="0"/>
+              </a:rPr>
+              <a:t> </a:t>
+            </a:r>
+            <a:r>
+              <a:rPr lang="de-DE" sz="1600" b="1" i="1" dirty="0" err="1">
+                <a:latin typeface="Arial" panose="020B0604020202020204" pitchFamily="34" charset="0"/>
+                <a:cs typeface="Arial" panose="020B0604020202020204" pitchFamily="34" charset="0"/>
+              </a:rPr>
+              <a:t>install</a:t>
+            </a:r>
+            <a:r>
+              <a:rPr lang="de-DE" sz="1600" b="1" i="1" dirty="0">
+                <a:latin typeface="Arial" panose="020B0604020202020204" pitchFamily="34" charset="0"/>
+                <a:cs typeface="Arial" panose="020B0604020202020204" pitchFamily="34" charset="0"/>
+              </a:rPr>
+              <a:t> git</a:t>
+            </a:r>
+            <a:endParaRPr lang="de-DE" sz="1200" b="1" i="1" dirty="0">
+              <a:latin typeface="Arial" panose="020B0604020202020204" pitchFamily="34" charset="0"/>
+              <a:cs typeface="Arial" panose="020B0604020202020204" pitchFamily="34" charset="0"/>
+            </a:endParaRPr>
+          </a:p>
+          <a:p>
+            <a:pPr marL="914400" lvl="2" indent="0">
+              <a:buNone/>
+            </a:pPr>
+            <a:endParaRPr lang="de-DE" sz="1200" dirty="0">
+              <a:latin typeface="Arial" panose="020B0604020202020204" pitchFamily="34" charset="0"/>
+              <a:cs typeface="Arial" panose="020B0604020202020204" pitchFamily="34" charset="0"/>
+            </a:endParaRPr>
+          </a:p>
+          <a:p>
+            <a:endParaRPr lang="de-DE" sz="2000" dirty="0">
+              <a:latin typeface="Arial" panose="020B0604020202020204" pitchFamily="34" charset="0"/>
+              <a:cs typeface="Arial" panose="020B0604020202020204" pitchFamily="34" charset="0"/>
+            </a:endParaRPr>
+          </a:p>
+          <a:p>
+            <a:endParaRPr lang="de-DE" sz="2000" dirty="0">
+              <a:latin typeface="Arial" panose="020B0604020202020204" pitchFamily="34" charset="0"/>
+              <a:cs typeface="Arial" panose="020B0604020202020204" pitchFamily="34" charset="0"/>
+            </a:endParaRPr>
+          </a:p>
+          <a:p>
+            <a:endParaRPr lang="de-DE" sz="2000" dirty="0">
+              <a:latin typeface="Arial" panose="020B0604020202020204" pitchFamily="34" charset="0"/>
+              <a:cs typeface="Arial" panose="020B0604020202020204" pitchFamily="34" charset="0"/>
+            </a:endParaRPr>
+          </a:p>
+          <a:p>
+            <a:endParaRPr lang="de-DE" sz="2000" dirty="0">
+              <a:latin typeface="Arial" panose="020B0604020202020204" pitchFamily="34" charset="0"/>
+              <a:cs typeface="Arial" panose="020B0604020202020204" pitchFamily="34" charset="0"/>
+            </a:endParaRPr>
+          </a:p>
+          <a:p>
+            <a:endParaRPr lang="de-DE" sz="2000" dirty="0">
+              <a:latin typeface="Arial" panose="020B0604020202020204" pitchFamily="34" charset="0"/>
+              <a:cs typeface="Arial" panose="020B0604020202020204" pitchFamily="34" charset="0"/>
+            </a:endParaRPr>
+          </a:p>
+          <a:p>
+            <a:endParaRPr lang="de-DE" sz="2000" dirty="0">
+              <a:latin typeface="Arial" panose="020B0604020202020204" pitchFamily="34" charset="0"/>
+              <a:cs typeface="Arial" panose="020B0604020202020204" pitchFamily="34" charset="0"/>
+            </a:endParaRPr>
+          </a:p>
+          <a:p>
+            <a:pPr lvl="1"/>
+            <a:endParaRPr lang="de-DE" sz="2000" dirty="0">
+              <a:latin typeface="Arial" panose="020B0604020202020204" pitchFamily="34" charset="0"/>
+              <a:cs typeface="Arial" panose="020B0604020202020204" pitchFamily="34" charset="0"/>
+            </a:endParaRPr>
+          </a:p>
+        </p:txBody>
+      </p:sp>
+      <p:sp>
+        <p:nvSpPr>
+          <p:cNvPr id="2" name="Titel 1">
+            <a:extLst>
+              <a:ext uri="{FF2B5EF4-FFF2-40B4-BE49-F238E27FC236}">
+                <a16:creationId xmlns:a16="http://schemas.microsoft.com/office/drawing/2014/main" id="{BE9BD52A-10D4-4170-A998-31F963D2F9BB}"/>
+              </a:ext>
+            </a:extLst>
+          </p:cNvPr>
+          <p:cNvSpPr>
+            <a:spLocks noGrp="1"/>
+          </p:cNvSpPr>
+          <p:nvPr>
+            <p:ph type="title" idx="4294967295"/>
+          </p:nvPr>
+        </p:nvSpPr>
+        <p:spPr/>
+        <p:txBody>
+          <a:bodyPr>
+            <a:normAutofit/>
+          </a:bodyPr>
+          <a:lstStyle/>
+          <a:p>
+            <a:r>
+              <a:rPr lang="de-DE" sz="2400" b="1" dirty="0">
+                <a:latin typeface="Arial" panose="020B0604020202020204" pitchFamily="34" charset="0"/>
+                <a:cs typeface="Arial" panose="020B0604020202020204" pitchFamily="34" charset="0"/>
+              </a:rPr>
+              <a:t>Installation unter Linux</a:t>
+            </a:r>
+          </a:p>
+        </p:txBody>
+      </p:sp>
+      <p:sp>
+        <p:nvSpPr>
+          <p:cNvPr id="4" name="Datumsplatzhalter 3">
+            <a:extLst>
+              <a:ext uri="{FF2B5EF4-FFF2-40B4-BE49-F238E27FC236}">
+                <a16:creationId xmlns:a16="http://schemas.microsoft.com/office/drawing/2014/main" id="{EDAA1497-5C4E-4F1B-A045-74E2D153CB91}"/>
+              </a:ext>
+            </a:extLst>
+          </p:cNvPr>
+          <p:cNvSpPr>
+            <a:spLocks noGrp="1"/>
+          </p:cNvSpPr>
+          <p:nvPr>
+            <p:ph type="dt" sz="half" idx="4294967295"/>
+          </p:nvPr>
+        </p:nvSpPr>
+        <p:spPr>
+          <a:xfrm>
+            <a:off x="7086600" y="6356350"/>
+            <a:ext cx="2057400" cy="365125"/>
+          </a:xfrm>
+        </p:spPr>
+        <p:txBody>
+          <a:bodyPr/>
+          <a:lstStyle/>
+          <a:p>
+            <a:fld id="{6F7941D6-DDCD-4FEB-B76A-6EA7C7E1DF91}" type="datetime1">
+              <a:rPr lang="de-DE" smtClean="0"/>
+              <a:t>07.03.2020</a:t>
+            </a:fld>
+            <a:endParaRPr lang="de-DE" dirty="0"/>
+          </a:p>
+        </p:txBody>
+      </p:sp>
+      <p:sp>
+        <p:nvSpPr>
+          <p:cNvPr id="5" name="Fußzeilenplatzhalter 4">
+            <a:extLst>
+              <a:ext uri="{FF2B5EF4-FFF2-40B4-BE49-F238E27FC236}">
+                <a16:creationId xmlns:a16="http://schemas.microsoft.com/office/drawing/2014/main" id="{C59CBE4D-CD6A-43CD-B5F7-D0456D90B39E}"/>
+              </a:ext>
+            </a:extLst>
+          </p:cNvPr>
+          <p:cNvSpPr>
+            <a:spLocks noGrp="1"/>
+          </p:cNvSpPr>
+          <p:nvPr>
+            <p:ph type="ftr" sz="quarter" idx="4294967295"/>
+          </p:nvPr>
+        </p:nvSpPr>
+        <p:spPr>
+          <a:xfrm>
+            <a:off x="0" y="6356350"/>
+            <a:ext cx="3698875" cy="365125"/>
+          </a:xfrm>
+        </p:spPr>
+        <p:txBody>
+          <a:bodyPr/>
+          <a:lstStyle/>
+          <a:p>
+            <a:r>
+              <a:rPr lang="de-DE" dirty="0"/>
+              <a:t>Git Tutorial</a:t>
+            </a:r>
+          </a:p>
+        </p:txBody>
+      </p:sp>
+      <p:sp>
+        <p:nvSpPr>
+          <p:cNvPr id="6" name="Foliennummernplatzhalter 5">
+            <a:extLst>
+              <a:ext uri="{FF2B5EF4-FFF2-40B4-BE49-F238E27FC236}">
+                <a16:creationId xmlns:a16="http://schemas.microsoft.com/office/drawing/2014/main" id="{B84F1831-59D5-4145-B6B9-A1613CE4A1A9}"/>
+              </a:ext>
+            </a:extLst>
+          </p:cNvPr>
+          <p:cNvSpPr>
+            <a:spLocks noGrp="1"/>
+          </p:cNvSpPr>
+          <p:nvPr>
+            <p:ph type="sldNum" sz="quarter" idx="4294967295"/>
+          </p:nvPr>
+        </p:nvSpPr>
+        <p:spPr>
+          <a:xfrm>
+            <a:off x="0" y="6356350"/>
+            <a:ext cx="2057400" cy="365125"/>
+          </a:xfrm>
+        </p:spPr>
+        <p:txBody>
+          <a:bodyPr/>
+          <a:lstStyle/>
+          <a:p>
+            <a:pPr algn="ctr"/>
+            <a:fld id="{6F94D85D-A331-4F90-A37B-3680A0933E4F}" type="slidenum">
+              <a:rPr lang="de-DE" smtClean="0"/>
+              <a:pPr algn="ctr"/>
+              <a:t>1</a:t>
+            </a:fld>
+            <a:endParaRPr lang="de-DE" dirty="0"/>
+          </a:p>
+        </p:txBody>
+      </p:sp>
+      <p:cxnSp>
+        <p:nvCxnSpPr>
+          <p:cNvPr id="8" name="Gerader Verbinder 7">
+            <a:extLst>
+              <a:ext uri="{FF2B5EF4-FFF2-40B4-BE49-F238E27FC236}">
+                <a16:creationId xmlns:a16="http://schemas.microsoft.com/office/drawing/2014/main" id="{7E8F2A84-19B8-4826-B3AD-6F16601D7885}"/>
+              </a:ext>
+            </a:extLst>
+          </p:cNvPr>
+          <p:cNvCxnSpPr>
+            <a:cxnSpLocks/>
+          </p:cNvCxnSpPr>
+          <p:nvPr/>
+        </p:nvCxnSpPr>
+        <p:spPr>
+          <a:xfrm>
+            <a:off x="628650" y="6353847"/>
+            <a:ext cx="7886700" cy="0"/>
+          </a:xfrm>
+          <a:prstGeom prst="line">
+            <a:avLst/>
+          </a:prstGeom>
+        </p:spPr>
+        <p:style>
+          <a:lnRef idx="1">
+            <a:schemeClr val="dk1"/>
+          </a:lnRef>
+          <a:fillRef idx="0">
+            <a:schemeClr val="dk1"/>
+          </a:fillRef>
+          <a:effectRef idx="0">
+            <a:schemeClr val="dk1"/>
+          </a:effectRef>
+          <a:fontRef idx="minor">
+            <a:schemeClr val="tx1"/>
+          </a:fontRef>
+        </p:style>
+      </p:cxnSp>
+      <p:pic>
+        <p:nvPicPr>
+          <p:cNvPr id="10" name="Grafik 9">
+            <a:extLst>
+              <a:ext uri="{FF2B5EF4-FFF2-40B4-BE49-F238E27FC236}">
+                <a16:creationId xmlns:a16="http://schemas.microsoft.com/office/drawing/2014/main" id="{7A6261ED-119B-40E9-A877-9DF5FF1D43F4}"/>
+              </a:ext>
+            </a:extLst>
+          </p:cNvPr>
+          <p:cNvPicPr>
+            <a:picLocks noChangeAspect="1"/>
+          </p:cNvPicPr>
+          <p:nvPr/>
+        </p:nvPicPr>
+        <p:blipFill>
+          <a:blip r:embed="rId2"/>
+          <a:stretch>
+            <a:fillRect/>
+          </a:stretch>
+        </p:blipFill>
+        <p:spPr>
+          <a:xfrm>
+            <a:off x="7370059" y="6363613"/>
+            <a:ext cx="960209" cy="314098"/>
+          </a:xfrm>
+          <a:prstGeom prst="rect">
+            <a:avLst/>
+          </a:prstGeom>
+        </p:spPr>
+      </p:pic>
+      <p:cxnSp>
+        <p:nvCxnSpPr>
+          <p:cNvPr id="13" name="Gerader Verbinder 12">
+            <a:extLst>
+              <a:ext uri="{FF2B5EF4-FFF2-40B4-BE49-F238E27FC236}">
+                <a16:creationId xmlns:a16="http://schemas.microsoft.com/office/drawing/2014/main" id="{F9DA0021-3FCA-4721-AD9E-DF15B2F3591D}"/>
+              </a:ext>
+            </a:extLst>
+          </p:cNvPr>
+          <p:cNvCxnSpPr>
+            <a:cxnSpLocks/>
+          </p:cNvCxnSpPr>
+          <p:nvPr/>
+        </p:nvCxnSpPr>
+        <p:spPr>
+          <a:xfrm>
+            <a:off x="628650" y="993703"/>
+            <a:ext cx="7886700" cy="0"/>
+          </a:xfrm>
+          <a:prstGeom prst="line">
+            <a:avLst/>
+          </a:prstGeom>
+        </p:spPr>
+        <p:style>
+          <a:lnRef idx="1">
+            <a:schemeClr val="dk1"/>
+          </a:lnRef>
+          <a:fillRef idx="0">
+            <a:schemeClr val="dk1"/>
+          </a:fillRef>
+          <a:effectRef idx="0">
+            <a:schemeClr val="dk1"/>
+          </a:effectRef>
+          <a:fontRef idx="minor">
+            <a:schemeClr val="tx1"/>
+          </a:fontRef>
+        </p:style>
+      </p:cxnSp>
+    </p:spTree>
+    <p:extLst>
+      <p:ext uri="{BB962C8B-B14F-4D97-AF65-F5344CB8AC3E}">
+        <p14:creationId xmlns:p14="http://schemas.microsoft.com/office/powerpoint/2010/main" val="1628561704"/>
+      </p:ext>
+    </p:extLst>
+  </p:cSld>
+  <p:clrMapOvr>
+    <a:masterClrMapping/>
+  </p:clrMapOvr>
+</p:sld>
+</file>
+
+<file path=ppt/slides/slide10.xml><?xml version="1.0" encoding="utf-8"?>
+<p:sld xmlns:a="http://schemas.openxmlformats.org/drawingml/2006/main" xmlns:r="http://schemas.openxmlformats.org/officeDocument/2006/relationships" xmlns:p="http://schemas.openxmlformats.org/presentationml/2006/main">
+  <p:cSld>
+    <p:spTree>
+      <p:nvGrpSpPr>
+        <p:cNvPr id="1" name=""/>
+        <p:cNvGrpSpPr/>
+        <p:nvPr/>
+      </p:nvGrpSpPr>
+      <p:grpSpPr>
+        <a:xfrm>
+          <a:off x="0" y="0"/>
+          <a:ext cx="0" cy="0"/>
+          <a:chOff x="0" y="0"/>
+          <a:chExt cx="0" cy="0"/>
+        </a:xfrm>
+      </p:grpSpPr>
+      <p:sp>
+        <p:nvSpPr>
+          <p:cNvPr id="2" name="Inhaltsplatzhalter 1">
+            <a:extLst>
+              <a:ext uri="{FF2B5EF4-FFF2-40B4-BE49-F238E27FC236}">
+                <a16:creationId xmlns:a16="http://schemas.microsoft.com/office/drawing/2014/main" id="{99579AFA-4288-4E59-BD2C-CF222CE7DDEA}"/>
+              </a:ext>
+            </a:extLst>
+          </p:cNvPr>
+          <p:cNvSpPr>
+            <a:spLocks noGrp="1"/>
+          </p:cNvSpPr>
+          <p:nvPr>
+            <p:ph idx="13"/>
+          </p:nvPr>
+        </p:nvSpPr>
+        <p:spPr/>
+        <p:txBody>
+          <a:bodyPr/>
+          <a:lstStyle/>
+          <a:p>
+            <a:r>
+              <a:rPr lang="de-DE" dirty="0"/>
+              <a:t>Stellt Zwischenspeicher dar</a:t>
+            </a:r>
+          </a:p>
+          <a:p>
+            <a:r>
+              <a:rPr lang="de-DE" dirty="0"/>
+              <a:t>Kommando: </a:t>
+            </a:r>
+            <a:r>
+              <a:rPr lang="de-DE" b="1" i="1" dirty="0"/>
+              <a:t>git </a:t>
+            </a:r>
+            <a:r>
+              <a:rPr lang="de-DE" b="1" i="1" dirty="0" err="1"/>
+              <a:t>stash</a:t>
+            </a:r>
+            <a:endParaRPr lang="de-DE" b="1" i="1" dirty="0"/>
+          </a:p>
+          <a:p>
+            <a:r>
+              <a:rPr lang="de-DE" dirty="0"/>
+              <a:t>Optionen:</a:t>
+            </a:r>
+          </a:p>
+          <a:p>
+            <a:pPr lvl="1"/>
+            <a:r>
+              <a:rPr lang="de-DE" b="1" i="1" dirty="0"/>
+              <a:t>-patch</a:t>
+            </a:r>
+            <a:r>
+              <a:rPr lang="de-DE" dirty="0"/>
+              <a:t>:</a:t>
+            </a:r>
+          </a:p>
+          <a:p>
+            <a:pPr lvl="1"/>
+            <a:r>
+              <a:rPr lang="de-DE" b="1" i="1" dirty="0"/>
+              <a:t>-u</a:t>
+            </a:r>
+            <a:r>
+              <a:rPr lang="de-DE" dirty="0"/>
+              <a:t>:</a:t>
+            </a:r>
+          </a:p>
+          <a:p>
+            <a:pPr lvl="1"/>
+            <a:r>
+              <a:rPr lang="de-DE" b="1" i="1" dirty="0" err="1"/>
+              <a:t>list</a:t>
+            </a:r>
+            <a:r>
+              <a:rPr lang="de-DE" dirty="0"/>
+              <a:t>:</a:t>
+            </a:r>
+          </a:p>
+          <a:p>
+            <a:pPr lvl="1"/>
+            <a:r>
+              <a:rPr lang="de-DE" b="1" i="1" dirty="0"/>
+              <a:t>save "&lt;Nachricht&gt;"</a:t>
+            </a:r>
+            <a:r>
+              <a:rPr lang="de-DE" dirty="0"/>
+              <a:t>:</a:t>
+            </a:r>
+          </a:p>
+          <a:p>
+            <a:pPr lvl="1"/>
+            <a:r>
+              <a:rPr lang="de-DE" b="1" i="1" dirty="0" err="1"/>
+              <a:t>pop</a:t>
+            </a:r>
+            <a:r>
+              <a:rPr lang="de-DE" dirty="0"/>
+              <a:t>:</a:t>
+            </a:r>
+          </a:p>
+          <a:p>
+            <a:pPr lvl="1"/>
+            <a:r>
+              <a:rPr lang="de-DE" b="1" i="1" dirty="0" err="1"/>
+              <a:t>apply</a:t>
+            </a:r>
+            <a:r>
+              <a:rPr lang="de-DE" dirty="0"/>
+              <a:t>:</a:t>
+            </a:r>
+          </a:p>
+          <a:p>
+            <a:pPr lvl="1"/>
+            <a:r>
+              <a:rPr lang="de-DE" b="1" i="1" dirty="0" err="1"/>
+              <a:t>show</a:t>
+            </a:r>
+            <a:r>
+              <a:rPr lang="de-DE" dirty="0"/>
+              <a:t>:</a:t>
+            </a:r>
+          </a:p>
+          <a:p>
+            <a:pPr lvl="1"/>
+            <a:r>
+              <a:rPr lang="de-DE" b="1" i="1" dirty="0" err="1"/>
+              <a:t>drop</a:t>
+            </a:r>
+            <a:r>
+              <a:rPr lang="de-DE" b="1" i="1" dirty="0"/>
+              <a:t> &lt;</a:t>
+            </a:r>
+            <a:r>
+              <a:rPr lang="de-DE" b="1" i="1" dirty="0" err="1"/>
+              <a:t>stash-id</a:t>
+            </a:r>
+            <a:r>
+              <a:rPr lang="de-DE" b="1" i="1" dirty="0"/>
+              <a:t>&gt;</a:t>
+            </a:r>
+            <a:r>
+              <a:rPr lang="de-DE" dirty="0"/>
+              <a:t>:</a:t>
+            </a:r>
+          </a:p>
+          <a:p>
+            <a:pPr lvl="1"/>
+            <a:endParaRPr lang="de-DE" dirty="0"/>
+          </a:p>
+        </p:txBody>
+      </p:sp>
+      <p:sp>
+        <p:nvSpPr>
+          <p:cNvPr id="3" name="Titel 2">
+            <a:extLst>
+              <a:ext uri="{FF2B5EF4-FFF2-40B4-BE49-F238E27FC236}">
+                <a16:creationId xmlns:a16="http://schemas.microsoft.com/office/drawing/2014/main" id="{23F9D629-AE16-4134-A025-BC6DE94F1F0F}"/>
+              </a:ext>
+            </a:extLst>
+          </p:cNvPr>
+          <p:cNvSpPr>
+            <a:spLocks noGrp="1"/>
+          </p:cNvSpPr>
+          <p:nvPr>
+            <p:ph type="title" idx="4294967295"/>
+          </p:nvPr>
+        </p:nvSpPr>
+        <p:spPr/>
+        <p:txBody>
+          <a:bodyPr/>
+          <a:lstStyle/>
+          <a:p>
+            <a:r>
+              <a:rPr lang="de-DE" dirty="0" err="1"/>
+              <a:t>Stash</a:t>
+            </a:r>
+            <a:endParaRPr lang="de-DE" dirty="0"/>
+          </a:p>
+        </p:txBody>
+      </p:sp>
+    </p:spTree>
+    <p:extLst>
+      <p:ext uri="{BB962C8B-B14F-4D97-AF65-F5344CB8AC3E}">
+        <p14:creationId xmlns:p14="http://schemas.microsoft.com/office/powerpoint/2010/main" val="1555292907"/>
+      </p:ext>
+    </p:extLst>
+  </p:cSld>
+  <p:clrMapOvr>
+    <a:masterClrMapping/>
+  </p:clrMapOvr>
+</p:sld>
+</file>
+
+<file path=ppt/slides/slide11.xml><?xml version="1.0" encoding="utf-8"?>
+<p:sld xmlns:a="http://schemas.openxmlformats.org/drawingml/2006/main" xmlns:r="http://schemas.openxmlformats.org/officeDocument/2006/relationships" xmlns:p="http://schemas.openxmlformats.org/presentationml/2006/main">
+  <p:cSld>
+    <p:spTree>
+      <p:nvGrpSpPr>
+        <p:cNvPr id="1" name=""/>
+        <p:cNvGrpSpPr/>
+        <p:nvPr/>
+      </p:nvGrpSpPr>
+      <p:grpSpPr>
+        <a:xfrm>
+          <a:off x="0" y="0"/>
+          <a:ext cx="0" cy="0"/>
+          <a:chOff x="0" y="0"/>
+          <a:chExt cx="0" cy="0"/>
+        </a:xfrm>
+      </p:grpSpPr>
+      <p:sp>
+        <p:nvSpPr>
+          <p:cNvPr id="2" name="Inhaltsplatzhalter 1">
+            <a:extLst>
+              <a:ext uri="{FF2B5EF4-FFF2-40B4-BE49-F238E27FC236}">
+                <a16:creationId xmlns:a16="http://schemas.microsoft.com/office/drawing/2014/main" id="{08B3E3F0-ED4E-42DE-8E67-F6BAA697A7DA}"/>
+              </a:ext>
+            </a:extLst>
+          </p:cNvPr>
+          <p:cNvSpPr>
+            <a:spLocks noGrp="1"/>
+          </p:cNvSpPr>
+          <p:nvPr>
+            <p:ph idx="13"/>
+          </p:nvPr>
+        </p:nvSpPr>
+        <p:spPr/>
+        <p:txBody>
+          <a:bodyPr/>
+          <a:lstStyle/>
+          <a:p>
+            <a:endParaRPr lang="de-DE"/>
+          </a:p>
+        </p:txBody>
+      </p:sp>
+      <p:sp>
+        <p:nvSpPr>
+          <p:cNvPr id="3" name="Titel 2">
+            <a:extLst>
+              <a:ext uri="{FF2B5EF4-FFF2-40B4-BE49-F238E27FC236}">
+                <a16:creationId xmlns:a16="http://schemas.microsoft.com/office/drawing/2014/main" id="{B912F092-D3B3-4246-8550-7F89DC5A3EF0}"/>
+              </a:ext>
+            </a:extLst>
+          </p:cNvPr>
+          <p:cNvSpPr>
+            <a:spLocks noGrp="1"/>
+          </p:cNvSpPr>
+          <p:nvPr>
+            <p:ph type="title" idx="4294967295"/>
+          </p:nvPr>
+        </p:nvSpPr>
+        <p:spPr/>
+        <p:txBody>
+          <a:bodyPr/>
+          <a:lstStyle/>
+          <a:p>
+            <a:r>
+              <a:rPr lang="de-DE" dirty="0"/>
+              <a:t>Log</a:t>
+            </a:r>
+          </a:p>
+        </p:txBody>
+      </p:sp>
+    </p:spTree>
+    <p:extLst>
+      <p:ext uri="{BB962C8B-B14F-4D97-AF65-F5344CB8AC3E}">
+        <p14:creationId xmlns:p14="http://schemas.microsoft.com/office/powerpoint/2010/main" val="3018236094"/>
+      </p:ext>
+    </p:extLst>
+  </p:cSld>
+  <p:clrMapOvr>
+    <a:masterClrMapping/>
+  </p:clrMapOvr>
+</p:sld>
+</file>
+
+<file path=ppt/slides/slide12.xml><?xml version="1.0" encoding="utf-8"?>
+<p:sld xmlns:a="http://schemas.openxmlformats.org/drawingml/2006/main" xmlns:r="http://schemas.openxmlformats.org/officeDocument/2006/relationships" xmlns:p="http://schemas.openxmlformats.org/presentationml/2006/main">
+  <p:cSld>
+    <p:spTree>
+      <p:nvGrpSpPr>
+        <p:cNvPr id="1" name=""/>
+        <p:cNvGrpSpPr/>
+        <p:nvPr/>
+      </p:nvGrpSpPr>
+      <p:grpSpPr>
+        <a:xfrm>
+          <a:off x="0" y="0"/>
+          <a:ext cx="0" cy="0"/>
+          <a:chOff x="0" y="0"/>
+          <a:chExt cx="0" cy="0"/>
+        </a:xfrm>
+      </p:grpSpPr>
+      <p:sp>
+        <p:nvSpPr>
+          <p:cNvPr id="4" name="Titel 3">
+            <a:extLst>
+              <a:ext uri="{FF2B5EF4-FFF2-40B4-BE49-F238E27FC236}">
+                <a16:creationId xmlns:a16="http://schemas.microsoft.com/office/drawing/2014/main" id="{C2ABF1F1-47DF-422D-8ECF-EB59674283F8}"/>
+              </a:ext>
+            </a:extLst>
+          </p:cNvPr>
+          <p:cNvSpPr>
+            <a:spLocks noGrp="1"/>
+          </p:cNvSpPr>
+          <p:nvPr>
+            <p:ph type="title"/>
+          </p:nvPr>
+        </p:nvSpPr>
+        <p:spPr/>
+        <p:txBody>
+          <a:bodyPr/>
+          <a:lstStyle/>
+          <a:p>
+            <a:r>
+              <a:rPr lang="de-DE" dirty="0"/>
+              <a:t>Zweige</a:t>
+            </a:r>
+          </a:p>
+        </p:txBody>
+      </p:sp>
+    </p:spTree>
+    <p:extLst>
+      <p:ext uri="{BB962C8B-B14F-4D97-AF65-F5344CB8AC3E}">
+        <p14:creationId xmlns:p14="http://schemas.microsoft.com/office/powerpoint/2010/main" val="895590311"/>
+      </p:ext>
+    </p:extLst>
+  </p:cSld>
+  <p:clrMapOvr>
+    <a:masterClrMapping/>
+  </p:clrMapOvr>
+</p:sld>
+</file>
+
+<file path=ppt/slides/slide13.xml><?xml version="1.0" encoding="utf-8"?>
+<p:sld xmlns:a="http://schemas.openxmlformats.org/drawingml/2006/main" xmlns:r="http://schemas.openxmlformats.org/officeDocument/2006/relationships" xmlns:p="http://schemas.openxmlformats.org/presentationml/2006/main">
+  <p:cSld>
+    <p:spTree>
+      <p:nvGrpSpPr>
+        <p:cNvPr id="1" name=""/>
+        <p:cNvGrpSpPr/>
+        <p:nvPr/>
+      </p:nvGrpSpPr>
+      <p:grpSpPr>
+        <a:xfrm>
+          <a:off x="0" y="0"/>
+          <a:ext cx="0" cy="0"/>
+          <a:chOff x="0" y="0"/>
+          <a:chExt cx="0" cy="0"/>
+        </a:xfrm>
+      </p:grpSpPr>
+      <p:sp>
+        <p:nvSpPr>
+          <p:cNvPr id="3" name="Inhaltsplatzhalter 2">
+            <a:extLst>
+              <a:ext uri="{FF2B5EF4-FFF2-40B4-BE49-F238E27FC236}">
+                <a16:creationId xmlns:a16="http://schemas.microsoft.com/office/drawing/2014/main" id="{39488408-F056-467E-AA91-1648B8A9E4BD}"/>
+              </a:ext>
+            </a:extLst>
+          </p:cNvPr>
+          <p:cNvSpPr>
+            <a:spLocks noGrp="1"/>
+          </p:cNvSpPr>
+          <p:nvPr>
+            <p:ph idx="13"/>
+          </p:nvPr>
+        </p:nvSpPr>
+        <p:spPr/>
+        <p:txBody>
+          <a:bodyPr/>
+          <a:lstStyle/>
+          <a:p>
+            <a:endParaRPr lang="de-DE"/>
+          </a:p>
+        </p:txBody>
+      </p:sp>
+      <p:sp>
+        <p:nvSpPr>
+          <p:cNvPr id="4" name="Titel 3">
+            <a:extLst>
+              <a:ext uri="{FF2B5EF4-FFF2-40B4-BE49-F238E27FC236}">
+                <a16:creationId xmlns:a16="http://schemas.microsoft.com/office/drawing/2014/main" id="{F5D71C33-EA1B-45F6-8CDB-E316C7790496}"/>
+              </a:ext>
+            </a:extLst>
+          </p:cNvPr>
+          <p:cNvSpPr>
+            <a:spLocks noGrp="1"/>
+          </p:cNvSpPr>
+          <p:nvPr>
+            <p:ph type="title" idx="4294967295"/>
+          </p:nvPr>
+        </p:nvSpPr>
+        <p:spPr/>
+        <p:txBody>
+          <a:bodyPr/>
+          <a:lstStyle/>
+          <a:p>
+            <a:r>
+              <a:rPr lang="de-DE" dirty="0"/>
+              <a:t>Warum?</a:t>
+            </a:r>
+          </a:p>
+        </p:txBody>
+      </p:sp>
+    </p:spTree>
+    <p:extLst>
+      <p:ext uri="{BB962C8B-B14F-4D97-AF65-F5344CB8AC3E}">
+        <p14:creationId xmlns:p14="http://schemas.microsoft.com/office/powerpoint/2010/main" val="2350462169"/>
+      </p:ext>
+    </p:extLst>
+  </p:cSld>
+  <p:clrMapOvr>
+    <a:masterClrMapping/>
+  </p:clrMapOvr>
+</p:sld>
+</file>
+
+<file path=ppt/slides/slide14.xml><?xml version="1.0" encoding="utf-8"?>
+<p:sld xmlns:a="http://schemas.openxmlformats.org/drawingml/2006/main" xmlns:r="http://schemas.openxmlformats.org/officeDocument/2006/relationships" xmlns:p="http://schemas.openxmlformats.org/presentationml/2006/main">
+  <p:cSld>
+    <p:spTree>
+      <p:nvGrpSpPr>
+        <p:cNvPr id="1" name=""/>
+        <p:cNvGrpSpPr/>
+        <p:nvPr/>
+      </p:nvGrpSpPr>
+      <p:grpSpPr>
+        <a:xfrm>
+          <a:off x="0" y="0"/>
+          <a:ext cx="0" cy="0"/>
+          <a:chOff x="0" y="0"/>
+          <a:chExt cx="0" cy="0"/>
+        </a:xfrm>
+      </p:grpSpPr>
+      <p:sp>
+        <p:nvSpPr>
+          <p:cNvPr id="2" name="Inhaltsplatzhalter 1">
+            <a:extLst>
+              <a:ext uri="{FF2B5EF4-FFF2-40B4-BE49-F238E27FC236}">
+                <a16:creationId xmlns:a16="http://schemas.microsoft.com/office/drawing/2014/main" id="{B0B07356-22C1-42DF-8376-883865367B08}"/>
+              </a:ext>
+            </a:extLst>
+          </p:cNvPr>
+          <p:cNvSpPr>
+            <a:spLocks noGrp="1"/>
+          </p:cNvSpPr>
+          <p:nvPr>
+            <p:ph idx="13"/>
+          </p:nvPr>
+        </p:nvSpPr>
+        <p:spPr/>
+        <p:txBody>
+          <a:bodyPr/>
+          <a:lstStyle/>
+          <a:p>
+            <a:endParaRPr lang="de-DE"/>
+          </a:p>
+        </p:txBody>
+      </p:sp>
+      <p:sp>
+        <p:nvSpPr>
+          <p:cNvPr id="3" name="Titel 2">
+            <a:extLst>
+              <a:ext uri="{FF2B5EF4-FFF2-40B4-BE49-F238E27FC236}">
+                <a16:creationId xmlns:a16="http://schemas.microsoft.com/office/drawing/2014/main" id="{F6594D45-32B7-4752-94A3-EDFB73441261}"/>
+              </a:ext>
+            </a:extLst>
+          </p:cNvPr>
+          <p:cNvSpPr>
+            <a:spLocks noGrp="1"/>
+          </p:cNvSpPr>
+          <p:nvPr>
+            <p:ph type="title" idx="4294967295"/>
+          </p:nvPr>
+        </p:nvSpPr>
+        <p:spPr/>
+        <p:txBody>
+          <a:bodyPr/>
+          <a:lstStyle/>
+          <a:p>
+            <a:r>
+              <a:rPr lang="de-DE" dirty="0"/>
+              <a:t>Branch</a:t>
+            </a:r>
+          </a:p>
+        </p:txBody>
+      </p:sp>
+    </p:spTree>
+    <p:extLst>
+      <p:ext uri="{BB962C8B-B14F-4D97-AF65-F5344CB8AC3E}">
+        <p14:creationId xmlns:p14="http://schemas.microsoft.com/office/powerpoint/2010/main" val="3586302197"/>
+      </p:ext>
+    </p:extLst>
+  </p:cSld>
+  <p:clrMapOvr>
+    <a:masterClrMapping/>
+  </p:clrMapOvr>
+</p:sld>
+</file>
+
+<file path=ppt/slides/slide15.xml><?xml version="1.0" encoding="utf-8"?>
+<p:sld xmlns:a="http://schemas.openxmlformats.org/drawingml/2006/main" xmlns:r="http://schemas.openxmlformats.org/officeDocument/2006/relationships" xmlns:p="http://schemas.openxmlformats.org/presentationml/2006/main">
+  <p:cSld>
+    <p:spTree>
+      <p:nvGrpSpPr>
+        <p:cNvPr id="1" name=""/>
+        <p:cNvGrpSpPr/>
+        <p:nvPr/>
+      </p:nvGrpSpPr>
+      <p:grpSpPr>
+        <a:xfrm>
+          <a:off x="0" y="0"/>
+          <a:ext cx="0" cy="0"/>
+          <a:chOff x="0" y="0"/>
+          <a:chExt cx="0" cy="0"/>
+        </a:xfrm>
+      </p:grpSpPr>
+      <p:sp>
+        <p:nvSpPr>
+          <p:cNvPr id="2" name="Inhaltsplatzhalter 1">
+            <a:extLst>
+              <a:ext uri="{FF2B5EF4-FFF2-40B4-BE49-F238E27FC236}">
+                <a16:creationId xmlns:a16="http://schemas.microsoft.com/office/drawing/2014/main" id="{0503ED33-5331-4FC7-BAC3-A6A3BC6E3C7E}"/>
+              </a:ext>
+            </a:extLst>
+          </p:cNvPr>
+          <p:cNvSpPr>
+            <a:spLocks noGrp="1"/>
+          </p:cNvSpPr>
+          <p:nvPr>
+            <p:ph idx="13"/>
+          </p:nvPr>
+        </p:nvSpPr>
+        <p:spPr/>
+        <p:txBody>
+          <a:bodyPr/>
+          <a:lstStyle/>
+          <a:p>
+            <a:endParaRPr lang="de-DE"/>
+          </a:p>
+        </p:txBody>
+      </p:sp>
+      <p:sp>
+        <p:nvSpPr>
+          <p:cNvPr id="3" name="Titel 2">
+            <a:extLst>
+              <a:ext uri="{FF2B5EF4-FFF2-40B4-BE49-F238E27FC236}">
+                <a16:creationId xmlns:a16="http://schemas.microsoft.com/office/drawing/2014/main" id="{9A4DD9D4-A8C3-484C-A7B7-DEE7737333C6}"/>
+              </a:ext>
+            </a:extLst>
+          </p:cNvPr>
+          <p:cNvSpPr>
+            <a:spLocks noGrp="1"/>
+          </p:cNvSpPr>
+          <p:nvPr>
+            <p:ph type="title" idx="4294967295"/>
+          </p:nvPr>
+        </p:nvSpPr>
+        <p:spPr/>
+        <p:txBody>
+          <a:bodyPr/>
+          <a:lstStyle/>
+          <a:p>
+            <a:r>
+              <a:rPr lang="de-DE" dirty="0" err="1"/>
+              <a:t>Checkout</a:t>
+            </a:r>
+            <a:endParaRPr lang="de-DE" dirty="0"/>
+          </a:p>
+        </p:txBody>
+      </p:sp>
+    </p:spTree>
+    <p:extLst>
+      <p:ext uri="{BB962C8B-B14F-4D97-AF65-F5344CB8AC3E}">
+        <p14:creationId xmlns:p14="http://schemas.microsoft.com/office/powerpoint/2010/main" val="2575464971"/>
+      </p:ext>
+    </p:extLst>
+  </p:cSld>
+  <p:clrMapOvr>
+    <a:masterClrMapping/>
+  </p:clrMapOvr>
+</p:sld>
+</file>
+
+<file path=ppt/slides/slide16.xml><?xml version="1.0" encoding="utf-8"?>
+<p:sld xmlns:a="http://schemas.openxmlformats.org/drawingml/2006/main" xmlns:r="http://schemas.openxmlformats.org/officeDocument/2006/relationships" xmlns:p="http://schemas.openxmlformats.org/presentationml/2006/main">
+  <p:cSld>
+    <p:spTree>
+      <p:nvGrpSpPr>
+        <p:cNvPr id="1" name=""/>
+        <p:cNvGrpSpPr/>
+        <p:nvPr/>
+      </p:nvGrpSpPr>
+      <p:grpSpPr>
+        <a:xfrm>
+          <a:off x="0" y="0"/>
+          <a:ext cx="0" cy="0"/>
+          <a:chOff x="0" y="0"/>
+          <a:chExt cx="0" cy="0"/>
+        </a:xfrm>
+      </p:grpSpPr>
+      <p:sp>
+        <p:nvSpPr>
+          <p:cNvPr id="2" name="Inhaltsplatzhalter 1">
+            <a:extLst>
+              <a:ext uri="{FF2B5EF4-FFF2-40B4-BE49-F238E27FC236}">
+                <a16:creationId xmlns:a16="http://schemas.microsoft.com/office/drawing/2014/main" id="{F109D8F9-4C83-4BFF-B928-AEEE005C9F93}"/>
+              </a:ext>
+            </a:extLst>
+          </p:cNvPr>
+          <p:cNvSpPr>
+            <a:spLocks noGrp="1"/>
+          </p:cNvSpPr>
+          <p:nvPr>
+            <p:ph idx="13"/>
+          </p:nvPr>
+        </p:nvSpPr>
+        <p:spPr/>
+        <p:txBody>
+          <a:bodyPr/>
+          <a:lstStyle/>
+          <a:p>
+            <a:endParaRPr lang="de-DE"/>
+          </a:p>
+        </p:txBody>
+      </p:sp>
+      <p:sp>
+        <p:nvSpPr>
+          <p:cNvPr id="3" name="Titel 2">
+            <a:extLst>
+              <a:ext uri="{FF2B5EF4-FFF2-40B4-BE49-F238E27FC236}">
+                <a16:creationId xmlns:a16="http://schemas.microsoft.com/office/drawing/2014/main" id="{E1E8C774-CC73-4DF3-B362-774B81B4B149}"/>
+              </a:ext>
+            </a:extLst>
+          </p:cNvPr>
+          <p:cNvSpPr>
+            <a:spLocks noGrp="1"/>
+          </p:cNvSpPr>
+          <p:nvPr>
+            <p:ph type="title" idx="4294967295"/>
+          </p:nvPr>
+        </p:nvSpPr>
+        <p:spPr/>
+        <p:txBody>
+          <a:bodyPr/>
+          <a:lstStyle/>
+          <a:p>
+            <a:r>
+              <a:rPr lang="de-DE" dirty="0" err="1"/>
+              <a:t>Merge</a:t>
+            </a:r>
+            <a:endParaRPr lang="de-DE" dirty="0"/>
+          </a:p>
+        </p:txBody>
+      </p:sp>
+    </p:spTree>
+    <p:extLst>
+      <p:ext uri="{BB962C8B-B14F-4D97-AF65-F5344CB8AC3E}">
+        <p14:creationId xmlns:p14="http://schemas.microsoft.com/office/powerpoint/2010/main" val="18428114"/>
+      </p:ext>
+    </p:extLst>
+  </p:cSld>
+  <p:clrMapOvr>
+    <a:masterClrMapping/>
+  </p:clrMapOvr>
+</p:sld>
+</file>
+
+<file path=ppt/slides/slide17.xml><?xml version="1.0" encoding="utf-8"?>
+<p:sld xmlns:a="http://schemas.openxmlformats.org/drawingml/2006/main" xmlns:r="http://schemas.openxmlformats.org/officeDocument/2006/relationships" xmlns:p="http://schemas.openxmlformats.org/presentationml/2006/main">
+  <p:cSld>
+    <p:spTree>
+      <p:nvGrpSpPr>
+        <p:cNvPr id="1" name=""/>
+        <p:cNvGrpSpPr/>
+        <p:nvPr/>
+      </p:nvGrpSpPr>
+      <p:grpSpPr>
+        <a:xfrm>
+          <a:off x="0" y="0"/>
+          <a:ext cx="0" cy="0"/>
+          <a:chOff x="0" y="0"/>
+          <a:chExt cx="0" cy="0"/>
+        </a:xfrm>
+      </p:grpSpPr>
+      <p:sp>
+        <p:nvSpPr>
+          <p:cNvPr id="2" name="Inhaltsplatzhalter 1">
+            <a:extLst>
+              <a:ext uri="{FF2B5EF4-FFF2-40B4-BE49-F238E27FC236}">
+                <a16:creationId xmlns:a16="http://schemas.microsoft.com/office/drawing/2014/main" id="{D72C1ACF-D267-40D1-9A2D-92DB078AD81F}"/>
+              </a:ext>
+            </a:extLst>
+          </p:cNvPr>
+          <p:cNvSpPr>
+            <a:spLocks noGrp="1"/>
+          </p:cNvSpPr>
+          <p:nvPr>
+            <p:ph idx="13"/>
+          </p:nvPr>
+        </p:nvSpPr>
+        <p:spPr/>
+        <p:txBody>
+          <a:bodyPr/>
+          <a:lstStyle/>
+          <a:p>
+            <a:endParaRPr lang="de-DE"/>
+          </a:p>
+        </p:txBody>
+      </p:sp>
+      <p:sp>
+        <p:nvSpPr>
+          <p:cNvPr id="3" name="Titel 2">
+            <a:extLst>
+              <a:ext uri="{FF2B5EF4-FFF2-40B4-BE49-F238E27FC236}">
+                <a16:creationId xmlns:a16="http://schemas.microsoft.com/office/drawing/2014/main" id="{634FBDFA-2750-49DE-BA39-B520811BAC1B}"/>
+              </a:ext>
+            </a:extLst>
+          </p:cNvPr>
+          <p:cNvSpPr>
+            <a:spLocks noGrp="1"/>
+          </p:cNvSpPr>
+          <p:nvPr>
+            <p:ph type="title" idx="4294967295"/>
+          </p:nvPr>
+        </p:nvSpPr>
+        <p:spPr/>
+        <p:txBody>
+          <a:bodyPr/>
+          <a:lstStyle/>
+          <a:p>
+            <a:r>
+              <a:rPr lang="de-DE" dirty="0"/>
+              <a:t>Konflikte</a:t>
+            </a:r>
+          </a:p>
+        </p:txBody>
+      </p:sp>
+    </p:spTree>
+    <p:extLst>
+      <p:ext uri="{BB962C8B-B14F-4D97-AF65-F5344CB8AC3E}">
+        <p14:creationId xmlns:p14="http://schemas.microsoft.com/office/powerpoint/2010/main" val="609718407"/>
+      </p:ext>
+    </p:extLst>
+  </p:cSld>
+  <p:clrMapOvr>
+    <a:masterClrMapping/>
+  </p:clrMapOvr>
+</p:sld>
+</file>
+
+<file path=ppt/slides/slide18.xml><?xml version="1.0" encoding="utf-8"?>
+<p:sld xmlns:a="http://schemas.openxmlformats.org/drawingml/2006/main" xmlns:r="http://schemas.openxmlformats.org/officeDocument/2006/relationships" xmlns:p="http://schemas.openxmlformats.org/presentationml/2006/main">
+  <p:cSld>
+    <p:spTree>
+      <p:nvGrpSpPr>
+        <p:cNvPr id="1" name=""/>
+        <p:cNvGrpSpPr/>
+        <p:nvPr/>
+      </p:nvGrpSpPr>
+      <p:grpSpPr>
+        <a:xfrm>
+          <a:off x="0" y="0"/>
+          <a:ext cx="0" cy="0"/>
+          <a:chOff x="0" y="0"/>
+          <a:chExt cx="0" cy="0"/>
+        </a:xfrm>
+      </p:grpSpPr>
+      <p:sp>
+        <p:nvSpPr>
+          <p:cNvPr id="2" name="Inhaltsplatzhalter 1">
+            <a:extLst>
+              <a:ext uri="{FF2B5EF4-FFF2-40B4-BE49-F238E27FC236}">
+                <a16:creationId xmlns:a16="http://schemas.microsoft.com/office/drawing/2014/main" id="{6E26EC24-DCB9-49CC-97AA-388A9CCC955A}"/>
+              </a:ext>
+            </a:extLst>
+          </p:cNvPr>
+          <p:cNvSpPr>
+            <a:spLocks noGrp="1"/>
+          </p:cNvSpPr>
+          <p:nvPr>
+            <p:ph idx="13"/>
+          </p:nvPr>
+        </p:nvSpPr>
+        <p:spPr/>
+        <p:txBody>
+          <a:bodyPr/>
+          <a:lstStyle/>
+          <a:p>
+            <a:endParaRPr lang="de-DE"/>
+          </a:p>
+        </p:txBody>
+      </p:sp>
+      <p:sp>
+        <p:nvSpPr>
+          <p:cNvPr id="3" name="Titel 2">
+            <a:extLst>
+              <a:ext uri="{FF2B5EF4-FFF2-40B4-BE49-F238E27FC236}">
+                <a16:creationId xmlns:a16="http://schemas.microsoft.com/office/drawing/2014/main" id="{8A45ABDE-05E6-491F-8743-C9967C75A841}"/>
+              </a:ext>
+            </a:extLst>
+          </p:cNvPr>
+          <p:cNvSpPr>
+            <a:spLocks noGrp="1"/>
+          </p:cNvSpPr>
+          <p:nvPr>
+            <p:ph type="title" idx="4294967295"/>
+          </p:nvPr>
+        </p:nvSpPr>
+        <p:spPr/>
+        <p:txBody>
+          <a:bodyPr/>
+          <a:lstStyle/>
+          <a:p>
+            <a:r>
+              <a:rPr lang="de-DE" dirty="0" err="1"/>
+              <a:t>Rebase</a:t>
+            </a:r>
+            <a:endParaRPr lang="de-DE" dirty="0"/>
+          </a:p>
+        </p:txBody>
+      </p:sp>
+    </p:spTree>
+    <p:extLst>
+      <p:ext uri="{BB962C8B-B14F-4D97-AF65-F5344CB8AC3E}">
+        <p14:creationId xmlns:p14="http://schemas.microsoft.com/office/powerpoint/2010/main" val="2987330994"/>
+      </p:ext>
+    </p:extLst>
+  </p:cSld>
+  <p:clrMapOvr>
+    <a:masterClrMapping/>
+  </p:clrMapOvr>
+</p:sld>
+</file>
+
+<file path=ppt/slides/slide19.xml><?xml version="1.0" encoding="utf-8"?>
+<p:sld xmlns:a="http://schemas.openxmlformats.org/drawingml/2006/main" xmlns:r="http://schemas.openxmlformats.org/officeDocument/2006/relationships" xmlns:p="http://schemas.openxmlformats.org/presentationml/2006/main">
+  <p:cSld>
+    <p:spTree>
+      <p:nvGrpSpPr>
+        <p:cNvPr id="1" name=""/>
+        <p:cNvGrpSpPr/>
+        <p:nvPr/>
+      </p:nvGrpSpPr>
+      <p:grpSpPr>
+        <a:xfrm>
+          <a:off x="0" y="0"/>
+          <a:ext cx="0" cy="0"/>
+          <a:chOff x="0" y="0"/>
+          <a:chExt cx="0" cy="0"/>
+        </a:xfrm>
+      </p:grpSpPr>
+      <p:sp>
+        <p:nvSpPr>
+          <p:cNvPr id="2" name="Inhaltsplatzhalter 1">
+            <a:extLst>
+              <a:ext uri="{FF2B5EF4-FFF2-40B4-BE49-F238E27FC236}">
+                <a16:creationId xmlns:a16="http://schemas.microsoft.com/office/drawing/2014/main" id="{7FF77909-50E0-45E3-BE71-AE434CB7D1B7}"/>
+              </a:ext>
+            </a:extLst>
+          </p:cNvPr>
+          <p:cNvSpPr>
+            <a:spLocks noGrp="1"/>
+          </p:cNvSpPr>
+          <p:nvPr>
+            <p:ph idx="13"/>
+          </p:nvPr>
+        </p:nvSpPr>
+        <p:spPr/>
+        <p:txBody>
+          <a:bodyPr/>
+          <a:lstStyle/>
+          <a:p>
+            <a:endParaRPr lang="de-DE"/>
+          </a:p>
+        </p:txBody>
+      </p:sp>
+      <p:sp>
+        <p:nvSpPr>
+          <p:cNvPr id="3" name="Titel 2">
+            <a:extLst>
+              <a:ext uri="{FF2B5EF4-FFF2-40B4-BE49-F238E27FC236}">
+                <a16:creationId xmlns:a16="http://schemas.microsoft.com/office/drawing/2014/main" id="{16441133-F5C1-426D-98D9-D316A3042F0D}"/>
+              </a:ext>
+            </a:extLst>
+          </p:cNvPr>
+          <p:cNvSpPr>
+            <a:spLocks noGrp="1"/>
+          </p:cNvSpPr>
+          <p:nvPr>
+            <p:ph type="title" idx="4294967295"/>
+          </p:nvPr>
+        </p:nvSpPr>
+        <p:spPr/>
+        <p:txBody>
+          <a:bodyPr/>
+          <a:lstStyle/>
+          <a:p>
+            <a:r>
+              <a:rPr lang="de-DE" dirty="0"/>
+              <a:t>Interaktiver </a:t>
+            </a:r>
+            <a:r>
+              <a:rPr lang="de-DE" dirty="0" err="1"/>
+              <a:t>Rebase</a:t>
+            </a:r>
+            <a:endParaRPr lang="de-DE" dirty="0"/>
+          </a:p>
+        </p:txBody>
+      </p:sp>
+    </p:spTree>
+    <p:extLst>
+      <p:ext uri="{BB962C8B-B14F-4D97-AF65-F5344CB8AC3E}">
+        <p14:creationId xmlns:p14="http://schemas.microsoft.com/office/powerpoint/2010/main" val="3549383510"/>
+      </p:ext>
+    </p:extLst>
+  </p:cSld>
+  <p:clrMapOvr>
+    <a:masterClrMapping/>
+  </p:clrMapOvr>
+</p:sld>
+</file>
+
+<file path=ppt/slides/slide2.xml><?xml version="1.0" encoding="utf-8"?>
+<p:sld xmlns:a="http://schemas.openxmlformats.org/drawingml/2006/main" xmlns:r="http://schemas.openxmlformats.org/officeDocument/2006/relationships" xmlns:p="http://schemas.openxmlformats.org/presentationml/2006/main">
+  <p:cSld>
+    <p:spTree>
+      <p:nvGrpSpPr>
+        <p:cNvPr id="1" name=""/>
+        <p:cNvGrpSpPr/>
+        <p:nvPr/>
+      </p:nvGrpSpPr>
+      <p:grpSpPr>
+        <a:xfrm>
+          <a:off x="0" y="0"/>
+          <a:ext cx="0" cy="0"/>
+          <a:chOff x="0" y="0"/>
+          <a:chExt cx="0" cy="0"/>
+        </a:xfrm>
+      </p:grpSpPr>
       <p:pic>
         <p:nvPicPr>
           <p:cNvPr id="7" name="Grafik 6">
@@ -3841,7 +5319,10 @@
           <a:lstStyle/>
           <a:p>
             <a:r>
-              <a:rPr lang="de-DE" sz="2600" dirty="0"/>
+              <a:rPr lang="de-DE" sz="2600" dirty="0">
+                <a:latin typeface="Arial" panose="020B0604020202020204" pitchFamily="34" charset="0"/>
+                <a:cs typeface="Arial" panose="020B0604020202020204" pitchFamily="34" charset="0"/>
+              </a:rPr>
               <a:t>Repository erstellen</a:t>
             </a:r>
           </a:p>
@@ -3944,7 +5425,7 @@
 </p:sld>
 </file>
 
-<file path=ppt/slides/slide2.xml><?xml version="1.0" encoding="utf-8"?>
+<file path=ppt/slides/slide20.xml><?xml version="1.0" encoding="utf-8"?>
 <p:sld xmlns:a="http://schemas.openxmlformats.org/drawingml/2006/main" xmlns:r="http://schemas.openxmlformats.org/officeDocument/2006/relationships" xmlns:p="http://schemas.openxmlformats.org/presentationml/2006/main">
   <p:cSld>
     <p:spTree>
@@ -3963,499 +5444,775 @@
       </p:grpSpPr>
       <p:sp>
         <p:nvSpPr>
-          <p:cNvPr id="3" name="Inhaltsplatzhalter 2">
-            <a:extLst>
-              <a:ext uri="{FF2B5EF4-FFF2-40B4-BE49-F238E27FC236}">
-                <a16:creationId xmlns:a16="http://schemas.microsoft.com/office/drawing/2014/main" id="{BA550CEE-E433-4CF3-98B1-3DF82889D543}"/>
-              </a:ext>
-            </a:extLst>
-          </p:cNvPr>
-          <p:cNvSpPr>
-            <a:spLocks noGrp="1"/>
-          </p:cNvSpPr>
-          <p:nvPr>
-            <p:ph idx="13"/>
-          </p:nvPr>
-        </p:nvSpPr>
-        <p:spPr/>
-        <p:txBody>
-          <a:bodyPr>
-            <a:normAutofit/>
-          </a:bodyPr>
-          <a:lstStyle/>
-          <a:p>
-            <a:r>
-              <a:rPr lang="de-DE" sz="2000" dirty="0">
-                <a:latin typeface="Arial" panose="020B0604020202020204" pitchFamily="34" charset="0"/>
-                <a:cs typeface="Arial" panose="020B0604020202020204" pitchFamily="34" charset="0"/>
-              </a:rPr>
-              <a:t>Wird mit Kommando </a:t>
-            </a:r>
-            <a:r>
-              <a:rPr lang="de-DE" sz="2000" b="1" i="1" dirty="0" err="1">
-                <a:latin typeface="Arial" panose="020B0604020202020204" pitchFamily="34" charset="0"/>
-                <a:cs typeface="Arial" panose="020B0604020202020204" pitchFamily="34" charset="0"/>
-              </a:rPr>
-              <a:t>apt-get</a:t>
-            </a:r>
-            <a:r>
-              <a:rPr lang="de-DE" sz="2000" b="1" i="1" dirty="0">
-                <a:latin typeface="Arial" panose="020B0604020202020204" pitchFamily="34" charset="0"/>
-                <a:cs typeface="Arial" panose="020B0604020202020204" pitchFamily="34" charset="0"/>
-              </a:rPr>
-              <a:t> </a:t>
-            </a:r>
-            <a:r>
-              <a:rPr lang="de-DE" sz="2000" dirty="0">
-                <a:latin typeface="Arial" panose="020B0604020202020204" pitchFamily="34" charset="0"/>
-                <a:cs typeface="Arial" panose="020B0604020202020204" pitchFamily="34" charset="0"/>
-              </a:rPr>
-              <a:t>heruntergeladen und installiert</a:t>
-            </a:r>
-          </a:p>
-          <a:p>
-            <a:pPr lvl="1"/>
-            <a:r>
-              <a:rPr lang="de-DE" sz="1600" dirty="0">
-                <a:latin typeface="Arial" panose="020B0604020202020204" pitchFamily="34" charset="0"/>
-                <a:cs typeface="Arial" panose="020B0604020202020204" pitchFamily="34" charset="0"/>
-              </a:rPr>
-              <a:t>Zuerst müssen Referenzen erneuert werden</a:t>
-            </a:r>
-          </a:p>
-          <a:p>
-            <a:pPr marL="457200" lvl="1" indent="0">
-              <a:buNone/>
-            </a:pPr>
-            <a:r>
-              <a:rPr lang="de-DE" sz="1600" dirty="0">
-                <a:latin typeface="Arial" panose="020B0604020202020204" pitchFamily="34" charset="0"/>
-                <a:cs typeface="Arial" panose="020B0604020202020204" pitchFamily="34" charset="0"/>
-              </a:rPr>
-              <a:t>	Kommando: </a:t>
-            </a:r>
-            <a:r>
-              <a:rPr lang="de-DE" sz="1600" b="1" i="1" dirty="0" err="1">
-                <a:latin typeface="Arial" panose="020B0604020202020204" pitchFamily="34" charset="0"/>
-                <a:cs typeface="Arial" panose="020B0604020202020204" pitchFamily="34" charset="0"/>
-              </a:rPr>
-              <a:t>sudo</a:t>
-            </a:r>
-            <a:r>
-              <a:rPr lang="de-DE" sz="1600" b="1" i="1" dirty="0">
-                <a:latin typeface="Arial" panose="020B0604020202020204" pitchFamily="34" charset="0"/>
-                <a:cs typeface="Arial" panose="020B0604020202020204" pitchFamily="34" charset="0"/>
-              </a:rPr>
-              <a:t> </a:t>
-            </a:r>
-            <a:r>
-              <a:rPr lang="de-DE" sz="1600" b="1" i="1" dirty="0" err="1">
-                <a:latin typeface="Arial" panose="020B0604020202020204" pitchFamily="34" charset="0"/>
-                <a:cs typeface="Arial" panose="020B0604020202020204" pitchFamily="34" charset="0"/>
-              </a:rPr>
-              <a:t>apt-get</a:t>
-            </a:r>
-            <a:r>
-              <a:rPr lang="de-DE" sz="1600" b="1" i="1" dirty="0">
-                <a:latin typeface="Arial" panose="020B0604020202020204" pitchFamily="34" charset="0"/>
-                <a:cs typeface="Arial" panose="020B0604020202020204" pitchFamily="34" charset="0"/>
-              </a:rPr>
-              <a:t> update</a:t>
-            </a:r>
-          </a:p>
-          <a:p>
-            <a:pPr lvl="1"/>
-            <a:r>
-              <a:rPr lang="de-DE" sz="1600" dirty="0">
-                <a:latin typeface="Arial" panose="020B0604020202020204" pitchFamily="34" charset="0"/>
-                <a:cs typeface="Arial" panose="020B0604020202020204" pitchFamily="34" charset="0"/>
-              </a:rPr>
-              <a:t>Danach kann </a:t>
-            </a:r>
-            <a:r>
-              <a:rPr lang="de-DE" sz="1600" dirty="0" err="1">
-                <a:latin typeface="Arial" panose="020B0604020202020204" pitchFamily="34" charset="0"/>
-                <a:cs typeface="Arial" panose="020B0604020202020204" pitchFamily="34" charset="0"/>
-              </a:rPr>
-              <a:t>Git</a:t>
-            </a:r>
-            <a:r>
-              <a:rPr lang="de-DE" sz="1600" dirty="0">
-                <a:latin typeface="Arial" panose="020B0604020202020204" pitchFamily="34" charset="0"/>
-                <a:cs typeface="Arial" panose="020B0604020202020204" pitchFamily="34" charset="0"/>
-              </a:rPr>
-              <a:t> installiert werden</a:t>
-            </a:r>
-          </a:p>
-          <a:p>
-            <a:pPr marL="457200" lvl="1" indent="0">
-              <a:buNone/>
-            </a:pPr>
-            <a:r>
-              <a:rPr lang="de-DE" sz="1600" dirty="0">
-                <a:latin typeface="Arial" panose="020B0604020202020204" pitchFamily="34" charset="0"/>
-                <a:cs typeface="Arial" panose="020B0604020202020204" pitchFamily="34" charset="0"/>
-              </a:rPr>
-              <a:t>	Kommando: </a:t>
-            </a:r>
-            <a:r>
-              <a:rPr lang="de-DE" sz="1600" b="1" i="1" dirty="0" err="1">
-                <a:latin typeface="Arial" panose="020B0604020202020204" pitchFamily="34" charset="0"/>
-                <a:cs typeface="Arial" panose="020B0604020202020204" pitchFamily="34" charset="0"/>
-              </a:rPr>
-              <a:t>sudo</a:t>
-            </a:r>
-            <a:r>
-              <a:rPr lang="de-DE" sz="1600" b="1" i="1" dirty="0">
-                <a:latin typeface="Arial" panose="020B0604020202020204" pitchFamily="34" charset="0"/>
-                <a:cs typeface="Arial" panose="020B0604020202020204" pitchFamily="34" charset="0"/>
-              </a:rPr>
-              <a:t> </a:t>
-            </a:r>
-            <a:r>
-              <a:rPr lang="de-DE" sz="1600" b="1" i="1" dirty="0" err="1">
-                <a:latin typeface="Arial" panose="020B0604020202020204" pitchFamily="34" charset="0"/>
-                <a:cs typeface="Arial" panose="020B0604020202020204" pitchFamily="34" charset="0"/>
-              </a:rPr>
-              <a:t>apt-get</a:t>
-            </a:r>
-            <a:r>
-              <a:rPr lang="de-DE" sz="1600" b="1" i="1" dirty="0">
-                <a:latin typeface="Arial" panose="020B0604020202020204" pitchFamily="34" charset="0"/>
-                <a:cs typeface="Arial" panose="020B0604020202020204" pitchFamily="34" charset="0"/>
-              </a:rPr>
-              <a:t> </a:t>
-            </a:r>
-            <a:r>
-              <a:rPr lang="de-DE" sz="1600" b="1" i="1" dirty="0" err="1">
-                <a:latin typeface="Arial" panose="020B0604020202020204" pitchFamily="34" charset="0"/>
-                <a:cs typeface="Arial" panose="020B0604020202020204" pitchFamily="34" charset="0"/>
-              </a:rPr>
-              <a:t>install</a:t>
-            </a:r>
-            <a:r>
-              <a:rPr lang="de-DE" sz="1600" b="1" i="1" dirty="0">
-                <a:latin typeface="Arial" panose="020B0604020202020204" pitchFamily="34" charset="0"/>
-                <a:cs typeface="Arial" panose="020B0604020202020204" pitchFamily="34" charset="0"/>
-              </a:rPr>
-              <a:t> </a:t>
-            </a:r>
-            <a:r>
-              <a:rPr lang="de-DE" sz="1600" b="1" i="1" dirty="0" err="1">
-                <a:latin typeface="Arial" panose="020B0604020202020204" pitchFamily="34" charset="0"/>
-                <a:cs typeface="Arial" panose="020B0604020202020204" pitchFamily="34" charset="0"/>
-              </a:rPr>
-              <a:t>git</a:t>
-            </a:r>
-            <a:endParaRPr lang="de-DE" sz="1200" b="1" i="1" dirty="0">
-              <a:latin typeface="Arial" panose="020B0604020202020204" pitchFamily="34" charset="0"/>
-              <a:cs typeface="Arial" panose="020B0604020202020204" pitchFamily="34" charset="0"/>
-            </a:endParaRPr>
-          </a:p>
-          <a:p>
-            <a:pPr marL="914400" lvl="2" indent="0">
-              <a:buNone/>
-            </a:pPr>
-            <a:endParaRPr lang="de-DE" sz="1200" dirty="0">
-              <a:latin typeface="Arial" panose="020B0604020202020204" pitchFamily="34" charset="0"/>
-              <a:cs typeface="Arial" panose="020B0604020202020204" pitchFamily="34" charset="0"/>
-            </a:endParaRPr>
-          </a:p>
-          <a:p>
-            <a:endParaRPr lang="de-DE" sz="2000" dirty="0">
-              <a:latin typeface="Arial" panose="020B0604020202020204" pitchFamily="34" charset="0"/>
-              <a:cs typeface="Arial" panose="020B0604020202020204" pitchFamily="34" charset="0"/>
-            </a:endParaRPr>
-          </a:p>
-          <a:p>
-            <a:endParaRPr lang="de-DE" sz="2000" dirty="0">
-              <a:latin typeface="Arial" panose="020B0604020202020204" pitchFamily="34" charset="0"/>
-              <a:cs typeface="Arial" panose="020B0604020202020204" pitchFamily="34" charset="0"/>
-            </a:endParaRPr>
-          </a:p>
-          <a:p>
-            <a:endParaRPr lang="de-DE" sz="2000" dirty="0">
-              <a:latin typeface="Arial" panose="020B0604020202020204" pitchFamily="34" charset="0"/>
-              <a:cs typeface="Arial" panose="020B0604020202020204" pitchFamily="34" charset="0"/>
-            </a:endParaRPr>
-          </a:p>
-          <a:p>
-            <a:endParaRPr lang="de-DE" sz="2000" dirty="0">
-              <a:latin typeface="Arial" panose="020B0604020202020204" pitchFamily="34" charset="0"/>
-              <a:cs typeface="Arial" panose="020B0604020202020204" pitchFamily="34" charset="0"/>
-            </a:endParaRPr>
-          </a:p>
-          <a:p>
-            <a:endParaRPr lang="de-DE" sz="2000" dirty="0">
-              <a:latin typeface="Arial" panose="020B0604020202020204" pitchFamily="34" charset="0"/>
-              <a:cs typeface="Arial" panose="020B0604020202020204" pitchFamily="34" charset="0"/>
-            </a:endParaRPr>
-          </a:p>
-          <a:p>
-            <a:endParaRPr lang="de-DE" sz="2000" dirty="0">
-              <a:latin typeface="Arial" panose="020B0604020202020204" pitchFamily="34" charset="0"/>
-              <a:cs typeface="Arial" panose="020B0604020202020204" pitchFamily="34" charset="0"/>
-            </a:endParaRPr>
-          </a:p>
-          <a:p>
-            <a:pPr lvl="1"/>
-            <a:endParaRPr lang="de-DE" sz="2000" dirty="0">
-              <a:latin typeface="Arial" panose="020B0604020202020204" pitchFamily="34" charset="0"/>
-              <a:cs typeface="Arial" panose="020B0604020202020204" pitchFamily="34" charset="0"/>
-            </a:endParaRPr>
-          </a:p>
-        </p:txBody>
-      </p:sp>
-      <p:sp>
-        <p:nvSpPr>
           <p:cNvPr id="2" name="Titel 1">
             <a:extLst>
               <a:ext uri="{FF2B5EF4-FFF2-40B4-BE49-F238E27FC236}">
-                <a16:creationId xmlns:a16="http://schemas.microsoft.com/office/drawing/2014/main" id="{BE9BD52A-10D4-4170-A998-31F963D2F9BB}"/>
-              </a:ext>
-            </a:extLst>
-          </p:cNvPr>
-          <p:cNvSpPr>
-            <a:spLocks noGrp="1"/>
-          </p:cNvSpPr>
-          <p:nvPr>
-            <p:ph type="title" idx="4294967295"/>
-          </p:nvPr>
-        </p:nvSpPr>
-        <p:spPr/>
-        <p:txBody>
-          <a:bodyPr>
-            <a:normAutofit/>
-          </a:bodyPr>
-          <a:lstStyle/>
-          <a:p>
-            <a:r>
-              <a:rPr lang="de-DE" sz="2400" b="1" dirty="0">
-                <a:latin typeface="Arial" panose="020B0604020202020204" pitchFamily="34" charset="0"/>
-                <a:cs typeface="Arial" panose="020B0604020202020204" pitchFamily="34" charset="0"/>
-              </a:rPr>
-              <a:t>Installation unter Linux</a:t>
-            </a:r>
-          </a:p>
-        </p:txBody>
-      </p:sp>
-      <p:sp>
-        <p:nvSpPr>
-          <p:cNvPr id="4" name="Datumsplatzhalter 3">
-            <a:extLst>
-              <a:ext uri="{FF2B5EF4-FFF2-40B4-BE49-F238E27FC236}">
-                <a16:creationId xmlns:a16="http://schemas.microsoft.com/office/drawing/2014/main" id="{EDAA1497-5C4E-4F1B-A045-74E2D153CB91}"/>
-              </a:ext>
-            </a:extLst>
-          </p:cNvPr>
-          <p:cNvSpPr>
-            <a:spLocks noGrp="1"/>
-          </p:cNvSpPr>
-          <p:nvPr>
-            <p:ph type="dt" sz="half" idx="4294967295"/>
-          </p:nvPr>
-        </p:nvSpPr>
-        <p:spPr>
-          <a:xfrm>
-            <a:off x="7086600" y="6356350"/>
-            <a:ext cx="2057400" cy="365125"/>
-          </a:xfrm>
-        </p:spPr>
-        <p:txBody>
-          <a:bodyPr/>
-          <a:lstStyle/>
-          <a:p>
-            <a:fld id="{6F7941D6-DDCD-4FEB-B76A-6EA7C7E1DF91}" type="datetime1">
-              <a:rPr lang="de-DE" smtClean="0"/>
-              <a:t>06.03.2020</a:t>
-            </a:fld>
-            <a:endParaRPr lang="de-DE" dirty="0"/>
-          </a:p>
-        </p:txBody>
-      </p:sp>
-      <p:sp>
-        <p:nvSpPr>
-          <p:cNvPr id="5" name="Fußzeilenplatzhalter 4">
-            <a:extLst>
-              <a:ext uri="{FF2B5EF4-FFF2-40B4-BE49-F238E27FC236}">
-                <a16:creationId xmlns:a16="http://schemas.microsoft.com/office/drawing/2014/main" id="{C59CBE4D-CD6A-43CD-B5F7-D0456D90B39E}"/>
-              </a:ext>
-            </a:extLst>
-          </p:cNvPr>
-          <p:cNvSpPr>
-            <a:spLocks noGrp="1"/>
-          </p:cNvSpPr>
-          <p:nvPr>
-            <p:ph type="ftr" sz="quarter" idx="4294967295"/>
-          </p:nvPr>
-        </p:nvSpPr>
-        <p:spPr>
-          <a:xfrm>
-            <a:off x="0" y="6356350"/>
-            <a:ext cx="3698875" cy="365125"/>
-          </a:xfrm>
-        </p:spPr>
-        <p:txBody>
-          <a:bodyPr/>
-          <a:lstStyle/>
-          <a:p>
-            <a:r>
-              <a:rPr lang="de-DE" dirty="0" err="1"/>
-              <a:t>Git</a:t>
-            </a:r>
+                <a16:creationId xmlns:a16="http://schemas.microsoft.com/office/drawing/2014/main" id="{CCCDBB22-8924-47F0-9F4F-D7DC111593FD}"/>
+              </a:ext>
+            </a:extLst>
+          </p:cNvPr>
+          <p:cNvSpPr>
+            <a:spLocks noGrp="1"/>
+          </p:cNvSpPr>
+          <p:nvPr>
+            <p:ph type="title"/>
+          </p:nvPr>
+        </p:nvSpPr>
+        <p:spPr/>
+        <p:txBody>
+          <a:bodyPr/>
+          <a:lstStyle/>
+          <a:p>
             <a:r>
               <a:rPr lang="de-DE" dirty="0"/>
-              <a:t> Tutorial</a:t>
-            </a:r>
-          </a:p>
-        </p:txBody>
-      </p:sp>
-      <p:sp>
-        <p:nvSpPr>
-          <p:cNvPr id="6" name="Foliennummernplatzhalter 5">
-            <a:extLst>
-              <a:ext uri="{FF2B5EF4-FFF2-40B4-BE49-F238E27FC236}">
-                <a16:creationId xmlns:a16="http://schemas.microsoft.com/office/drawing/2014/main" id="{B84F1831-59D5-4145-B6B9-A1613CE4A1A9}"/>
-              </a:ext>
-            </a:extLst>
-          </p:cNvPr>
-          <p:cNvSpPr>
-            <a:spLocks noGrp="1"/>
-          </p:cNvSpPr>
-          <p:nvPr>
-            <p:ph type="sldNum" sz="quarter" idx="4294967295"/>
-          </p:nvPr>
-        </p:nvSpPr>
-        <p:spPr>
-          <a:xfrm>
-            <a:off x="0" y="6356350"/>
-            <a:ext cx="2057400" cy="365125"/>
-          </a:xfrm>
-        </p:spPr>
-        <p:txBody>
-          <a:bodyPr/>
-          <a:lstStyle/>
-          <a:p>
-            <a:pPr algn="ctr"/>
-            <a:fld id="{6F94D85D-A331-4F90-A37B-3680A0933E4F}" type="slidenum">
-              <a:rPr lang="de-DE" smtClean="0"/>
-              <a:pPr algn="ctr"/>
-              <a:t>2</a:t>
-            </a:fld>
-            <a:endParaRPr lang="de-DE" dirty="0"/>
-          </a:p>
-        </p:txBody>
-      </p:sp>
-      <p:cxnSp>
-        <p:nvCxnSpPr>
-          <p:cNvPr id="8" name="Gerader Verbinder 7">
-            <a:extLst>
-              <a:ext uri="{FF2B5EF4-FFF2-40B4-BE49-F238E27FC236}">
-                <a16:creationId xmlns:a16="http://schemas.microsoft.com/office/drawing/2014/main" id="{7E8F2A84-19B8-4826-B3AD-6F16601D7885}"/>
-              </a:ext>
-            </a:extLst>
-          </p:cNvPr>
-          <p:cNvCxnSpPr>
-            <a:cxnSpLocks/>
-          </p:cNvCxnSpPr>
-          <p:nvPr/>
-        </p:nvCxnSpPr>
-        <p:spPr>
-          <a:xfrm>
-            <a:off x="628650" y="6353847"/>
-            <a:ext cx="7886700" cy="0"/>
-          </a:xfrm>
-          <a:prstGeom prst="line">
-            <a:avLst/>
-          </a:prstGeom>
-        </p:spPr>
-        <p:style>
-          <a:lnRef idx="1">
-            <a:schemeClr val="dk1"/>
-          </a:lnRef>
-          <a:fillRef idx="0">
-            <a:schemeClr val="dk1"/>
-          </a:fillRef>
-          <a:effectRef idx="0">
-            <a:schemeClr val="dk1"/>
-          </a:effectRef>
-          <a:fontRef idx="minor">
-            <a:schemeClr val="tx1"/>
-          </a:fontRef>
-        </p:style>
-      </p:cxnSp>
-      <p:pic>
-        <p:nvPicPr>
-          <p:cNvPr id="10" name="Grafik 9">
-            <a:extLst>
-              <a:ext uri="{FF2B5EF4-FFF2-40B4-BE49-F238E27FC236}">
-                <a16:creationId xmlns:a16="http://schemas.microsoft.com/office/drawing/2014/main" id="{7A6261ED-119B-40E9-A877-9DF5FF1D43F4}"/>
-              </a:ext>
-            </a:extLst>
-          </p:cNvPr>
-          <p:cNvPicPr>
-            <a:picLocks noChangeAspect="1"/>
-          </p:cNvPicPr>
-          <p:nvPr/>
-        </p:nvPicPr>
-        <p:blipFill>
-          <a:blip r:embed="rId2"/>
-          <a:stretch>
-            <a:fillRect/>
-          </a:stretch>
-        </p:blipFill>
-        <p:spPr>
-          <a:xfrm>
-            <a:off x="7370059" y="6363613"/>
-            <a:ext cx="960209" cy="314098"/>
-          </a:xfrm>
-          <a:prstGeom prst="rect">
-            <a:avLst/>
-          </a:prstGeom>
-        </p:spPr>
-      </p:pic>
-      <p:cxnSp>
-        <p:nvCxnSpPr>
-          <p:cNvPr id="13" name="Gerader Verbinder 12">
-            <a:extLst>
-              <a:ext uri="{FF2B5EF4-FFF2-40B4-BE49-F238E27FC236}">
-                <a16:creationId xmlns:a16="http://schemas.microsoft.com/office/drawing/2014/main" id="{F9DA0021-3FCA-4721-AD9E-DF15B2F3591D}"/>
-              </a:ext>
-            </a:extLst>
-          </p:cNvPr>
-          <p:cNvCxnSpPr>
-            <a:cxnSpLocks/>
-          </p:cNvCxnSpPr>
-          <p:nvPr/>
-        </p:nvCxnSpPr>
-        <p:spPr>
-          <a:xfrm>
-            <a:off x="628650" y="993703"/>
-            <a:ext cx="7886700" cy="0"/>
-          </a:xfrm>
-          <a:prstGeom prst="line">
-            <a:avLst/>
-          </a:prstGeom>
-        </p:spPr>
-        <p:style>
-          <a:lnRef idx="1">
-            <a:schemeClr val="dk1"/>
-          </a:lnRef>
-          <a:fillRef idx="0">
-            <a:schemeClr val="dk1"/>
-          </a:fillRef>
-          <a:effectRef idx="0">
-            <a:schemeClr val="dk1"/>
-          </a:effectRef>
-          <a:fontRef idx="minor">
-            <a:schemeClr val="tx1"/>
-          </a:fontRef>
-        </p:style>
-      </p:cxnSp>
+              <a:t>Synchronisierung</a:t>
+            </a:r>
+          </a:p>
+        </p:txBody>
+      </p:sp>
     </p:spTree>
     <p:extLst>
       <p:ext uri="{BB962C8B-B14F-4D97-AF65-F5344CB8AC3E}">
-        <p14:creationId xmlns:p14="http://schemas.microsoft.com/office/powerpoint/2010/main" val="1628561704"/>
+        <p14:creationId xmlns:p14="http://schemas.microsoft.com/office/powerpoint/2010/main" val="226461054"/>
+      </p:ext>
+    </p:extLst>
+  </p:cSld>
+  <p:clrMapOvr>
+    <a:masterClrMapping/>
+  </p:clrMapOvr>
+</p:sld>
+</file>
+
+<file path=ppt/slides/slide21.xml><?xml version="1.0" encoding="utf-8"?>
+<p:sld xmlns:a="http://schemas.openxmlformats.org/drawingml/2006/main" xmlns:r="http://schemas.openxmlformats.org/officeDocument/2006/relationships" xmlns:p="http://schemas.openxmlformats.org/presentationml/2006/main">
+  <p:cSld>
+    <p:spTree>
+      <p:nvGrpSpPr>
+        <p:cNvPr id="1" name=""/>
+        <p:cNvGrpSpPr/>
+        <p:nvPr/>
+      </p:nvGrpSpPr>
+      <p:grpSpPr>
+        <a:xfrm>
+          <a:off x="0" y="0"/>
+          <a:ext cx="0" cy="0"/>
+          <a:chOff x="0" y="0"/>
+          <a:chExt cx="0" cy="0"/>
+        </a:xfrm>
+      </p:grpSpPr>
+      <p:sp>
+        <p:nvSpPr>
+          <p:cNvPr id="2" name="Inhaltsplatzhalter 1">
+            <a:extLst>
+              <a:ext uri="{FF2B5EF4-FFF2-40B4-BE49-F238E27FC236}">
+                <a16:creationId xmlns:a16="http://schemas.microsoft.com/office/drawing/2014/main" id="{CEC22E4B-EC65-4812-A4E9-8A4D591056B1}"/>
+              </a:ext>
+            </a:extLst>
+          </p:cNvPr>
+          <p:cNvSpPr>
+            <a:spLocks noGrp="1"/>
+          </p:cNvSpPr>
+          <p:nvPr>
+            <p:ph idx="13"/>
+          </p:nvPr>
+        </p:nvSpPr>
+        <p:spPr/>
+        <p:txBody>
+          <a:bodyPr/>
+          <a:lstStyle/>
+          <a:p>
+            <a:endParaRPr lang="de-DE"/>
+          </a:p>
+        </p:txBody>
+      </p:sp>
+      <p:sp>
+        <p:nvSpPr>
+          <p:cNvPr id="3" name="Titel 2">
+            <a:extLst>
+              <a:ext uri="{FF2B5EF4-FFF2-40B4-BE49-F238E27FC236}">
+                <a16:creationId xmlns:a16="http://schemas.microsoft.com/office/drawing/2014/main" id="{01B0FFCB-5ED6-41B3-853D-B50AAF600C26}"/>
+              </a:ext>
+            </a:extLst>
+          </p:cNvPr>
+          <p:cNvSpPr>
+            <a:spLocks noGrp="1"/>
+          </p:cNvSpPr>
+          <p:nvPr>
+            <p:ph type="title" idx="4294967295"/>
+          </p:nvPr>
+        </p:nvSpPr>
+        <p:spPr/>
+        <p:txBody>
+          <a:bodyPr/>
+          <a:lstStyle/>
+          <a:p>
+            <a:r>
+              <a:rPr lang="de-DE" dirty="0"/>
+              <a:t>Referenzarchiv</a:t>
+            </a:r>
+          </a:p>
+        </p:txBody>
+      </p:sp>
+    </p:spTree>
+    <p:extLst>
+      <p:ext uri="{BB962C8B-B14F-4D97-AF65-F5344CB8AC3E}">
+        <p14:creationId xmlns:p14="http://schemas.microsoft.com/office/powerpoint/2010/main" val="3659548600"/>
+      </p:ext>
+    </p:extLst>
+  </p:cSld>
+  <p:clrMapOvr>
+    <a:masterClrMapping/>
+  </p:clrMapOvr>
+</p:sld>
+</file>
+
+<file path=ppt/slides/slide22.xml><?xml version="1.0" encoding="utf-8"?>
+<p:sld xmlns:a="http://schemas.openxmlformats.org/drawingml/2006/main" xmlns:r="http://schemas.openxmlformats.org/officeDocument/2006/relationships" xmlns:p="http://schemas.openxmlformats.org/presentationml/2006/main">
+  <p:cSld>
+    <p:spTree>
+      <p:nvGrpSpPr>
+        <p:cNvPr id="1" name=""/>
+        <p:cNvGrpSpPr/>
+        <p:nvPr/>
+      </p:nvGrpSpPr>
+      <p:grpSpPr>
+        <a:xfrm>
+          <a:off x="0" y="0"/>
+          <a:ext cx="0" cy="0"/>
+          <a:chOff x="0" y="0"/>
+          <a:chExt cx="0" cy="0"/>
+        </a:xfrm>
+      </p:grpSpPr>
+      <p:sp>
+        <p:nvSpPr>
+          <p:cNvPr id="2" name="Inhaltsplatzhalter 1">
+            <a:extLst>
+              <a:ext uri="{FF2B5EF4-FFF2-40B4-BE49-F238E27FC236}">
+                <a16:creationId xmlns:a16="http://schemas.microsoft.com/office/drawing/2014/main" id="{FC823A1E-2C7C-4A62-A6B1-3B81326E50E8}"/>
+              </a:ext>
+            </a:extLst>
+          </p:cNvPr>
+          <p:cNvSpPr>
+            <a:spLocks noGrp="1"/>
+          </p:cNvSpPr>
+          <p:nvPr>
+            <p:ph idx="13"/>
+          </p:nvPr>
+        </p:nvSpPr>
+        <p:spPr/>
+        <p:txBody>
+          <a:bodyPr/>
+          <a:lstStyle/>
+          <a:p>
+            <a:endParaRPr lang="de-DE"/>
+          </a:p>
+        </p:txBody>
+      </p:sp>
+      <p:sp>
+        <p:nvSpPr>
+          <p:cNvPr id="3" name="Titel 2">
+            <a:extLst>
+              <a:ext uri="{FF2B5EF4-FFF2-40B4-BE49-F238E27FC236}">
+                <a16:creationId xmlns:a16="http://schemas.microsoft.com/office/drawing/2014/main" id="{464AB558-9021-456D-A794-9A19A1E3EBA5}"/>
+              </a:ext>
+            </a:extLst>
+          </p:cNvPr>
+          <p:cNvSpPr>
+            <a:spLocks noGrp="1"/>
+          </p:cNvSpPr>
+          <p:nvPr>
+            <p:ph type="title" idx="4294967295"/>
+          </p:nvPr>
+        </p:nvSpPr>
+        <p:spPr/>
+        <p:txBody>
+          <a:bodyPr/>
+          <a:lstStyle/>
+          <a:p>
+            <a:r>
+              <a:rPr lang="de-DE" dirty="0"/>
+              <a:t>Push </a:t>
+            </a:r>
+            <a:r>
+              <a:rPr lang="de-DE" dirty="0" err="1"/>
+              <a:t>fetch</a:t>
+            </a:r>
+            <a:endParaRPr lang="de-DE" dirty="0"/>
+          </a:p>
+        </p:txBody>
+      </p:sp>
+    </p:spTree>
+    <p:extLst>
+      <p:ext uri="{BB962C8B-B14F-4D97-AF65-F5344CB8AC3E}">
+        <p14:creationId xmlns:p14="http://schemas.microsoft.com/office/powerpoint/2010/main" val="1883800244"/>
+      </p:ext>
+    </p:extLst>
+  </p:cSld>
+  <p:clrMapOvr>
+    <a:masterClrMapping/>
+  </p:clrMapOvr>
+</p:sld>
+</file>
+
+<file path=ppt/slides/slide23.xml><?xml version="1.0" encoding="utf-8"?>
+<p:sld xmlns:a="http://schemas.openxmlformats.org/drawingml/2006/main" xmlns:r="http://schemas.openxmlformats.org/officeDocument/2006/relationships" xmlns:p="http://schemas.openxmlformats.org/presentationml/2006/main">
+  <p:cSld>
+    <p:spTree>
+      <p:nvGrpSpPr>
+        <p:cNvPr id="1" name=""/>
+        <p:cNvGrpSpPr/>
+        <p:nvPr/>
+      </p:nvGrpSpPr>
+      <p:grpSpPr>
+        <a:xfrm>
+          <a:off x="0" y="0"/>
+          <a:ext cx="0" cy="0"/>
+          <a:chOff x="0" y="0"/>
+          <a:chExt cx="0" cy="0"/>
+        </a:xfrm>
+      </p:grpSpPr>
+      <p:sp>
+        <p:nvSpPr>
+          <p:cNvPr id="2" name="Inhaltsplatzhalter 1">
+            <a:extLst>
+              <a:ext uri="{FF2B5EF4-FFF2-40B4-BE49-F238E27FC236}">
+                <a16:creationId xmlns:a16="http://schemas.microsoft.com/office/drawing/2014/main" id="{ACD5B02C-91A3-4440-AAED-9A93E394E93C}"/>
+              </a:ext>
+            </a:extLst>
+          </p:cNvPr>
+          <p:cNvSpPr>
+            <a:spLocks noGrp="1"/>
+          </p:cNvSpPr>
+          <p:nvPr>
+            <p:ph idx="13"/>
+          </p:nvPr>
+        </p:nvSpPr>
+        <p:spPr/>
+        <p:txBody>
+          <a:bodyPr/>
+          <a:lstStyle/>
+          <a:p>
+            <a:endParaRPr lang="de-DE"/>
+          </a:p>
+        </p:txBody>
+      </p:sp>
+      <p:sp>
+        <p:nvSpPr>
+          <p:cNvPr id="3" name="Titel 2">
+            <a:extLst>
+              <a:ext uri="{FF2B5EF4-FFF2-40B4-BE49-F238E27FC236}">
+                <a16:creationId xmlns:a16="http://schemas.microsoft.com/office/drawing/2014/main" id="{2894306C-BD41-4925-9236-4DE81AE928D0}"/>
+              </a:ext>
+            </a:extLst>
+          </p:cNvPr>
+          <p:cNvSpPr>
+            <a:spLocks noGrp="1"/>
+          </p:cNvSpPr>
+          <p:nvPr>
+            <p:ph type="title" idx="4294967295"/>
+          </p:nvPr>
+        </p:nvSpPr>
+        <p:spPr/>
+        <p:txBody>
+          <a:bodyPr/>
+          <a:lstStyle/>
+          <a:p>
+            <a:r>
+              <a:rPr lang="de-DE" dirty="0"/>
+              <a:t>Pull</a:t>
+            </a:r>
+          </a:p>
+        </p:txBody>
+      </p:sp>
+    </p:spTree>
+    <p:extLst>
+      <p:ext uri="{BB962C8B-B14F-4D97-AF65-F5344CB8AC3E}">
+        <p14:creationId xmlns:p14="http://schemas.microsoft.com/office/powerpoint/2010/main" val="4273179020"/>
+      </p:ext>
+    </p:extLst>
+  </p:cSld>
+  <p:clrMapOvr>
+    <a:masterClrMapping/>
+  </p:clrMapOvr>
+</p:sld>
+</file>
+
+<file path=ppt/slides/slide24.xml><?xml version="1.0" encoding="utf-8"?>
+<p:sld xmlns:a="http://schemas.openxmlformats.org/drawingml/2006/main" xmlns:r="http://schemas.openxmlformats.org/officeDocument/2006/relationships" xmlns:p="http://schemas.openxmlformats.org/presentationml/2006/main">
+  <p:cSld>
+    <p:spTree>
+      <p:nvGrpSpPr>
+        <p:cNvPr id="1" name=""/>
+        <p:cNvGrpSpPr/>
+        <p:nvPr/>
+      </p:nvGrpSpPr>
+      <p:grpSpPr>
+        <a:xfrm>
+          <a:off x="0" y="0"/>
+          <a:ext cx="0" cy="0"/>
+          <a:chOff x="0" y="0"/>
+          <a:chExt cx="0" cy="0"/>
+        </a:xfrm>
+      </p:grpSpPr>
+      <p:sp>
+        <p:nvSpPr>
+          <p:cNvPr id="2" name="Titel 1">
+            <a:extLst>
+              <a:ext uri="{FF2B5EF4-FFF2-40B4-BE49-F238E27FC236}">
+                <a16:creationId xmlns:a16="http://schemas.microsoft.com/office/drawing/2014/main" id="{A34F81EC-189A-428F-899D-40A591FE7106}"/>
+              </a:ext>
+            </a:extLst>
+          </p:cNvPr>
+          <p:cNvSpPr>
+            <a:spLocks noGrp="1"/>
+          </p:cNvSpPr>
+          <p:nvPr>
+            <p:ph type="title"/>
+          </p:nvPr>
+        </p:nvSpPr>
+        <p:spPr/>
+        <p:txBody>
+          <a:bodyPr/>
+          <a:lstStyle/>
+          <a:p>
+            <a:endParaRPr lang="de-DE" dirty="0"/>
+          </a:p>
+        </p:txBody>
+      </p:sp>
+    </p:spTree>
+    <p:extLst>
+      <p:ext uri="{BB962C8B-B14F-4D97-AF65-F5344CB8AC3E}">
+        <p14:creationId xmlns:p14="http://schemas.microsoft.com/office/powerpoint/2010/main" val="1490657441"/>
+      </p:ext>
+    </p:extLst>
+  </p:cSld>
+  <p:clrMapOvr>
+    <a:masterClrMapping/>
+  </p:clrMapOvr>
+</p:sld>
+</file>
+
+<file path=ppt/slides/slide25.xml><?xml version="1.0" encoding="utf-8"?>
+<p:sld xmlns:a="http://schemas.openxmlformats.org/drawingml/2006/main" xmlns:r="http://schemas.openxmlformats.org/officeDocument/2006/relationships" xmlns:p="http://schemas.openxmlformats.org/presentationml/2006/main">
+  <p:cSld>
+    <p:spTree>
+      <p:nvGrpSpPr>
+        <p:cNvPr id="1" name=""/>
+        <p:cNvGrpSpPr/>
+        <p:nvPr/>
+      </p:nvGrpSpPr>
+      <p:grpSpPr>
+        <a:xfrm>
+          <a:off x="0" y="0"/>
+          <a:ext cx="0" cy="0"/>
+          <a:chOff x="0" y="0"/>
+          <a:chExt cx="0" cy="0"/>
+        </a:xfrm>
+      </p:grpSpPr>
+      <p:sp>
+        <p:nvSpPr>
+          <p:cNvPr id="2" name="Inhaltsplatzhalter 1">
+            <a:extLst>
+              <a:ext uri="{FF2B5EF4-FFF2-40B4-BE49-F238E27FC236}">
+                <a16:creationId xmlns:a16="http://schemas.microsoft.com/office/drawing/2014/main" id="{EF64AF26-B41D-42CC-9B77-630ADF167A24}"/>
+              </a:ext>
+            </a:extLst>
+          </p:cNvPr>
+          <p:cNvSpPr>
+            <a:spLocks noGrp="1"/>
+          </p:cNvSpPr>
+          <p:nvPr>
+            <p:ph idx="13"/>
+          </p:nvPr>
+        </p:nvSpPr>
+        <p:spPr/>
+        <p:txBody>
+          <a:bodyPr/>
+          <a:lstStyle/>
+          <a:p>
+            <a:endParaRPr lang="de-DE"/>
+          </a:p>
+        </p:txBody>
+      </p:sp>
+      <p:sp>
+        <p:nvSpPr>
+          <p:cNvPr id="3" name="Titel 2">
+            <a:extLst>
+              <a:ext uri="{FF2B5EF4-FFF2-40B4-BE49-F238E27FC236}">
+                <a16:creationId xmlns:a16="http://schemas.microsoft.com/office/drawing/2014/main" id="{BA15A607-5F02-4538-AEB6-A00CE280607F}"/>
+              </a:ext>
+            </a:extLst>
+          </p:cNvPr>
+          <p:cNvSpPr>
+            <a:spLocks noGrp="1"/>
+          </p:cNvSpPr>
+          <p:nvPr>
+            <p:ph type="title" idx="4294967295"/>
+          </p:nvPr>
+        </p:nvSpPr>
+        <p:spPr/>
+        <p:txBody>
+          <a:bodyPr/>
+          <a:lstStyle/>
+          <a:p>
+            <a:r>
+              <a:rPr lang="de-DE" dirty="0"/>
+              <a:t>Tags</a:t>
+            </a:r>
+          </a:p>
+        </p:txBody>
+      </p:sp>
+    </p:spTree>
+    <p:extLst>
+      <p:ext uri="{BB962C8B-B14F-4D97-AF65-F5344CB8AC3E}">
+        <p14:creationId xmlns:p14="http://schemas.microsoft.com/office/powerpoint/2010/main" val="1450166957"/>
+      </p:ext>
+    </p:extLst>
+  </p:cSld>
+  <p:clrMapOvr>
+    <a:masterClrMapping/>
+  </p:clrMapOvr>
+</p:sld>
+</file>
+
+<file path=ppt/slides/slide26.xml><?xml version="1.0" encoding="utf-8"?>
+<p:sld xmlns:a="http://schemas.openxmlformats.org/drawingml/2006/main" xmlns:r="http://schemas.openxmlformats.org/officeDocument/2006/relationships" xmlns:p="http://schemas.openxmlformats.org/presentationml/2006/main">
+  <p:cSld>
+    <p:spTree>
+      <p:nvGrpSpPr>
+        <p:cNvPr id="1" name=""/>
+        <p:cNvGrpSpPr/>
+        <p:nvPr/>
+      </p:nvGrpSpPr>
+      <p:grpSpPr>
+        <a:xfrm>
+          <a:off x="0" y="0"/>
+          <a:ext cx="0" cy="0"/>
+          <a:chOff x="0" y="0"/>
+          <a:chExt cx="0" cy="0"/>
+        </a:xfrm>
+      </p:grpSpPr>
+      <p:sp>
+        <p:nvSpPr>
+          <p:cNvPr id="2" name="Inhaltsplatzhalter 1">
+            <a:extLst>
+              <a:ext uri="{FF2B5EF4-FFF2-40B4-BE49-F238E27FC236}">
+                <a16:creationId xmlns:a16="http://schemas.microsoft.com/office/drawing/2014/main" id="{430319EE-3D0C-4573-BB4F-8C2E5023C6B3}"/>
+              </a:ext>
+            </a:extLst>
+          </p:cNvPr>
+          <p:cNvSpPr>
+            <a:spLocks noGrp="1"/>
+          </p:cNvSpPr>
+          <p:nvPr>
+            <p:ph idx="13"/>
+          </p:nvPr>
+        </p:nvSpPr>
+        <p:spPr/>
+        <p:txBody>
+          <a:bodyPr/>
+          <a:lstStyle/>
+          <a:p>
+            <a:endParaRPr lang="de-DE"/>
+          </a:p>
+        </p:txBody>
+      </p:sp>
+      <p:sp>
+        <p:nvSpPr>
+          <p:cNvPr id="3" name="Titel 2">
+            <a:extLst>
+              <a:ext uri="{FF2B5EF4-FFF2-40B4-BE49-F238E27FC236}">
+                <a16:creationId xmlns:a16="http://schemas.microsoft.com/office/drawing/2014/main" id="{5AE84672-22D6-4DD1-ABA8-56B9967986BD}"/>
+              </a:ext>
+            </a:extLst>
+          </p:cNvPr>
+          <p:cNvSpPr>
+            <a:spLocks noGrp="1"/>
+          </p:cNvSpPr>
+          <p:nvPr>
+            <p:ph type="title" idx="4294967295"/>
+          </p:nvPr>
+        </p:nvSpPr>
+        <p:spPr/>
+        <p:txBody>
+          <a:bodyPr/>
+          <a:lstStyle/>
+          <a:p>
+            <a:r>
+              <a:rPr lang="de-DE" dirty="0"/>
+              <a:t>Änderungen integrieren</a:t>
+            </a:r>
+          </a:p>
+        </p:txBody>
+      </p:sp>
+    </p:spTree>
+    <p:extLst>
+      <p:ext uri="{BB962C8B-B14F-4D97-AF65-F5344CB8AC3E}">
+        <p14:creationId xmlns:p14="http://schemas.microsoft.com/office/powerpoint/2010/main" val="3289326896"/>
+      </p:ext>
+    </p:extLst>
+  </p:cSld>
+  <p:clrMapOvr>
+    <a:masterClrMapping/>
+  </p:clrMapOvr>
+</p:sld>
+</file>
+
+<file path=ppt/slides/slide27.xml><?xml version="1.0" encoding="utf-8"?>
+<p:sld xmlns:a="http://schemas.openxmlformats.org/drawingml/2006/main" xmlns:r="http://schemas.openxmlformats.org/officeDocument/2006/relationships" xmlns:p="http://schemas.openxmlformats.org/presentationml/2006/main">
+  <p:cSld>
+    <p:spTree>
+      <p:nvGrpSpPr>
+        <p:cNvPr id="1" name=""/>
+        <p:cNvGrpSpPr/>
+        <p:nvPr/>
+      </p:nvGrpSpPr>
+      <p:grpSpPr>
+        <a:xfrm>
+          <a:off x="0" y="0"/>
+          <a:ext cx="0" cy="0"/>
+          <a:chOff x="0" y="0"/>
+          <a:chExt cx="0" cy="0"/>
+        </a:xfrm>
+      </p:grpSpPr>
+      <p:sp>
+        <p:nvSpPr>
+          <p:cNvPr id="2" name="Inhaltsplatzhalter 1">
+            <a:extLst>
+              <a:ext uri="{FF2B5EF4-FFF2-40B4-BE49-F238E27FC236}">
+                <a16:creationId xmlns:a16="http://schemas.microsoft.com/office/drawing/2014/main" id="{1C70E41D-5BDC-467E-8B53-575BEF476BB2}"/>
+              </a:ext>
+            </a:extLst>
+          </p:cNvPr>
+          <p:cNvSpPr>
+            <a:spLocks noGrp="1"/>
+          </p:cNvSpPr>
+          <p:nvPr>
+            <p:ph idx="13"/>
+          </p:nvPr>
+        </p:nvSpPr>
+        <p:spPr/>
+        <p:txBody>
+          <a:bodyPr/>
+          <a:lstStyle/>
+          <a:p>
+            <a:endParaRPr lang="de-DE"/>
+          </a:p>
+        </p:txBody>
+      </p:sp>
+      <p:sp>
+        <p:nvSpPr>
+          <p:cNvPr id="3" name="Titel 2">
+            <a:extLst>
+              <a:ext uri="{FF2B5EF4-FFF2-40B4-BE49-F238E27FC236}">
+                <a16:creationId xmlns:a16="http://schemas.microsoft.com/office/drawing/2014/main" id="{351777FE-4563-4796-925B-0598F7CF1E6A}"/>
+              </a:ext>
+            </a:extLst>
+          </p:cNvPr>
+          <p:cNvSpPr>
+            <a:spLocks noGrp="1"/>
+          </p:cNvSpPr>
+          <p:nvPr>
+            <p:ph type="title" idx="4294967295"/>
+          </p:nvPr>
+        </p:nvSpPr>
+        <p:spPr/>
+        <p:txBody>
+          <a:bodyPr/>
+          <a:lstStyle/>
+          <a:p>
+            <a:r>
+              <a:rPr lang="de-DE" dirty="0" err="1"/>
+              <a:t>Apply</a:t>
+            </a:r>
+            <a:r>
+              <a:rPr lang="de-DE" dirty="0"/>
+              <a:t> </a:t>
+            </a:r>
+            <a:r>
+              <a:rPr lang="de-DE" dirty="0" err="1"/>
+              <a:t>pop</a:t>
+            </a:r>
+            <a:endParaRPr lang="de-DE" dirty="0"/>
+          </a:p>
+        </p:txBody>
+      </p:sp>
+    </p:spTree>
+    <p:extLst>
+      <p:ext uri="{BB962C8B-B14F-4D97-AF65-F5344CB8AC3E}">
+        <p14:creationId xmlns:p14="http://schemas.microsoft.com/office/powerpoint/2010/main" val="2236011970"/>
+      </p:ext>
+    </p:extLst>
+  </p:cSld>
+  <p:clrMapOvr>
+    <a:masterClrMapping/>
+  </p:clrMapOvr>
+</p:sld>
+</file>
+
+<file path=ppt/slides/slide28.xml><?xml version="1.0" encoding="utf-8"?>
+<p:sld xmlns:a="http://schemas.openxmlformats.org/drawingml/2006/main" xmlns:r="http://schemas.openxmlformats.org/officeDocument/2006/relationships" xmlns:p="http://schemas.openxmlformats.org/presentationml/2006/main">
+  <p:cSld>
+    <p:spTree>
+      <p:nvGrpSpPr>
+        <p:cNvPr id="1" name=""/>
+        <p:cNvGrpSpPr/>
+        <p:nvPr/>
+      </p:nvGrpSpPr>
+      <p:grpSpPr>
+        <a:xfrm>
+          <a:off x="0" y="0"/>
+          <a:ext cx="0" cy="0"/>
+          <a:chOff x="0" y="0"/>
+          <a:chExt cx="0" cy="0"/>
+        </a:xfrm>
+      </p:grpSpPr>
+      <p:sp>
+        <p:nvSpPr>
+          <p:cNvPr id="2" name="Inhaltsplatzhalter 1">
+            <a:extLst>
+              <a:ext uri="{FF2B5EF4-FFF2-40B4-BE49-F238E27FC236}">
+                <a16:creationId xmlns:a16="http://schemas.microsoft.com/office/drawing/2014/main" id="{ABAC4862-C91A-4B39-ABA9-DBF4F3B14460}"/>
+              </a:ext>
+            </a:extLst>
+          </p:cNvPr>
+          <p:cNvSpPr>
+            <a:spLocks noGrp="1"/>
+          </p:cNvSpPr>
+          <p:nvPr>
+            <p:ph idx="13"/>
+          </p:nvPr>
+        </p:nvSpPr>
+        <p:spPr/>
+        <p:txBody>
+          <a:bodyPr/>
+          <a:lstStyle/>
+          <a:p>
+            <a:endParaRPr lang="de-DE"/>
+          </a:p>
+        </p:txBody>
+      </p:sp>
+      <p:sp>
+        <p:nvSpPr>
+          <p:cNvPr id="3" name="Titel 2">
+            <a:extLst>
+              <a:ext uri="{FF2B5EF4-FFF2-40B4-BE49-F238E27FC236}">
+                <a16:creationId xmlns:a16="http://schemas.microsoft.com/office/drawing/2014/main" id="{3BF9BE68-E0B5-45BF-BABF-1381FA0F54F5}"/>
+              </a:ext>
+            </a:extLst>
+          </p:cNvPr>
+          <p:cNvSpPr>
+            <a:spLocks noGrp="1"/>
+          </p:cNvSpPr>
+          <p:nvPr>
+            <p:ph type="title" idx="4294967295"/>
+          </p:nvPr>
+        </p:nvSpPr>
+        <p:spPr/>
+        <p:txBody>
+          <a:bodyPr/>
+          <a:lstStyle/>
+          <a:p>
+            <a:r>
+              <a:rPr lang="de-DE" dirty="0"/>
+              <a:t>Cherry pick /  </a:t>
+            </a:r>
+            <a:r>
+              <a:rPr lang="de-DE" dirty="0" err="1"/>
+              <a:t>cherry</a:t>
+            </a:r>
+            <a:endParaRPr lang="de-DE" dirty="0"/>
+          </a:p>
+        </p:txBody>
+      </p:sp>
+    </p:spTree>
+    <p:extLst>
+      <p:ext uri="{BB962C8B-B14F-4D97-AF65-F5344CB8AC3E}">
+        <p14:creationId xmlns:p14="http://schemas.microsoft.com/office/powerpoint/2010/main" val="1034010443"/>
+      </p:ext>
+    </p:extLst>
+  </p:cSld>
+  <p:clrMapOvr>
+    <a:masterClrMapping/>
+  </p:clrMapOvr>
+</p:sld>
+</file>
+
+<file path=ppt/slides/slide29.xml><?xml version="1.0" encoding="utf-8"?>
+<p:sld xmlns:a="http://schemas.openxmlformats.org/drawingml/2006/main" xmlns:r="http://schemas.openxmlformats.org/officeDocument/2006/relationships" xmlns:p="http://schemas.openxmlformats.org/presentationml/2006/main">
+  <p:cSld>
+    <p:spTree>
+      <p:nvGrpSpPr>
+        <p:cNvPr id="1" name=""/>
+        <p:cNvGrpSpPr/>
+        <p:nvPr/>
+      </p:nvGrpSpPr>
+      <p:grpSpPr>
+        <a:xfrm>
+          <a:off x="0" y="0"/>
+          <a:ext cx="0" cy="0"/>
+          <a:chOff x="0" y="0"/>
+          <a:chExt cx="0" cy="0"/>
+        </a:xfrm>
+      </p:grpSpPr>
+      <p:sp>
+        <p:nvSpPr>
+          <p:cNvPr id="2" name="Inhaltsplatzhalter 1">
+            <a:extLst>
+              <a:ext uri="{FF2B5EF4-FFF2-40B4-BE49-F238E27FC236}">
+                <a16:creationId xmlns:a16="http://schemas.microsoft.com/office/drawing/2014/main" id="{A1FE935F-D629-499F-82B9-047F5FFCDC18}"/>
+              </a:ext>
+            </a:extLst>
+          </p:cNvPr>
+          <p:cNvSpPr>
+            <a:spLocks noGrp="1"/>
+          </p:cNvSpPr>
+          <p:nvPr>
+            <p:ph idx="13"/>
+          </p:nvPr>
+        </p:nvSpPr>
+        <p:spPr/>
+        <p:txBody>
+          <a:bodyPr/>
+          <a:lstStyle/>
+          <a:p>
+            <a:endParaRPr lang="de-DE"/>
+          </a:p>
+        </p:txBody>
+      </p:sp>
+      <p:sp>
+        <p:nvSpPr>
+          <p:cNvPr id="3" name="Titel 2">
+            <a:extLst>
+              <a:ext uri="{FF2B5EF4-FFF2-40B4-BE49-F238E27FC236}">
+                <a16:creationId xmlns:a16="http://schemas.microsoft.com/office/drawing/2014/main" id="{98C52FB5-0D40-4B05-82A9-58A2D593489A}"/>
+              </a:ext>
+            </a:extLst>
+          </p:cNvPr>
+          <p:cNvSpPr>
+            <a:spLocks noGrp="1"/>
+          </p:cNvSpPr>
+          <p:nvPr>
+            <p:ph type="title" idx="4294967295"/>
+          </p:nvPr>
+        </p:nvSpPr>
+        <p:spPr/>
+        <p:txBody>
+          <a:bodyPr/>
+          <a:lstStyle/>
+          <a:p>
+            <a:r>
+              <a:rPr lang="de-DE" dirty="0" err="1"/>
+              <a:t>Revert</a:t>
+            </a:r>
+            <a:endParaRPr lang="de-DE" dirty="0"/>
+          </a:p>
+        </p:txBody>
+      </p:sp>
+    </p:spTree>
+    <p:extLst>
+      <p:ext uri="{BB962C8B-B14F-4D97-AF65-F5344CB8AC3E}">
+        <p14:creationId xmlns:p14="http://schemas.microsoft.com/office/powerpoint/2010/main" val="2941308763"/>
       </p:ext>
     </p:extLst>
   </p:cSld>
@@ -4504,131 +6261,111 @@
           <a:lstStyle/>
           <a:p>
             <a:r>
+              <a:rPr lang="de-DE" dirty="0" err="1"/>
+              <a:t>Init</a:t>
+            </a:r>
+            <a:endParaRPr lang="de-DE" dirty="0"/>
+          </a:p>
+          <a:p>
+            <a:pPr lvl="1"/>
+            <a:r>
+              <a:rPr lang="de-DE" dirty="0"/>
+              <a:t>Kommando: </a:t>
+            </a:r>
+            <a:r>
+              <a:rPr lang="de-DE" b="1" i="1" dirty="0"/>
+              <a:t>git </a:t>
+            </a:r>
+            <a:r>
+              <a:rPr lang="de-DE" b="1" i="1" dirty="0" err="1"/>
+              <a:t>init</a:t>
+            </a:r>
+            <a:endParaRPr lang="de-DE" b="1" i="1" dirty="0"/>
+          </a:p>
+          <a:p>
+            <a:pPr lvl="1"/>
+            <a:r>
               <a:rPr lang="de-DE" dirty="0"/>
               <a:t>Ermöglicht Erstellung eines neuen Projektarchivs</a:t>
             </a:r>
           </a:p>
           <a:p>
+            <a:pPr lvl="1"/>
             <a:r>
               <a:rPr lang="de-DE" dirty="0"/>
-              <a:t>Fügt dem aktuellen Verzeichnis ein Unterverzeichnis ".</a:t>
+              <a:t>Fügt dem aktuellen Verzeichnis ein Unterverzeichnis ".git" hinzu</a:t>
+            </a:r>
+          </a:p>
+          <a:p>
+            <a:pPr lvl="1"/>
+            <a:r>
+              <a:rPr lang="de-DE" dirty="0"/>
+              <a:t>Somit wird dieses Verzeichnis zu einem Git Projektarchiv </a:t>
+            </a:r>
+          </a:p>
+          <a:p>
+            <a:pPr lvl="1"/>
+            <a:endParaRPr lang="de-DE" dirty="0"/>
+          </a:p>
+          <a:p>
+            <a:pPr lvl="1"/>
+            <a:endParaRPr lang="de-DE" dirty="0"/>
+          </a:p>
+          <a:p>
+            <a:r>
+              <a:rPr lang="de-DE" dirty="0"/>
+              <a:t>Clone</a:t>
+            </a:r>
+          </a:p>
+          <a:p>
+            <a:pPr lvl="1"/>
+            <a:r>
+              <a:rPr lang="de-DE" dirty="0"/>
+              <a:t>Kommando: </a:t>
+            </a:r>
+            <a:r>
+              <a:rPr lang="de-DE" b="1" i="1" dirty="0"/>
+              <a:t>git </a:t>
+            </a:r>
+            <a:r>
+              <a:rPr lang="de-DE" b="1" i="1" dirty="0" err="1"/>
+              <a:t>clone</a:t>
+            </a:r>
+            <a:r>
+              <a:rPr lang="de-DE" b="1" i="1" dirty="0"/>
+              <a:t> &lt;remote Adresse&gt; &lt;lokales Verzeichnis&gt;</a:t>
+            </a:r>
+          </a:p>
+          <a:p>
+            <a:pPr lvl="1"/>
+            <a:r>
+              <a:rPr lang="de-DE" dirty="0"/>
+              <a:t>Ermöglicht Erstellung eines neuen Projektarchivs anhand einem bestehenden Projektarchiv</a:t>
+            </a:r>
+          </a:p>
+          <a:p>
+            <a:pPr lvl="1"/>
+            <a:r>
+              <a:rPr lang="de-DE" dirty="0"/>
+              <a:t>Erstellt Verbindung zwischen dem lokalen Archiv und dem </a:t>
             </a:r>
             <a:r>
               <a:rPr lang="de-DE" dirty="0" err="1"/>
-              <a:t>git</a:t>
+              <a:t>Orginalen</a:t>
             </a:r>
             <a:r>
               <a:rPr lang="de-DE" dirty="0"/>
-              <a:t>" hinzu</a:t>
-            </a:r>
-          </a:p>
-          <a:p>
-            <a:r>
-              <a:rPr lang="de-DE" dirty="0"/>
-              <a:t>Somit wird dieses Verzeichnis zu einem </a:t>
+              <a:t>, mit dem Alias </a:t>
             </a:r>
             <a:r>
               <a:rPr lang="de-DE" dirty="0" err="1"/>
-              <a:t>Git</a:t>
-            </a:r>
-            <a:r>
-              <a:rPr lang="de-DE" dirty="0"/>
-              <a:t> Projektarchiv</a:t>
-            </a:r>
-          </a:p>
-          <a:p>
-            <a:pPr marL="0" indent="0">
-              <a:buNone/>
-            </a:pPr>
-            <a:r>
-              <a:rPr lang="de-DE" dirty="0"/>
-              <a:t>	Abb. 5</a:t>
-            </a:r>
-          </a:p>
-          <a:p>
-            <a:r>
-              <a:rPr lang="de-DE" dirty="0"/>
-              <a:t>Aufbau von ".</a:t>
-            </a:r>
-            <a:r>
-              <a:rPr lang="de-DE" dirty="0" err="1"/>
-              <a:t>git</a:t>
-            </a:r>
-            <a:r>
-              <a:rPr lang="de-DE" dirty="0"/>
-              <a:t>":</a:t>
-            </a:r>
+              <a:t>origin</a:t>
+            </a:r>
+            <a:endParaRPr lang="de-DE" dirty="0"/>
           </a:p>
           <a:p>
             <a:pPr lvl="1"/>
-            <a:r>
-              <a:rPr lang="de-DE" dirty="0" err="1"/>
-              <a:t>objects</a:t>
-            </a:r>
-            <a:r>
-              <a:rPr lang="de-DE" dirty="0"/>
-              <a:t>: enthält alle Dateien die versioniert werden</a:t>
-            </a:r>
-          </a:p>
-          <a:p>
-            <a:pPr lvl="1"/>
-            <a:r>
-              <a:rPr lang="de-DE" dirty="0" err="1"/>
-              <a:t>refs</a:t>
-            </a:r>
-            <a:r>
-              <a:rPr lang="de-DE" dirty="0"/>
-              <a:t>: enthält Verweise auf Zweige und </a:t>
-            </a:r>
-            <a:r>
-              <a:rPr lang="de-DE" dirty="0" err="1"/>
-              <a:t>Ettiketten</a:t>
-            </a:r>
             <a:endParaRPr lang="de-DE" dirty="0"/>
-          </a:p>
-          <a:p>
-            <a:pPr lvl="1"/>
-            <a:r>
-              <a:rPr lang="de-DE" dirty="0"/>
-              <a:t>logs: enthält Informationen zu Commit Historie und Historie der Zweige und Arbeitsverzeichnisse</a:t>
-            </a:r>
-          </a:p>
-          <a:p>
-            <a:pPr lvl="1"/>
-            <a:r>
-              <a:rPr lang="de-DE" dirty="0" err="1"/>
-              <a:t>hooks</a:t>
-            </a:r>
-            <a:r>
-              <a:rPr lang="de-DE" dirty="0"/>
-              <a:t>: enthält Shell Skripte, die bei </a:t>
-            </a:r>
-            <a:r>
-              <a:rPr lang="de-DE" dirty="0" err="1"/>
-              <a:t>Git</a:t>
-            </a:r>
-            <a:r>
-              <a:rPr lang="de-DE" dirty="0"/>
-              <a:t> Kommandos ausgeführt werden</a:t>
-            </a:r>
-          </a:p>
-          <a:p>
-            <a:pPr lvl="1"/>
-            <a:r>
-              <a:rPr lang="de-DE" dirty="0" err="1"/>
-              <a:t>config</a:t>
-            </a:r>
-            <a:r>
-              <a:rPr lang="de-DE" dirty="0"/>
-              <a:t>: enthält Informationen und Einstellungen für das Projektarchiv</a:t>
-            </a:r>
-          </a:p>
-          <a:p>
-            <a:pPr lvl="1"/>
-            <a:r>
-              <a:rPr lang="de-DE" dirty="0"/>
-              <a:t>HEAD: </a:t>
-            </a:r>
           </a:p>
           <a:p>
             <a:pPr marL="457200" lvl="1" indent="0">
@@ -4670,14 +6407,790 @@
               <a:rPr lang="de-DE" dirty="0" err="1"/>
               <a:t>Init</a:t>
             </a:r>
-            <a:endParaRPr lang="de-DE" dirty="0"/>
-          </a:p>
-        </p:txBody>
-      </p:sp>
+            <a:r>
+              <a:rPr lang="de-DE" dirty="0"/>
+              <a:t>/Clone</a:t>
+            </a:r>
+          </a:p>
+        </p:txBody>
+      </p:sp>
+      <p:pic>
+        <p:nvPicPr>
+          <p:cNvPr id="4" name="Grafik 3">
+            <a:extLst>
+              <a:ext uri="{FF2B5EF4-FFF2-40B4-BE49-F238E27FC236}">
+                <a16:creationId xmlns:a16="http://schemas.microsoft.com/office/drawing/2014/main" id="{2D12507E-65EA-4A71-AA24-F9D2624C2AC1}"/>
+              </a:ext>
+            </a:extLst>
+          </p:cNvPr>
+          <p:cNvPicPr/>
+          <p:nvPr/>
+        </p:nvPicPr>
+        <p:blipFill>
+          <a:blip r:embed="rId2">
+            <a:extLst>
+              <a:ext uri="{28A0092B-C50C-407E-A947-70E740481C1C}">
+                <a14:useLocalDpi xmlns:a14="http://schemas.microsoft.com/office/drawing/2010/main" val="0"/>
+              </a:ext>
+            </a:extLst>
+          </a:blip>
+          <a:srcRect/>
+          <a:stretch>
+            <a:fillRect/>
+          </a:stretch>
+        </p:blipFill>
+        <p:spPr bwMode="auto">
+          <a:xfrm>
+            <a:off x="1778323" y="2787986"/>
+            <a:ext cx="4077335" cy="409575"/>
+          </a:xfrm>
+          <a:prstGeom prst="rect">
+            <a:avLst/>
+          </a:prstGeom>
+          <a:noFill/>
+          <a:ln>
+            <a:noFill/>
+          </a:ln>
+        </p:spPr>
+      </p:pic>
+      <p:pic>
+        <p:nvPicPr>
+          <p:cNvPr id="5" name="Grafik 4">
+            <a:extLst>
+              <a:ext uri="{FF2B5EF4-FFF2-40B4-BE49-F238E27FC236}">
+                <a16:creationId xmlns:a16="http://schemas.microsoft.com/office/drawing/2014/main" id="{A2D83C0A-51F8-4282-8D0F-370D740BDA3A}"/>
+              </a:ext>
+            </a:extLst>
+          </p:cNvPr>
+          <p:cNvPicPr/>
+          <p:nvPr/>
+        </p:nvPicPr>
+        <p:blipFill rotWithShape="1">
+          <a:blip r:embed="rId3">
+            <a:extLst>
+              <a:ext uri="{28A0092B-C50C-407E-A947-70E740481C1C}">
+                <a14:useLocalDpi xmlns:a14="http://schemas.microsoft.com/office/drawing/2010/main" val="0"/>
+              </a:ext>
+            </a:extLst>
+          </a:blip>
+          <a:srcRect t="10966"/>
+          <a:stretch/>
+        </p:blipFill>
+        <p:spPr bwMode="auto">
+          <a:xfrm>
+            <a:off x="1778323" y="5020520"/>
+            <a:ext cx="4869180" cy="977900"/>
+          </a:xfrm>
+          <a:prstGeom prst="rect">
+            <a:avLst/>
+          </a:prstGeom>
+          <a:noFill/>
+          <a:ln>
+            <a:noFill/>
+          </a:ln>
+          <a:extLst>
+            <a:ext uri="{53640926-AAD7-44D8-BBD7-CCE9431645EC}">
+              <a14:shadowObscured xmlns:a14="http://schemas.microsoft.com/office/drawing/2010/main"/>
+            </a:ext>
+          </a:extLst>
+        </p:spPr>
+      </p:pic>
     </p:spTree>
     <p:extLst>
       <p:ext uri="{BB962C8B-B14F-4D97-AF65-F5344CB8AC3E}">
         <p14:creationId xmlns:p14="http://schemas.microsoft.com/office/powerpoint/2010/main" val="4009144003"/>
+      </p:ext>
+    </p:extLst>
+  </p:cSld>
+  <p:clrMapOvr>
+    <a:masterClrMapping/>
+  </p:clrMapOvr>
+</p:sld>
+</file>
+
+<file path=ppt/slides/slide30.xml><?xml version="1.0" encoding="utf-8"?>
+<p:sld xmlns:a="http://schemas.openxmlformats.org/drawingml/2006/main" xmlns:r="http://schemas.openxmlformats.org/officeDocument/2006/relationships" xmlns:p="http://schemas.openxmlformats.org/presentationml/2006/main">
+  <p:cSld>
+    <p:spTree>
+      <p:nvGrpSpPr>
+        <p:cNvPr id="1" name=""/>
+        <p:cNvGrpSpPr/>
+        <p:nvPr/>
+      </p:nvGrpSpPr>
+      <p:grpSpPr>
+        <a:xfrm>
+          <a:off x="0" y="0"/>
+          <a:ext cx="0" cy="0"/>
+          <a:chOff x="0" y="0"/>
+          <a:chExt cx="0" cy="0"/>
+        </a:xfrm>
+      </p:grpSpPr>
+      <p:sp>
+        <p:nvSpPr>
+          <p:cNvPr id="2" name="Inhaltsplatzhalter 1">
+            <a:extLst>
+              <a:ext uri="{FF2B5EF4-FFF2-40B4-BE49-F238E27FC236}">
+                <a16:creationId xmlns:a16="http://schemas.microsoft.com/office/drawing/2014/main" id="{F78ACC04-469C-4C56-83A5-3CB929A48CF8}"/>
+              </a:ext>
+            </a:extLst>
+          </p:cNvPr>
+          <p:cNvSpPr>
+            <a:spLocks noGrp="1"/>
+          </p:cNvSpPr>
+          <p:nvPr>
+            <p:ph idx="13"/>
+          </p:nvPr>
+        </p:nvSpPr>
+        <p:spPr/>
+        <p:txBody>
+          <a:bodyPr/>
+          <a:lstStyle/>
+          <a:p>
+            <a:endParaRPr lang="de-DE"/>
+          </a:p>
+        </p:txBody>
+      </p:sp>
+      <p:sp>
+        <p:nvSpPr>
+          <p:cNvPr id="3" name="Titel 2">
+            <a:extLst>
+              <a:ext uri="{FF2B5EF4-FFF2-40B4-BE49-F238E27FC236}">
+                <a16:creationId xmlns:a16="http://schemas.microsoft.com/office/drawing/2014/main" id="{F43ABB80-C886-4AF5-B215-5BEEBC4B2C48}"/>
+              </a:ext>
+            </a:extLst>
+          </p:cNvPr>
+          <p:cNvSpPr>
+            <a:spLocks noGrp="1"/>
+          </p:cNvSpPr>
+          <p:nvPr>
+            <p:ph type="title" idx="4294967295"/>
+          </p:nvPr>
+        </p:nvSpPr>
+        <p:spPr/>
+        <p:txBody>
+          <a:bodyPr/>
+          <a:lstStyle/>
+          <a:p>
+            <a:r>
+              <a:rPr lang="de-DE" dirty="0" err="1"/>
+              <a:t>Reset</a:t>
+            </a:r>
+            <a:endParaRPr lang="de-DE" dirty="0"/>
+          </a:p>
+        </p:txBody>
+      </p:sp>
+    </p:spTree>
+    <p:extLst>
+      <p:ext uri="{BB962C8B-B14F-4D97-AF65-F5344CB8AC3E}">
+        <p14:creationId xmlns:p14="http://schemas.microsoft.com/office/powerpoint/2010/main" val="3217921642"/>
+      </p:ext>
+    </p:extLst>
+  </p:cSld>
+  <p:clrMapOvr>
+    <a:masterClrMapping/>
+  </p:clrMapOvr>
+</p:sld>
+</file>
+
+<file path=ppt/slides/slide31.xml><?xml version="1.0" encoding="utf-8"?>
+<p:sld xmlns:a="http://schemas.openxmlformats.org/drawingml/2006/main" xmlns:r="http://schemas.openxmlformats.org/officeDocument/2006/relationships" xmlns:p="http://schemas.openxmlformats.org/presentationml/2006/main">
+  <p:cSld>
+    <p:spTree>
+      <p:nvGrpSpPr>
+        <p:cNvPr id="1" name=""/>
+        <p:cNvGrpSpPr/>
+        <p:nvPr/>
+      </p:nvGrpSpPr>
+      <p:grpSpPr>
+        <a:xfrm>
+          <a:off x="0" y="0"/>
+          <a:ext cx="0" cy="0"/>
+          <a:chOff x="0" y="0"/>
+          <a:chExt cx="0" cy="0"/>
+        </a:xfrm>
+      </p:grpSpPr>
+      <p:sp>
+        <p:nvSpPr>
+          <p:cNvPr id="2" name="Inhaltsplatzhalter 1">
+            <a:extLst>
+              <a:ext uri="{FF2B5EF4-FFF2-40B4-BE49-F238E27FC236}">
+                <a16:creationId xmlns:a16="http://schemas.microsoft.com/office/drawing/2014/main" id="{0E16E381-3C85-4E80-9C69-783B6FB8CCA6}"/>
+              </a:ext>
+            </a:extLst>
+          </p:cNvPr>
+          <p:cNvSpPr>
+            <a:spLocks noGrp="1"/>
+          </p:cNvSpPr>
+          <p:nvPr>
+            <p:ph idx="13"/>
+          </p:nvPr>
+        </p:nvSpPr>
+        <p:spPr/>
+        <p:txBody>
+          <a:bodyPr/>
+          <a:lstStyle/>
+          <a:p>
+            <a:endParaRPr lang="de-DE"/>
+          </a:p>
+        </p:txBody>
+      </p:sp>
+      <p:sp>
+        <p:nvSpPr>
+          <p:cNvPr id="3" name="Titel 2">
+            <a:extLst>
+              <a:ext uri="{FF2B5EF4-FFF2-40B4-BE49-F238E27FC236}">
+                <a16:creationId xmlns:a16="http://schemas.microsoft.com/office/drawing/2014/main" id="{AEF45C4A-B7FA-4978-A8CD-BE8F7E8F49D9}"/>
+              </a:ext>
+            </a:extLst>
+          </p:cNvPr>
+          <p:cNvSpPr>
+            <a:spLocks noGrp="1"/>
+          </p:cNvSpPr>
+          <p:nvPr>
+            <p:ph type="title" idx="4294967295"/>
+          </p:nvPr>
+        </p:nvSpPr>
+        <p:spPr/>
+        <p:txBody>
+          <a:bodyPr/>
+          <a:lstStyle/>
+          <a:p>
+            <a:r>
+              <a:rPr lang="de-DE" dirty="0"/>
+              <a:t>(</a:t>
+            </a:r>
+            <a:r>
+              <a:rPr lang="de-DE" dirty="0" err="1"/>
+              <a:t>reflog</a:t>
+            </a:r>
+            <a:r>
+              <a:rPr lang="de-DE" dirty="0"/>
+              <a:t>)</a:t>
+            </a:r>
+          </a:p>
+        </p:txBody>
+      </p:sp>
+    </p:spTree>
+    <p:extLst>
+      <p:ext uri="{BB962C8B-B14F-4D97-AF65-F5344CB8AC3E}">
+        <p14:creationId xmlns:p14="http://schemas.microsoft.com/office/powerpoint/2010/main" val="1856339443"/>
+      </p:ext>
+    </p:extLst>
+  </p:cSld>
+  <p:clrMapOvr>
+    <a:masterClrMapping/>
+  </p:clrMapOvr>
+</p:sld>
+</file>
+
+<file path=ppt/slides/slide32.xml><?xml version="1.0" encoding="utf-8"?>
+<p:sld xmlns:a="http://schemas.openxmlformats.org/drawingml/2006/main" xmlns:r="http://schemas.openxmlformats.org/officeDocument/2006/relationships" xmlns:p="http://schemas.openxmlformats.org/presentationml/2006/main">
+  <p:cSld>
+    <p:spTree>
+      <p:nvGrpSpPr>
+        <p:cNvPr id="1" name=""/>
+        <p:cNvGrpSpPr/>
+        <p:nvPr/>
+      </p:nvGrpSpPr>
+      <p:grpSpPr>
+        <a:xfrm>
+          <a:off x="0" y="0"/>
+          <a:ext cx="0" cy="0"/>
+          <a:chOff x="0" y="0"/>
+          <a:chExt cx="0" cy="0"/>
+        </a:xfrm>
+      </p:grpSpPr>
+      <p:sp>
+        <p:nvSpPr>
+          <p:cNvPr id="2" name="Titel 1">
+            <a:extLst>
+              <a:ext uri="{FF2B5EF4-FFF2-40B4-BE49-F238E27FC236}">
+                <a16:creationId xmlns:a16="http://schemas.microsoft.com/office/drawing/2014/main" id="{55DCA8B4-8412-4C61-8E1B-A6CDF1580F20}"/>
+              </a:ext>
+            </a:extLst>
+          </p:cNvPr>
+          <p:cNvSpPr>
+            <a:spLocks noGrp="1"/>
+          </p:cNvSpPr>
+          <p:nvPr>
+            <p:ph type="title"/>
+          </p:nvPr>
+        </p:nvSpPr>
+        <p:spPr/>
+        <p:txBody>
+          <a:bodyPr/>
+          <a:lstStyle/>
+          <a:p>
+            <a:r>
+              <a:rPr lang="de-DE" dirty="0"/>
+              <a:t>Workflow</a:t>
+            </a:r>
+          </a:p>
+        </p:txBody>
+      </p:sp>
+    </p:spTree>
+    <p:extLst>
+      <p:ext uri="{BB962C8B-B14F-4D97-AF65-F5344CB8AC3E}">
+        <p14:creationId xmlns:p14="http://schemas.microsoft.com/office/powerpoint/2010/main" val="1007972795"/>
+      </p:ext>
+    </p:extLst>
+  </p:cSld>
+  <p:clrMapOvr>
+    <a:masterClrMapping/>
+  </p:clrMapOvr>
+</p:sld>
+</file>
+
+<file path=ppt/slides/slide33.xml><?xml version="1.0" encoding="utf-8"?>
+<p:sld xmlns:a="http://schemas.openxmlformats.org/drawingml/2006/main" xmlns:r="http://schemas.openxmlformats.org/officeDocument/2006/relationships" xmlns:p="http://schemas.openxmlformats.org/presentationml/2006/main">
+  <p:cSld>
+    <p:spTree>
+      <p:nvGrpSpPr>
+        <p:cNvPr id="1" name=""/>
+        <p:cNvGrpSpPr/>
+        <p:nvPr/>
+      </p:nvGrpSpPr>
+      <p:grpSpPr>
+        <a:xfrm>
+          <a:off x="0" y="0"/>
+          <a:ext cx="0" cy="0"/>
+          <a:chOff x="0" y="0"/>
+          <a:chExt cx="0" cy="0"/>
+        </a:xfrm>
+      </p:grpSpPr>
+      <p:sp>
+        <p:nvSpPr>
+          <p:cNvPr id="2" name="Inhaltsplatzhalter 1">
+            <a:extLst>
+              <a:ext uri="{FF2B5EF4-FFF2-40B4-BE49-F238E27FC236}">
+                <a16:creationId xmlns:a16="http://schemas.microsoft.com/office/drawing/2014/main" id="{E57A2AEE-D87B-4CD7-A65B-73B11FF3EFAF}"/>
+              </a:ext>
+            </a:extLst>
+          </p:cNvPr>
+          <p:cNvSpPr>
+            <a:spLocks noGrp="1"/>
+          </p:cNvSpPr>
+          <p:nvPr>
+            <p:ph idx="13"/>
+          </p:nvPr>
+        </p:nvSpPr>
+        <p:spPr/>
+        <p:txBody>
+          <a:bodyPr/>
+          <a:lstStyle/>
+          <a:p>
+            <a:endParaRPr lang="de-DE"/>
+          </a:p>
+        </p:txBody>
+      </p:sp>
+      <p:sp>
+        <p:nvSpPr>
+          <p:cNvPr id="3" name="Titel 2">
+            <a:extLst>
+              <a:ext uri="{FF2B5EF4-FFF2-40B4-BE49-F238E27FC236}">
+                <a16:creationId xmlns:a16="http://schemas.microsoft.com/office/drawing/2014/main" id="{625B6011-E5CD-40F8-BED3-233D5BEBC703}"/>
+              </a:ext>
+            </a:extLst>
+          </p:cNvPr>
+          <p:cNvSpPr>
+            <a:spLocks noGrp="1"/>
+          </p:cNvSpPr>
+          <p:nvPr>
+            <p:ph type="title" idx="4294967295"/>
+          </p:nvPr>
+        </p:nvSpPr>
+        <p:spPr/>
+        <p:txBody>
+          <a:bodyPr/>
+          <a:lstStyle/>
+          <a:p>
+            <a:r>
+              <a:rPr lang="de-DE" dirty="0"/>
+              <a:t>Git-</a:t>
+            </a:r>
+            <a:r>
+              <a:rPr lang="de-DE" dirty="0" err="1"/>
+              <a:t>flow</a:t>
+            </a:r>
+            <a:endParaRPr lang="de-DE" dirty="0"/>
+          </a:p>
+        </p:txBody>
+      </p:sp>
+    </p:spTree>
+    <p:extLst>
+      <p:ext uri="{BB962C8B-B14F-4D97-AF65-F5344CB8AC3E}">
+        <p14:creationId xmlns:p14="http://schemas.microsoft.com/office/powerpoint/2010/main" val="149155477"/>
+      </p:ext>
+    </p:extLst>
+  </p:cSld>
+  <p:clrMapOvr>
+    <a:masterClrMapping/>
+  </p:clrMapOvr>
+</p:sld>
+</file>
+
+<file path=ppt/slides/slide34.xml><?xml version="1.0" encoding="utf-8"?>
+<p:sld xmlns:a="http://schemas.openxmlformats.org/drawingml/2006/main" xmlns:r="http://schemas.openxmlformats.org/officeDocument/2006/relationships" xmlns:p="http://schemas.openxmlformats.org/presentationml/2006/main">
+  <p:cSld>
+    <p:spTree>
+      <p:nvGrpSpPr>
+        <p:cNvPr id="1" name=""/>
+        <p:cNvGrpSpPr/>
+        <p:nvPr/>
+      </p:nvGrpSpPr>
+      <p:grpSpPr>
+        <a:xfrm>
+          <a:off x="0" y="0"/>
+          <a:ext cx="0" cy="0"/>
+          <a:chOff x="0" y="0"/>
+          <a:chExt cx="0" cy="0"/>
+        </a:xfrm>
+      </p:grpSpPr>
+      <p:sp>
+        <p:nvSpPr>
+          <p:cNvPr id="2" name="Inhaltsplatzhalter 1">
+            <a:extLst>
+              <a:ext uri="{FF2B5EF4-FFF2-40B4-BE49-F238E27FC236}">
+                <a16:creationId xmlns:a16="http://schemas.microsoft.com/office/drawing/2014/main" id="{3244A830-7F92-44EF-8355-92E0C350F838}"/>
+              </a:ext>
+            </a:extLst>
+          </p:cNvPr>
+          <p:cNvSpPr>
+            <a:spLocks noGrp="1"/>
+          </p:cNvSpPr>
+          <p:nvPr>
+            <p:ph idx="13"/>
+          </p:nvPr>
+        </p:nvSpPr>
+        <p:spPr/>
+        <p:txBody>
+          <a:bodyPr/>
+          <a:lstStyle/>
+          <a:p>
+            <a:endParaRPr lang="de-DE"/>
+          </a:p>
+        </p:txBody>
+      </p:sp>
+      <p:sp>
+        <p:nvSpPr>
+          <p:cNvPr id="3" name="Titel 2">
+            <a:extLst>
+              <a:ext uri="{FF2B5EF4-FFF2-40B4-BE49-F238E27FC236}">
+                <a16:creationId xmlns:a16="http://schemas.microsoft.com/office/drawing/2014/main" id="{CB599424-652A-4472-8967-4805ED1F4DEB}"/>
+              </a:ext>
+            </a:extLst>
+          </p:cNvPr>
+          <p:cNvSpPr>
+            <a:spLocks noGrp="1"/>
+          </p:cNvSpPr>
+          <p:nvPr>
+            <p:ph type="title" idx="4294967295"/>
+          </p:nvPr>
+        </p:nvSpPr>
+        <p:spPr/>
+        <p:txBody>
+          <a:bodyPr/>
+          <a:lstStyle/>
+          <a:p>
+            <a:r>
+              <a:rPr lang="de-DE" dirty="0"/>
+              <a:t>Pull </a:t>
+            </a:r>
+            <a:r>
+              <a:rPr lang="de-DE" dirty="0" err="1"/>
+              <a:t>request</a:t>
+            </a:r>
+            <a:endParaRPr lang="de-DE" dirty="0"/>
+          </a:p>
+        </p:txBody>
+      </p:sp>
+    </p:spTree>
+    <p:extLst>
+      <p:ext uri="{BB962C8B-B14F-4D97-AF65-F5344CB8AC3E}">
+        <p14:creationId xmlns:p14="http://schemas.microsoft.com/office/powerpoint/2010/main" val="1322300763"/>
+      </p:ext>
+    </p:extLst>
+  </p:cSld>
+  <p:clrMapOvr>
+    <a:masterClrMapping/>
+  </p:clrMapOvr>
+</p:sld>
+</file>
+
+<file path=ppt/slides/slide35.xml><?xml version="1.0" encoding="utf-8"?>
+<p:sld xmlns:a="http://schemas.openxmlformats.org/drawingml/2006/main" xmlns:r="http://schemas.openxmlformats.org/officeDocument/2006/relationships" xmlns:p="http://schemas.openxmlformats.org/presentationml/2006/main">
+  <p:cSld>
+    <p:spTree>
+      <p:nvGrpSpPr>
+        <p:cNvPr id="1" name=""/>
+        <p:cNvGrpSpPr/>
+        <p:nvPr/>
+      </p:nvGrpSpPr>
+      <p:grpSpPr>
+        <a:xfrm>
+          <a:off x="0" y="0"/>
+          <a:ext cx="0" cy="0"/>
+          <a:chOff x="0" y="0"/>
+          <a:chExt cx="0" cy="0"/>
+        </a:xfrm>
+      </p:grpSpPr>
+      <p:sp>
+        <p:nvSpPr>
+          <p:cNvPr id="2" name="Inhaltsplatzhalter 1">
+            <a:extLst>
+              <a:ext uri="{FF2B5EF4-FFF2-40B4-BE49-F238E27FC236}">
+                <a16:creationId xmlns:a16="http://schemas.microsoft.com/office/drawing/2014/main" id="{DE7AB728-BA17-494A-A863-1C487CEF2E4F}"/>
+              </a:ext>
+            </a:extLst>
+          </p:cNvPr>
+          <p:cNvSpPr>
+            <a:spLocks noGrp="1"/>
+          </p:cNvSpPr>
+          <p:nvPr>
+            <p:ph idx="13"/>
+          </p:nvPr>
+        </p:nvSpPr>
+        <p:spPr/>
+        <p:txBody>
+          <a:bodyPr/>
+          <a:lstStyle/>
+          <a:p>
+            <a:endParaRPr lang="de-DE"/>
+          </a:p>
+        </p:txBody>
+      </p:sp>
+      <p:sp>
+        <p:nvSpPr>
+          <p:cNvPr id="3" name="Titel 2">
+            <a:extLst>
+              <a:ext uri="{FF2B5EF4-FFF2-40B4-BE49-F238E27FC236}">
+                <a16:creationId xmlns:a16="http://schemas.microsoft.com/office/drawing/2014/main" id="{18E8F690-0089-41E4-BB41-AE8E12035B39}"/>
+              </a:ext>
+            </a:extLst>
+          </p:cNvPr>
+          <p:cNvSpPr>
+            <a:spLocks noGrp="1"/>
+          </p:cNvSpPr>
+          <p:nvPr>
+            <p:ph type="title" idx="4294967295"/>
+          </p:nvPr>
+        </p:nvSpPr>
+        <p:spPr/>
+        <p:txBody>
+          <a:bodyPr/>
+          <a:lstStyle/>
+          <a:p>
+            <a:r>
+              <a:rPr lang="de-DE" dirty="0" err="1"/>
+              <a:t>Forking</a:t>
+            </a:r>
+            <a:r>
+              <a:rPr lang="de-DE" dirty="0"/>
+              <a:t>-workflow</a:t>
+            </a:r>
+          </a:p>
+        </p:txBody>
+      </p:sp>
+    </p:spTree>
+    <p:extLst>
+      <p:ext uri="{BB962C8B-B14F-4D97-AF65-F5344CB8AC3E}">
+        <p14:creationId xmlns:p14="http://schemas.microsoft.com/office/powerpoint/2010/main" val="1691214512"/>
+      </p:ext>
+    </p:extLst>
+  </p:cSld>
+  <p:clrMapOvr>
+    <a:masterClrMapping/>
+  </p:clrMapOvr>
+</p:sld>
+</file>
+
+<file path=ppt/slides/slide36.xml><?xml version="1.0" encoding="utf-8"?>
+<p:sld xmlns:a="http://schemas.openxmlformats.org/drawingml/2006/main" xmlns:r="http://schemas.openxmlformats.org/officeDocument/2006/relationships" xmlns:p="http://schemas.openxmlformats.org/presentationml/2006/main">
+  <p:cSld>
+    <p:spTree>
+      <p:nvGrpSpPr>
+        <p:cNvPr id="1" name=""/>
+        <p:cNvGrpSpPr/>
+        <p:nvPr/>
+      </p:nvGrpSpPr>
+      <p:grpSpPr>
+        <a:xfrm>
+          <a:off x="0" y="0"/>
+          <a:ext cx="0" cy="0"/>
+          <a:chOff x="0" y="0"/>
+          <a:chExt cx="0" cy="0"/>
+        </a:xfrm>
+      </p:grpSpPr>
+      <p:sp>
+        <p:nvSpPr>
+          <p:cNvPr id="2" name="Titel 1">
+            <a:extLst>
+              <a:ext uri="{FF2B5EF4-FFF2-40B4-BE49-F238E27FC236}">
+                <a16:creationId xmlns:a16="http://schemas.microsoft.com/office/drawing/2014/main" id="{6C8483CF-1B0E-4C5D-98AE-63877A3A3D1A}"/>
+              </a:ext>
+            </a:extLst>
+          </p:cNvPr>
+          <p:cNvSpPr>
+            <a:spLocks noGrp="1"/>
+          </p:cNvSpPr>
+          <p:nvPr>
+            <p:ph type="title"/>
+          </p:nvPr>
+        </p:nvSpPr>
+        <p:spPr/>
+        <p:txBody>
+          <a:bodyPr/>
+          <a:lstStyle/>
+          <a:p>
+            <a:r>
+              <a:rPr lang="de-DE" dirty="0"/>
+              <a:t>(weitere Befehle)</a:t>
+            </a:r>
+          </a:p>
+        </p:txBody>
+      </p:sp>
+    </p:spTree>
+    <p:extLst>
+      <p:ext uri="{BB962C8B-B14F-4D97-AF65-F5344CB8AC3E}">
+        <p14:creationId xmlns:p14="http://schemas.microsoft.com/office/powerpoint/2010/main" val="2812503263"/>
+      </p:ext>
+    </p:extLst>
+  </p:cSld>
+  <p:clrMapOvr>
+    <a:masterClrMapping/>
+  </p:clrMapOvr>
+</p:sld>
+</file>
+
+<file path=ppt/slides/slide37.xml><?xml version="1.0" encoding="utf-8"?>
+<p:sld xmlns:a="http://schemas.openxmlformats.org/drawingml/2006/main" xmlns:r="http://schemas.openxmlformats.org/officeDocument/2006/relationships" xmlns:p="http://schemas.openxmlformats.org/presentationml/2006/main">
+  <p:cSld>
+    <p:spTree>
+      <p:nvGrpSpPr>
+        <p:cNvPr id="1" name=""/>
+        <p:cNvGrpSpPr/>
+        <p:nvPr/>
+      </p:nvGrpSpPr>
+      <p:grpSpPr>
+        <a:xfrm>
+          <a:off x="0" y="0"/>
+          <a:ext cx="0" cy="0"/>
+          <a:chOff x="0" y="0"/>
+          <a:chExt cx="0" cy="0"/>
+        </a:xfrm>
+      </p:grpSpPr>
+      <p:sp>
+        <p:nvSpPr>
+          <p:cNvPr id="2" name="Titel 1">
+            <a:extLst>
+              <a:ext uri="{FF2B5EF4-FFF2-40B4-BE49-F238E27FC236}">
+                <a16:creationId xmlns:a16="http://schemas.microsoft.com/office/drawing/2014/main" id="{CFC30C4B-71C7-4535-8A5A-F0F266237AFD}"/>
+              </a:ext>
+            </a:extLst>
+          </p:cNvPr>
+          <p:cNvSpPr>
+            <a:spLocks noGrp="1"/>
+          </p:cNvSpPr>
+          <p:nvPr>
+            <p:ph type="title"/>
+          </p:nvPr>
+        </p:nvSpPr>
+        <p:spPr/>
+        <p:txBody>
+          <a:bodyPr/>
+          <a:lstStyle/>
+          <a:p>
+            <a:r>
+              <a:rPr lang="de-DE" dirty="0"/>
+              <a:t>Interne Datenverwaltung</a:t>
+            </a:r>
+          </a:p>
+        </p:txBody>
+      </p:sp>
+    </p:spTree>
+    <p:extLst>
+      <p:ext uri="{BB962C8B-B14F-4D97-AF65-F5344CB8AC3E}">
+        <p14:creationId xmlns:p14="http://schemas.microsoft.com/office/powerpoint/2010/main" val="3431436470"/>
+      </p:ext>
+    </p:extLst>
+  </p:cSld>
+  <p:clrMapOvr>
+    <a:masterClrMapping/>
+  </p:clrMapOvr>
+</p:sld>
+</file>
+
+<file path=ppt/slides/slide38.xml><?xml version="1.0" encoding="utf-8"?>
+<p:sld xmlns:a="http://schemas.openxmlformats.org/drawingml/2006/main" xmlns:r="http://schemas.openxmlformats.org/officeDocument/2006/relationships" xmlns:p="http://schemas.openxmlformats.org/presentationml/2006/main">
+  <p:cSld>
+    <p:spTree>
+      <p:nvGrpSpPr>
+        <p:cNvPr id="1" name=""/>
+        <p:cNvGrpSpPr/>
+        <p:nvPr/>
+      </p:nvGrpSpPr>
+      <p:grpSpPr>
+        <a:xfrm>
+          <a:off x="0" y="0"/>
+          <a:ext cx="0" cy="0"/>
+          <a:chOff x="0" y="0"/>
+          <a:chExt cx="0" cy="0"/>
+        </a:xfrm>
+      </p:grpSpPr>
+      <p:sp>
+        <p:nvSpPr>
+          <p:cNvPr id="2" name="Inhaltsplatzhalter 1">
+            <a:extLst>
+              <a:ext uri="{FF2B5EF4-FFF2-40B4-BE49-F238E27FC236}">
+                <a16:creationId xmlns:a16="http://schemas.microsoft.com/office/drawing/2014/main" id="{9B864C66-43F1-46C2-8FC8-9664077D03A3}"/>
+              </a:ext>
+            </a:extLst>
+          </p:cNvPr>
+          <p:cNvSpPr>
+            <a:spLocks noGrp="1"/>
+          </p:cNvSpPr>
+          <p:nvPr>
+            <p:ph idx="13"/>
+          </p:nvPr>
+        </p:nvSpPr>
+        <p:spPr/>
+        <p:txBody>
+          <a:bodyPr/>
+          <a:lstStyle/>
+          <a:p>
+            <a:endParaRPr lang="de-DE"/>
+          </a:p>
+        </p:txBody>
+      </p:sp>
+      <p:sp>
+        <p:nvSpPr>
+          <p:cNvPr id="3" name="Titel 2">
+            <a:extLst>
+              <a:ext uri="{FF2B5EF4-FFF2-40B4-BE49-F238E27FC236}">
+                <a16:creationId xmlns:a16="http://schemas.microsoft.com/office/drawing/2014/main" id="{12B95230-129D-4CEE-9B2F-9994AC9EA010}"/>
+              </a:ext>
+            </a:extLst>
+          </p:cNvPr>
+          <p:cNvSpPr>
+            <a:spLocks noGrp="1"/>
+          </p:cNvSpPr>
+          <p:nvPr>
+            <p:ph type="title" idx="4294967295"/>
+          </p:nvPr>
+        </p:nvSpPr>
+        <p:spPr/>
+        <p:txBody>
+          <a:bodyPr/>
+          <a:lstStyle/>
+          <a:p>
+            <a:endParaRPr lang="de-DE"/>
+          </a:p>
+        </p:txBody>
+      </p:sp>
+    </p:spTree>
+    <p:extLst>
+      <p:ext uri="{BB962C8B-B14F-4D97-AF65-F5344CB8AC3E}">
+        <p14:creationId xmlns:p14="http://schemas.microsoft.com/office/powerpoint/2010/main" val="2659165292"/>
       </p:ext>
     </p:extLst>
   </p:cSld>
@@ -4706,10 +7219,10 @@
       </p:grpSpPr>
       <p:sp>
         <p:nvSpPr>
-          <p:cNvPr id="2" name="Inhaltsplatzhalter 1">
-            <a:extLst>
-              <a:ext uri="{FF2B5EF4-FFF2-40B4-BE49-F238E27FC236}">
-                <a16:creationId xmlns:a16="http://schemas.microsoft.com/office/drawing/2014/main" id="{16684379-E404-4E8F-9741-934D7728F904}"/>
+          <p:cNvPr id="4" name="Inhaltsplatzhalter 3">
+            <a:extLst>
+              <a:ext uri="{FF2B5EF4-FFF2-40B4-BE49-F238E27FC236}">
+                <a16:creationId xmlns:a16="http://schemas.microsoft.com/office/drawing/2014/main" id="{3401F220-DA18-4A6D-9D34-63BDF7C2168F}"/>
               </a:ext>
             </a:extLst>
           </p:cNvPr>
@@ -4720,12 +7233,102 @@
             <p:ph idx="13"/>
           </p:nvPr>
         </p:nvSpPr>
-        <p:spPr/>
-        <p:txBody>
-          <a:bodyPr/>
-          <a:lstStyle/>
-          <a:p>
-            <a:endParaRPr lang="de-DE"/>
+        <p:spPr>
+          <a:xfrm>
+            <a:off x="1011835" y="1245328"/>
+            <a:ext cx="7410711" cy="4931635"/>
+          </a:xfrm>
+        </p:spPr>
+        <p:txBody>
+          <a:bodyPr>
+            <a:normAutofit/>
+          </a:bodyPr>
+          <a:lstStyle/>
+          <a:p>
+            <a:pPr marL="0" indent="0">
+              <a:buNone/>
+            </a:pPr>
+            <a:r>
+              <a:rPr lang="de-DE" i="1" dirty="0" err="1"/>
+              <a:t>objects</a:t>
+            </a:r>
+            <a:r>
+              <a:rPr lang="de-DE" dirty="0"/>
+              <a:t>: enthält alle Dateien 				       	die versioniert werden</a:t>
+            </a:r>
+          </a:p>
+          <a:p>
+            <a:pPr marL="0" indent="0">
+              <a:buNone/>
+            </a:pPr>
+            <a:r>
+              <a:rPr lang="de-DE" i="1" dirty="0" err="1"/>
+              <a:t>refs</a:t>
+            </a:r>
+            <a:r>
+              <a:rPr lang="de-DE" dirty="0"/>
+              <a:t>: 	enthält Verweise auf 				 	Zweige und </a:t>
+            </a:r>
+            <a:r>
+              <a:rPr lang="de-DE" dirty="0" err="1"/>
+              <a:t>Ettiketten</a:t>
+            </a:r>
+            <a:endParaRPr lang="de-DE" dirty="0"/>
+          </a:p>
+          <a:p>
+            <a:pPr marL="0" indent="0">
+              <a:buNone/>
+            </a:pPr>
+            <a:r>
+              <a:rPr lang="de-DE" i="1" dirty="0"/>
+              <a:t>logs</a:t>
+            </a:r>
+            <a:r>
+              <a:rPr lang="de-DE" dirty="0"/>
+              <a:t>: 	enthält Informationen          		   	        	zu Commit Historie und 			              	Historie der Zweige und 		              	Arbeitsverzeichnisse</a:t>
+            </a:r>
+          </a:p>
+          <a:p>
+            <a:pPr marL="0" indent="0">
+              <a:buNone/>
+            </a:pPr>
+            <a:r>
+              <a:rPr lang="de-DE" i="1" dirty="0" err="1"/>
+              <a:t>hooks</a:t>
+            </a:r>
+            <a:r>
+              <a:rPr lang="de-DE" dirty="0"/>
+              <a:t>: 	enthält Shell Skripte, die bei Git Kommandos 		ausgeführt werden</a:t>
+            </a:r>
+          </a:p>
+          <a:p>
+            <a:pPr marL="0" indent="0">
+              <a:buNone/>
+            </a:pPr>
+            <a:r>
+              <a:rPr lang="de-DE" i="1" dirty="0" err="1"/>
+              <a:t>config</a:t>
+            </a:r>
+            <a:r>
+              <a:rPr lang="de-DE" dirty="0"/>
+              <a:t>: 	enthält Informationen und Einstellungen für das 		Projektarchiv</a:t>
+            </a:r>
+          </a:p>
+          <a:p>
+            <a:pPr marL="0" indent="0">
+              <a:buNone/>
+            </a:pPr>
+            <a:r>
+              <a:rPr lang="de-DE" i="1" dirty="0"/>
+              <a:t>HEAD</a:t>
+            </a:r>
+            <a:r>
+              <a:rPr lang="de-DE" dirty="0"/>
+              <a:t>: </a:t>
+            </a:r>
+          </a:p>
+          <a:p>
+            <a:endParaRPr lang="de-DE" dirty="0"/>
           </a:p>
         </p:txBody>
       </p:sp>
@@ -4752,16 +7355,53 @@
           <a:p>
             <a:r>
               <a:rPr lang="de-DE" dirty="0"/>
-              <a:t>.</a:t>
-            </a:r>
-            <a:r>
-              <a:rPr lang="de-DE" dirty="0" err="1"/>
-              <a:t>git</a:t>
-            </a:r>
-            <a:endParaRPr lang="de-DE" dirty="0"/>
-          </a:p>
-        </p:txBody>
-      </p:sp>
+              <a:t>.git</a:t>
+            </a:r>
+          </a:p>
+        </p:txBody>
+      </p:sp>
+      <p:pic>
+        <p:nvPicPr>
+          <p:cNvPr id="5" name="Grafik 4">
+            <a:extLst>
+              <a:ext uri="{FF2B5EF4-FFF2-40B4-BE49-F238E27FC236}">
+                <a16:creationId xmlns:a16="http://schemas.microsoft.com/office/drawing/2014/main" id="{A14967B5-EC3F-42A0-9D14-71B7A974C69E}"/>
+              </a:ext>
+            </a:extLst>
+          </p:cNvPr>
+          <p:cNvPicPr/>
+          <p:nvPr/>
+        </p:nvPicPr>
+        <p:blipFill rotWithShape="1">
+          <a:blip r:embed="rId2">
+            <a:extLst>
+              <a:ext uri="{28A0092B-C50C-407E-A947-70E740481C1C}">
+                <a14:useLocalDpi xmlns:a14="http://schemas.microsoft.com/office/drawing/2010/main" val="0"/>
+              </a:ext>
+            </a:extLst>
+          </a:blip>
+          <a:srcRect l="30944" t="28922" r="26210" b="27839"/>
+          <a:stretch/>
+        </p:blipFill>
+        <p:spPr bwMode="auto">
+          <a:xfrm>
+            <a:off x="5082077" y="1444567"/>
+            <a:ext cx="3560163" cy="1984433"/>
+          </a:xfrm>
+          <a:prstGeom prst="rect">
+            <a:avLst/>
+          </a:prstGeom>
+          <a:noFill/>
+          <a:ln>
+            <a:noFill/>
+          </a:ln>
+          <a:extLst>
+            <a:ext uri="{53640926-AAD7-44D8-BBD7-CCE9431645EC}">
+              <a14:shadowObscured xmlns:a14="http://schemas.microsoft.com/office/drawing/2010/main"/>
+            </a:ext>
+          </a:extLst>
+        </p:spPr>
+      </p:pic>
     </p:spTree>
     <p:extLst>
       <p:ext uri="{BB962C8B-B14F-4D97-AF65-F5344CB8AC3E}">
@@ -4863,119 +7503,99 @@
           <a:p>
             <a:pPr lvl="1"/>
             <a:r>
+              <a:rPr lang="de-DE" b="1" i="1" dirty="0"/>
+              <a:t>git </a:t>
+            </a:r>
+            <a:r>
               <a:rPr lang="de-DE" b="1" i="1" dirty="0" err="1"/>
-              <a:t>git</a:t>
+              <a:t>config</a:t>
+            </a:r>
+            <a:r>
+              <a:rPr lang="de-DE" b="1" i="1" dirty="0"/>
+              <a:t> --global –</a:t>
+            </a:r>
+            <a:r>
+              <a:rPr lang="de-DE" b="1" i="1" dirty="0" err="1"/>
+              <a:t>edit</a:t>
+            </a:r>
+            <a:endParaRPr lang="de-DE" b="1" i="1" dirty="0"/>
+          </a:p>
+          <a:p>
+            <a:r>
+              <a:rPr lang="de-DE" dirty="0"/>
+              <a:t>Alias für Befehle angeben:</a:t>
+            </a:r>
+          </a:p>
+          <a:p>
+            <a:pPr lvl="1"/>
+            <a:r>
+              <a:rPr lang="de-DE" b="1" i="1" dirty="0"/>
+              <a:t>git </a:t>
+            </a:r>
+            <a:r>
+              <a:rPr lang="de-DE" b="1" i="1" dirty="0" err="1"/>
+              <a:t>config</a:t>
+            </a:r>
+            <a:r>
+              <a:rPr lang="de-DE" b="1" i="1" dirty="0"/>
+              <a:t> alias.</a:t>
+            </a:r>
+            <a:r>
+              <a:rPr lang="en-US" b="1" i="1" dirty="0"/>
+              <a:t> "</a:t>
+            </a:r>
+            <a:r>
+              <a:rPr lang="de-DE" b="1" i="1" dirty="0"/>
+              <a:t>&lt;Alias Name&gt;</a:t>
+            </a:r>
+            <a:r>
+              <a:rPr lang="en-US" b="1" i="1" dirty="0"/>
+              <a:t>"</a:t>
             </a:r>
             <a:r>
               <a:rPr lang="de-DE" b="1" i="1" dirty="0"/>
               <a:t> </a:t>
             </a:r>
             <a:r>
+              <a:rPr lang="en-US" b="1" i="1" dirty="0"/>
+              <a:t>"</a:t>
+            </a:r>
+            <a:r>
+              <a:rPr lang="de-DE" b="1" i="1" dirty="0"/>
+              <a:t>&lt;Git Kommando&gt;</a:t>
+            </a:r>
+            <a:r>
+              <a:rPr lang="en-US" b="1" i="1" dirty="0"/>
+              <a:t>"</a:t>
+            </a:r>
+            <a:endParaRPr lang="de-DE" b="1" i="1" dirty="0"/>
+          </a:p>
+          <a:p>
+            <a:r>
+              <a:rPr lang="de-DE" dirty="0"/>
+              <a:t>Einstellungen </a:t>
+            </a:r>
+            <a:r>
+              <a:rPr lang="de-DE" dirty="0" err="1"/>
+              <a:t>einshehen</a:t>
+            </a:r>
+            <a:r>
+              <a:rPr lang="de-DE" dirty="0"/>
+              <a:t>:</a:t>
+            </a:r>
+          </a:p>
+          <a:p>
+            <a:pPr lvl="1"/>
+            <a:r>
+              <a:rPr lang="de-DE" b="1" i="1" dirty="0"/>
+              <a:t>git </a:t>
+            </a:r>
+            <a:r>
               <a:rPr lang="de-DE" b="1" i="1" dirty="0" err="1"/>
               <a:t>config</a:t>
             </a:r>
             <a:r>
               <a:rPr lang="de-DE" b="1" i="1" dirty="0"/>
-              <a:t> --global –</a:t>
-            </a:r>
-            <a:r>
-              <a:rPr lang="de-DE" b="1" i="1" dirty="0" err="1"/>
-              <a:t>edit</a:t>
-            </a:r>
-            <a:endParaRPr lang="de-DE" b="1" i="1" dirty="0"/>
-          </a:p>
-          <a:p>
-            <a:r>
-              <a:rPr lang="de-DE" dirty="0"/>
-              <a:t>Alias für Befehle angeben:</a:t>
-            </a:r>
-          </a:p>
-          <a:p>
-            <a:pPr lvl="1"/>
-            <a:r>
-              <a:rPr lang="de-DE" b="1" i="1" dirty="0" err="1"/>
-              <a:t>git</a:t>
-            </a:r>
-            <a:r>
-              <a:rPr lang="de-DE" b="1" i="1" dirty="0"/>
-              <a:t> </a:t>
-            </a:r>
-            <a:r>
-              <a:rPr lang="de-DE" b="1" i="1" dirty="0" err="1"/>
-              <a:t>config</a:t>
-            </a:r>
-            <a:r>
-              <a:rPr lang="de-DE" b="1" i="1" dirty="0"/>
-              <a:t> alias.</a:t>
-            </a:r>
-            <a:r>
-              <a:rPr lang="en-US" b="1" i="1" dirty="0"/>
-              <a:t> "</a:t>
-            </a:r>
-            <a:r>
-              <a:rPr lang="de-DE" b="1" i="1" dirty="0"/>
-              <a:t>&lt;Alias Name&gt;</a:t>
-            </a:r>
-            <a:r>
-              <a:rPr lang="en-US" b="1" i="1" dirty="0"/>
-              <a:t>"</a:t>
-            </a:r>
-            <a:r>
-              <a:rPr lang="de-DE" b="1" i="1" dirty="0"/>
-              <a:t> </a:t>
-            </a:r>
-            <a:r>
-              <a:rPr lang="en-US" b="1" i="1" dirty="0"/>
-              <a:t>"</a:t>
-            </a:r>
-            <a:r>
-              <a:rPr lang="de-DE" b="1" i="1" dirty="0"/>
-              <a:t>&lt;</a:t>
-            </a:r>
-            <a:r>
-              <a:rPr lang="de-DE" b="1" i="1" dirty="0" err="1"/>
-              <a:t>Git</a:t>
-            </a:r>
-            <a:r>
-              <a:rPr lang="de-DE" b="1" i="1" dirty="0"/>
-              <a:t> Kommando&gt;</a:t>
-            </a:r>
-            <a:r>
-              <a:rPr lang="en-US" b="1" i="1" dirty="0"/>
-              <a:t>"</a:t>
-            </a:r>
-            <a:endParaRPr lang="de-DE" b="1" i="1" dirty="0"/>
-          </a:p>
-          <a:p>
-            <a:r>
-              <a:rPr lang="de-DE" dirty="0"/>
-              <a:t>Einstellungen </a:t>
-            </a:r>
-            <a:r>
-              <a:rPr lang="de-DE" dirty="0" err="1"/>
-              <a:t>einshehen</a:t>
-            </a:r>
-            <a:r>
-              <a:rPr lang="de-DE" dirty="0"/>
-              <a:t>:</a:t>
-            </a:r>
-          </a:p>
-          <a:p>
-            <a:pPr lvl="1"/>
-            <a:r>
-              <a:rPr lang="de-DE" b="1" i="1" dirty="0" err="1"/>
-              <a:t>git</a:t>
-            </a:r>
-            <a:r>
-              <a:rPr lang="de-DE" b="1" i="1" dirty="0"/>
-              <a:t> </a:t>
-            </a:r>
-            <a:r>
-              <a:rPr lang="de-DE" b="1" i="1" dirty="0" err="1"/>
-              <a:t>config</a:t>
-            </a:r>
-            <a:r>
-              <a:rPr lang="de-DE" b="1" i="1" dirty="0"/>
               <a:t> –</a:t>
             </a:r>
             <a:r>
@@ -5010,14 +7630,6 @@
             <a:r>
               <a:rPr lang="de-DE" dirty="0" err="1"/>
               <a:t>Config</a:t>
-            </a:r>
-            <a:r>
-              <a:rPr lang="de-DE" dirty="0"/>
-              <a:t> / </a:t>
-            </a:r>
-            <a:r>
-              <a:rPr lang="de-DE" dirty="0" err="1"/>
-              <a:t>gitignore</a:t>
             </a:r>
             <a:endParaRPr lang="de-DE" dirty="0"/>
           </a:p>
@@ -5333,10 +7945,10 @@
       </p:grpSpPr>
       <p:sp>
         <p:nvSpPr>
-          <p:cNvPr id="2" name="Inhaltsplatzhalter 1">
-            <a:extLst>
-              <a:ext uri="{FF2B5EF4-FFF2-40B4-BE49-F238E27FC236}">
-                <a16:creationId xmlns:a16="http://schemas.microsoft.com/office/drawing/2014/main" id="{14481AD2-FFD5-43C0-9E6D-FE125D0E6632}"/>
+          <p:cNvPr id="4" name="Inhaltsplatzhalter 3">
+            <a:extLst>
+              <a:ext uri="{FF2B5EF4-FFF2-40B4-BE49-F238E27FC236}">
+                <a16:creationId xmlns:a16="http://schemas.microsoft.com/office/drawing/2014/main" id="{E5BD01B8-4446-4A6A-B577-3120AF2FB7AE}"/>
               </a:ext>
             </a:extLst>
           </p:cNvPr>
@@ -5352,7 +7964,7 @@
           <a:bodyPr/>
           <a:lstStyle/>
           <a:p>
-            <a:endParaRPr lang="de-DE" dirty="0"/>
+            <a:endParaRPr lang="de-DE"/>
           </a:p>
         </p:txBody>
       </p:sp>
@@ -5388,6 +8000,149 @@
     <p:extLst>
       <p:ext uri="{BB962C8B-B14F-4D97-AF65-F5344CB8AC3E}">
         <p14:creationId xmlns:p14="http://schemas.microsoft.com/office/powerpoint/2010/main" val="2123715963"/>
+      </p:ext>
+    </p:extLst>
+  </p:cSld>
+  <p:clrMapOvr>
+    <a:masterClrMapping/>
+  </p:clrMapOvr>
+</p:sld>
+</file>
+
+<file path=ppt/slides/slide8.xml><?xml version="1.0" encoding="utf-8"?>
+<p:sld xmlns:a="http://schemas.openxmlformats.org/drawingml/2006/main" xmlns:r="http://schemas.openxmlformats.org/officeDocument/2006/relationships" xmlns:p="http://schemas.openxmlformats.org/presentationml/2006/main">
+  <p:cSld>
+    <p:spTree>
+      <p:nvGrpSpPr>
+        <p:cNvPr id="1" name=""/>
+        <p:cNvGrpSpPr/>
+        <p:nvPr/>
+      </p:nvGrpSpPr>
+      <p:grpSpPr>
+        <a:xfrm>
+          <a:off x="0" y="0"/>
+          <a:ext cx="0" cy="0"/>
+          <a:chOff x="0" y="0"/>
+          <a:chExt cx="0" cy="0"/>
+        </a:xfrm>
+      </p:grpSpPr>
+      <p:sp>
+        <p:nvSpPr>
+          <p:cNvPr id="3" name="Titel 2">
+            <a:extLst>
+              <a:ext uri="{FF2B5EF4-FFF2-40B4-BE49-F238E27FC236}">
+                <a16:creationId xmlns:a16="http://schemas.microsoft.com/office/drawing/2014/main" id="{1D0D21A4-BC91-4461-A139-778A00DBE636}"/>
+              </a:ext>
+            </a:extLst>
+          </p:cNvPr>
+          <p:cNvSpPr>
+            <a:spLocks noGrp="1"/>
+          </p:cNvSpPr>
+          <p:nvPr>
+            <p:ph type="title"/>
+          </p:nvPr>
+        </p:nvSpPr>
+        <p:spPr/>
+        <p:txBody>
+          <a:bodyPr>
+            <a:normAutofit/>
+          </a:bodyPr>
+          <a:lstStyle/>
+          <a:p>
+            <a:r>
+              <a:rPr lang="de-DE" dirty="0"/>
+              <a:t>Änderungen</a:t>
+            </a:r>
+          </a:p>
+        </p:txBody>
+      </p:sp>
+    </p:spTree>
+    <p:extLst>
+      <p:ext uri="{BB962C8B-B14F-4D97-AF65-F5344CB8AC3E}">
+        <p14:creationId xmlns:p14="http://schemas.microsoft.com/office/powerpoint/2010/main" val="1159547717"/>
+      </p:ext>
+    </p:extLst>
+  </p:cSld>
+  <p:clrMapOvr>
+    <a:masterClrMapping/>
+  </p:clrMapOvr>
+</p:sld>
+</file>
+
+<file path=ppt/slides/slide9.xml><?xml version="1.0" encoding="utf-8"?>
+<p:sld xmlns:a="http://schemas.openxmlformats.org/drawingml/2006/main" xmlns:r="http://schemas.openxmlformats.org/officeDocument/2006/relationships" xmlns:p="http://schemas.openxmlformats.org/presentationml/2006/main">
+  <p:cSld>
+    <p:spTree>
+      <p:nvGrpSpPr>
+        <p:cNvPr id="1" name=""/>
+        <p:cNvGrpSpPr/>
+        <p:nvPr/>
+      </p:nvGrpSpPr>
+      <p:grpSpPr>
+        <a:xfrm>
+          <a:off x="0" y="0"/>
+          <a:ext cx="0" cy="0"/>
+          <a:chOff x="0" y="0"/>
+          <a:chExt cx="0" cy="0"/>
+        </a:xfrm>
+      </p:grpSpPr>
+      <p:sp>
+        <p:nvSpPr>
+          <p:cNvPr id="2" name="Inhaltsplatzhalter 1">
+            <a:extLst>
+              <a:ext uri="{FF2B5EF4-FFF2-40B4-BE49-F238E27FC236}">
+                <a16:creationId xmlns:a16="http://schemas.microsoft.com/office/drawing/2014/main" id="{F152AD6E-3A5F-4F40-AE51-AC630EDE1ADD}"/>
+              </a:ext>
+            </a:extLst>
+          </p:cNvPr>
+          <p:cNvSpPr>
+            <a:spLocks noGrp="1"/>
+          </p:cNvSpPr>
+          <p:nvPr>
+            <p:ph idx="13"/>
+          </p:nvPr>
+        </p:nvSpPr>
+        <p:spPr/>
+        <p:txBody>
+          <a:bodyPr/>
+          <a:lstStyle/>
+          <a:p>
+            <a:endParaRPr lang="de-DE" dirty="0"/>
+          </a:p>
+        </p:txBody>
+      </p:sp>
+      <p:sp>
+        <p:nvSpPr>
+          <p:cNvPr id="3" name="Titel 2">
+            <a:extLst>
+              <a:ext uri="{FF2B5EF4-FFF2-40B4-BE49-F238E27FC236}">
+                <a16:creationId xmlns:a16="http://schemas.microsoft.com/office/drawing/2014/main" id="{A9035D7F-C069-4FAE-AA03-CC3D6FA9F379}"/>
+              </a:ext>
+            </a:extLst>
+          </p:cNvPr>
+          <p:cNvSpPr>
+            <a:spLocks noGrp="1"/>
+          </p:cNvSpPr>
+          <p:nvPr>
+            <p:ph type="title" idx="4294967295"/>
+          </p:nvPr>
+        </p:nvSpPr>
+        <p:spPr/>
+        <p:txBody>
+          <a:bodyPr/>
+          <a:lstStyle/>
+          <a:p>
+            <a:r>
+              <a:rPr lang="de-DE" dirty="0"/>
+              <a:t>Commit</a:t>
+            </a:r>
+          </a:p>
+        </p:txBody>
+      </p:sp>
+    </p:spTree>
+    <p:extLst>
+      <p:ext uri="{BB962C8B-B14F-4D97-AF65-F5344CB8AC3E}">
+        <p14:creationId xmlns:p14="http://schemas.microsoft.com/office/powerpoint/2010/main" val="4291075975"/>
       </p:ext>
     </p:extLst>
   </p:cSld>

</xml_diff>

<commit_message>
Modified 90min Präsi and Doku
fixed Doku error
added problemstellungen in präsi
added some bullet points
</commit_message>
<xml_diff>
--- a/Präsentation-90min/Präsentation-90min.pptx
+++ b/Präsentation-90min/Präsentation-90min.pptx
@@ -5,7 +5,7 @@
     <p:sldMasterId id="2147483660" r:id="rId1"/>
   </p:sldMasterIdLst>
   <p:notesMasterIdLst>
-    <p:notesMasterId r:id="rId42"/>
+    <p:notesMasterId r:id="rId41"/>
   </p:notesMasterIdLst>
   <p:sldIdLst>
     <p:sldId id="310" r:id="rId2"/>
@@ -40,14 +40,13 @@
     <p:sldId id="309" r:id="rId31"/>
     <p:sldId id="299" r:id="rId32"/>
     <p:sldId id="300" r:id="rId33"/>
-    <p:sldId id="301" r:id="rId34"/>
-    <p:sldId id="303" r:id="rId35"/>
-    <p:sldId id="302" r:id="rId36"/>
+    <p:sldId id="303" r:id="rId34"/>
+    <p:sldId id="302" r:id="rId35"/>
+    <p:sldId id="312" r:id="rId36"/>
     <p:sldId id="304" r:id="rId37"/>
     <p:sldId id="305" r:id="rId38"/>
-    <p:sldId id="306" r:id="rId39"/>
-    <p:sldId id="308" r:id="rId40"/>
-    <p:sldId id="307" r:id="rId41"/>
+    <p:sldId id="308" r:id="rId39"/>
+    <p:sldId id="307" r:id="rId40"/>
   </p:sldIdLst>
   <p:sldSz cx="9144000" cy="6858000" type="screen4x3"/>
   <p:notesSz cx="6858000" cy="9144000"/>
@@ -291,7 +290,7 @@
           <a:p>
             <a:fld id="{A1E1CD49-93F9-4EB7-9AB7-31369D3CCD5D}" type="datetimeFigureOut">
               <a:rPr lang="de-DE" smtClean="0"/>
-              <a:t>20.03.2020</a:t>
+              <a:t>21.03.2020</a:t>
             </a:fld>
             <a:endParaRPr lang="de-DE"/>
           </a:p>
@@ -692,7 +691,7 @@
           <a:p>
             <a:fld id="{7CDC51D4-4F8D-402A-BD06-90531D3D0B0E}" type="datetime1">
               <a:rPr lang="de-DE" smtClean="0"/>
-              <a:t>20.03.2020</a:t>
+              <a:t>21.03.2020</a:t>
             </a:fld>
             <a:endParaRPr lang="de-DE"/>
           </a:p>
@@ -870,7 +869,7 @@
           <a:p>
             <a:fld id="{3608FC1D-F958-4804-B298-25E0F93B1193}" type="datetime1">
               <a:rPr lang="de-DE" smtClean="0"/>
-              <a:t>20.03.2020</a:t>
+              <a:t>21.03.2020</a:t>
             </a:fld>
             <a:endParaRPr lang="de-DE"/>
           </a:p>
@@ -1053,7 +1052,7 @@
           <a:p>
             <a:fld id="{853E26B7-2C61-49BA-838E-19A37BCD9623}" type="datetime1">
               <a:rPr lang="de-DE" smtClean="0"/>
-              <a:t>20.03.2020</a:t>
+              <a:t>21.03.2020</a:t>
             </a:fld>
             <a:endParaRPr lang="de-DE"/>
           </a:p>
@@ -1348,7 +1347,7 @@
             <a:fld id="{6F7941D6-DDCD-4FEB-B76A-6EA7C7E1DF91}" type="datetime1">
               <a:rPr lang="de-DE" smtClean="0"/>
               <a:pPr/>
-              <a:t>20.03.2020</a:t>
+              <a:t>21.03.2020</a:t>
             </a:fld>
             <a:endParaRPr lang="de-DE" dirty="0"/>
           </a:p>
@@ -2146,7 +2145,7 @@
           <a:p>
             <a:fld id="{625025DE-6FE8-4EA0-83A6-6CAFC8B06972}" type="datetime1">
               <a:rPr lang="de-DE" smtClean="0"/>
-              <a:t>20.03.2020</a:t>
+              <a:t>21.03.2020</a:t>
             </a:fld>
             <a:endParaRPr lang="de-DE"/>
           </a:p>
@@ -2516,7 +2515,7 @@
           <a:p>
             <a:fld id="{247D6157-A9C6-4111-84CF-F4ABC9BB74CD}" type="datetime1">
               <a:rPr lang="de-DE" smtClean="0"/>
-              <a:t>20.03.2020</a:t>
+              <a:t>21.03.2020</a:t>
             </a:fld>
             <a:endParaRPr lang="de-DE"/>
           </a:p>
@@ -2642,7 +2641,7 @@
           <a:p>
             <a:fld id="{8EBDA223-4612-4606-8A30-596D72469CD7}" type="datetime1">
               <a:rPr lang="de-DE" smtClean="0"/>
-              <a:t>20.03.2020</a:t>
+              <a:t>21.03.2020</a:t>
             </a:fld>
             <a:endParaRPr lang="de-DE"/>
           </a:p>
@@ -2737,7 +2736,7 @@
           <a:p>
             <a:fld id="{5C800F00-9786-41ED-9D90-88F7ADE0F2B0}" type="datetime1">
               <a:rPr lang="de-DE" smtClean="0"/>
-              <a:t>20.03.2020</a:t>
+              <a:t>21.03.2020</a:t>
             </a:fld>
             <a:endParaRPr lang="de-DE"/>
           </a:p>
@@ -3017,7 +3016,7 @@
           <a:p>
             <a:fld id="{DE94FA33-7DFF-4544-8A2D-E09A4E33D92E}" type="datetime1">
               <a:rPr lang="de-DE" smtClean="0"/>
-              <a:t>20.03.2020</a:t>
+              <a:t>21.03.2020</a:t>
             </a:fld>
             <a:endParaRPr lang="de-DE"/>
           </a:p>
@@ -3277,7 +3276,7 @@
           <a:p>
             <a:fld id="{10F76841-BABD-4AE4-8760-966DF476109C}" type="datetime1">
               <a:rPr lang="de-DE" smtClean="0"/>
-              <a:t>20.03.2020</a:t>
+              <a:t>21.03.2020</a:t>
             </a:fld>
             <a:endParaRPr lang="de-DE"/>
           </a:p>
@@ -3490,7 +3489,7 @@
           <a:p>
             <a:fld id="{34C5C537-7C07-410D-9EF1-F90075952502}" type="datetime1">
               <a:rPr lang="de-DE" smtClean="0"/>
-              <a:t>20.03.2020</a:t>
+              <a:t>21.03.2020</a:t>
             </a:fld>
             <a:endParaRPr lang="de-DE"/>
           </a:p>
@@ -3919,7 +3918,75 @@
           <a:bodyPr/>
           <a:lstStyle/>
           <a:p>
-            <a:endParaRPr lang="de-DE"/>
+            <a:r>
+              <a:rPr lang="de-DE" dirty="0"/>
+              <a:t>Einzelne strukturierte Ablage für die Daten eines Projekts</a:t>
+            </a:r>
+          </a:p>
+          <a:p>
+            <a:r>
+              <a:rPr lang="de-DE" dirty="0"/>
+              <a:t>Detaillierte Historie zur einfachen Wartung und Klärung der Verantwortlichkeit</a:t>
+            </a:r>
+          </a:p>
+          <a:p>
+            <a:pPr lvl="1"/>
+            <a:r>
+              <a:rPr lang="de-DE" dirty="0"/>
+              <a:t>Einfacher Sprung zu älteren Ständen</a:t>
+            </a:r>
+          </a:p>
+          <a:p>
+            <a:r>
+              <a:rPr lang="de-DE" dirty="0"/>
+              <a:t>Möglichkeit zur effizienten parallelen Entwicklung</a:t>
+            </a:r>
+          </a:p>
+          <a:p>
+            <a:pPr lvl="1"/>
+            <a:r>
+              <a:rPr lang="de-DE" dirty="0"/>
+              <a:t>Isolierte Entwicklungsstände, Trennung der Verantwortlichkeiten</a:t>
+            </a:r>
+          </a:p>
+          <a:p>
+            <a:pPr lvl="1"/>
+            <a:r>
+              <a:rPr lang="de-DE" dirty="0"/>
+              <a:t>Dezentrale Verwaltung: </a:t>
+            </a:r>
+            <a:br>
+              <a:rPr lang="de-DE" dirty="0"/>
+            </a:br>
+            <a:r>
+              <a:rPr lang="de-DE" dirty="0"/>
+              <a:t>Keine Sperrung von Dateien, Offlinearbeit möglich</a:t>
+            </a:r>
+          </a:p>
+          <a:p>
+            <a:pPr lvl="1"/>
+            <a:r>
+              <a:rPr lang="de-DE" dirty="0"/>
+              <a:t>Funktionen zur schnellen Zusammenführung mehrerer Stände</a:t>
+            </a:r>
+          </a:p>
+          <a:p>
+            <a:r>
+              <a:rPr lang="de-DE" dirty="0"/>
+              <a:t>Sichert Integrität von Daten über Checksummen</a:t>
+            </a:r>
+          </a:p>
+          <a:p>
+            <a:r>
+              <a:rPr lang="de-DE" dirty="0"/>
+              <a:t>Automatische Sicherung der Projektdaten durch jeden Mitarbeiter</a:t>
+            </a:r>
+          </a:p>
+          <a:p>
+            <a:r>
+              <a:rPr lang="de-DE" dirty="0"/>
+              <a:t>Bietet große Community und viele Funktionen durch Drittanbieter</a:t>
+            </a:r>
           </a:p>
         </p:txBody>
       </p:sp>
@@ -3941,12 +4008,22 @@
         </p:nvSpPr>
         <p:spPr/>
         <p:txBody>
-          <a:bodyPr/>
+          <a:bodyPr>
+            <a:normAutofit fontScale="90000"/>
+          </a:bodyPr>
           <a:lstStyle/>
           <a:p>
             <a:r>
               <a:rPr lang="de-DE" dirty="0"/>
-              <a:t>Probleme der Entwickler</a:t>
+              <a:t>Vorteile von </a:t>
+            </a:r>
+            <a:r>
+              <a:rPr lang="de-DE" dirty="0" err="1"/>
+              <a:t>Git</a:t>
+            </a:r>
+            <a:r>
+              <a:rPr lang="de-DE" dirty="0"/>
+              <a:t> innerhalb einer Projektentwicklung</a:t>
             </a:r>
           </a:p>
         </p:txBody>
@@ -6068,14 +6145,14 @@
           <a:p>
             <a:r>
               <a:rPr lang="de-DE" dirty="0"/>
-              <a:t>Isolation von verschiedenen Ansätzen</a:t>
+              <a:t>Isolation von verschiedenen Ansätzen / Verantwortlichkeiten</a:t>
             </a:r>
           </a:p>
           <a:p>
             <a:pPr lvl="1"/>
             <a:r>
               <a:rPr lang="de-DE" dirty="0"/>
-              <a:t>Themenbezogene Zweige</a:t>
+              <a:t>Funktionsbezogene Zweige</a:t>
             </a:r>
           </a:p>
           <a:p>
@@ -6088,7 +6165,7 @@
             <a:pPr lvl="1"/>
             <a:r>
               <a:rPr lang="de-DE" dirty="0"/>
-              <a:t>Integration nur an bestimmten Ständen von Zweigen</a:t>
+              <a:t>Integration nur zu bestimmten Ständen von Zweigen</a:t>
             </a:r>
           </a:p>
           <a:p>
@@ -6108,6 +6185,12 @@
             <a:r>
               <a:rPr lang="de-DE" dirty="0"/>
               <a:t>Fördert Übersichtlichkeit einzelner Zweige</a:t>
+            </a:r>
+          </a:p>
+          <a:p>
+            <a:r>
+              <a:rPr lang="de-DE" dirty="0"/>
+              <a:t>Einfach Handhabung mehrere Stände</a:t>
             </a:r>
           </a:p>
         </p:txBody>
@@ -8877,6 +8960,36 @@
           <a:chExt cx="0" cy="0"/>
         </a:xfrm>
       </p:grpSpPr>
+      <p:pic>
+        <p:nvPicPr>
+          <p:cNvPr id="4" name="Grafik 3">
+            <a:extLst>
+              <a:ext uri="{FF2B5EF4-FFF2-40B4-BE49-F238E27FC236}">
+                <a16:creationId xmlns:a16="http://schemas.microsoft.com/office/drawing/2014/main" id="{F27A43C5-2A7D-42CC-8CB3-E591EA56319C}"/>
+              </a:ext>
+            </a:extLst>
+          </p:cNvPr>
+          <p:cNvPicPr>
+            <a:picLocks noChangeAspect="1"/>
+          </p:cNvPicPr>
+          <p:nvPr/>
+        </p:nvPicPr>
+        <p:blipFill>
+          <a:blip r:embed="rId2"/>
+          <a:stretch>
+            <a:fillRect/>
+          </a:stretch>
+        </p:blipFill>
+        <p:spPr>
+          <a:xfrm>
+            <a:off x="2496774" y="4229229"/>
+            <a:ext cx="4348555" cy="2078893"/>
+          </a:xfrm>
+          <a:prstGeom prst="rect">
+            <a:avLst/>
+          </a:prstGeom>
+        </p:spPr>
+      </p:pic>
       <p:sp>
         <p:nvSpPr>
           <p:cNvPr id="2" name="Inhaltsplatzhalter 1">
@@ -8893,12 +9006,62 @@
             <p:ph idx="13"/>
           </p:nvPr>
         </p:nvSpPr>
-        <p:spPr/>
-        <p:txBody>
-          <a:bodyPr/>
+        <p:spPr>
+          <a:xfrm>
+            <a:off x="1011836" y="1245328"/>
+            <a:ext cx="7318432" cy="4931635"/>
+          </a:xfrm>
+        </p:spPr>
+        <p:txBody>
+          <a:bodyPr>
+            <a:normAutofit/>
+          </a:bodyPr>
           <a:lstStyle/>
           <a:p>
-            <a:endParaRPr lang="de-DE"/>
+            <a:r>
+              <a:rPr lang="de-DE" sz="1800" dirty="0"/>
+              <a:t>Verwaltung von Dateien gehörend zu einem Projekt</a:t>
+            </a:r>
+          </a:p>
+          <a:p>
+            <a:r>
+              <a:rPr lang="de-DE" sz="1800" dirty="0"/>
+              <a:t>Änderungen innerhalb des </a:t>
+            </a:r>
+            <a:r>
+              <a:rPr lang="de-DE" sz="1800" dirty="0" err="1"/>
+              <a:t>Git</a:t>
+            </a:r>
+            <a:r>
+              <a:rPr lang="de-DE" sz="1800" dirty="0"/>
+              <a:t> Projektverzeichnisses können durch Schnappschüsse (</a:t>
+            </a:r>
+            <a:r>
+              <a:rPr lang="de-DE" sz="1800" dirty="0" err="1"/>
+              <a:t>Commits</a:t>
+            </a:r>
+            <a:r>
+              <a:rPr lang="de-DE" sz="1800" dirty="0"/>
+              <a:t>) festgehalten werden</a:t>
+            </a:r>
+          </a:p>
+          <a:p>
+            <a:r>
+              <a:rPr lang="de-DE" sz="1800" dirty="0"/>
+              <a:t>Die Schnappschüsse dokumentieren den jeweiligen Stand des Projekts (des Verzeichnisses) und können jederzeit referenziert werden</a:t>
+            </a:r>
+          </a:p>
+          <a:p>
+            <a:r>
+              <a:rPr lang="de-DE" sz="1800" dirty="0"/>
+              <a:t>Für effektives Arbeiten werden mehrere isolierte Abfolgen  von Schnappschüssen aufgebaut und die Historien mit Projektmitglieder synchronisiert</a:t>
+            </a:r>
+          </a:p>
+          <a:p>
+            <a:r>
+              <a:rPr lang="de-DE" sz="1800" dirty="0"/>
+              <a:t>Jeder besitzt das komplette Projekt lokal</a:t>
+            </a:r>
           </a:p>
         </p:txBody>
       </p:sp>
@@ -9054,7 +9217,7 @@
             <a:pPr lvl="1"/>
             <a:r>
               <a:rPr lang="de-DE" dirty="0"/>
-              <a:t>Erzeugung von Ausgangslage für fast-forward Zusammenführungen</a:t>
+              <a:t>Erzeugung von Ausgangslagen für fast-forward Zusammenführungen</a:t>
             </a:r>
           </a:p>
           <a:p>
@@ -11429,15 +11592,33 @@
             <p:ph idx="13"/>
           </p:nvPr>
         </p:nvSpPr>
-        <p:spPr/>
+        <p:spPr>
+          <a:xfrm>
+            <a:off x="1011835" y="1245328"/>
+            <a:ext cx="7886700" cy="4931635"/>
+          </a:xfrm>
+        </p:spPr>
         <p:txBody>
           <a:bodyPr/>
           <a:lstStyle/>
           <a:p>
             <a:r>
               <a:rPr lang="de-DE" dirty="0"/>
-              <a:t>Diff</a:t>
-            </a:r>
+              <a:t>Kommando: </a:t>
+            </a:r>
+            <a:r>
+              <a:rPr lang="de-DE" dirty="0" err="1"/>
+              <a:t>git</a:t>
+            </a:r>
+            <a:r>
+              <a:rPr lang="de-DE" dirty="0"/>
+              <a:t> </a:t>
+            </a:r>
+            <a:r>
+              <a:rPr lang="de-DE" dirty="0" err="1"/>
+              <a:t>diff</a:t>
+            </a:r>
+            <a:endParaRPr lang="de-DE" dirty="0"/>
           </a:p>
           <a:p>
             <a:pPr lvl="1"/>
@@ -11474,80 +11655,94 @@
           <a:p>
             <a:pPr lvl="1"/>
             <a:r>
+              <a:rPr lang="de-DE" b="1" i="1" dirty="0"/>
+              <a:t>--</a:t>
+            </a:r>
+            <a:r>
+              <a:rPr lang="de-DE" b="1" i="1" dirty="0" err="1"/>
+              <a:t>staged</a:t>
+            </a:r>
+            <a:r>
+              <a:rPr lang="de-DE" b="1" i="1" dirty="0"/>
+              <a:t> </a:t>
+            </a:r>
+            <a:r>
+              <a:rPr lang="de-DE" dirty="0"/>
+              <a:t>ermöglicht das einsehen von Änderungen im Index Bereich</a:t>
+            </a:r>
+          </a:p>
+          <a:p>
+            <a:pPr lvl="1"/>
+            <a:r>
+              <a:rPr lang="de-DE" b="1" i="1" dirty="0"/>
+              <a:t>--</a:t>
+            </a:r>
+            <a:r>
+              <a:rPr lang="de-DE" b="1" i="1" dirty="0" err="1"/>
+              <a:t>binary</a:t>
+            </a:r>
+            <a:r>
+              <a:rPr lang="de-DE" b="1" i="1" dirty="0"/>
+              <a:t> </a:t>
+            </a:r>
+            <a:r>
+              <a:rPr lang="de-DE" dirty="0"/>
+              <a:t>bezieht binäre Dateien ein</a:t>
+            </a:r>
+            <a:endParaRPr lang="de-DE" b="1" dirty="0"/>
+          </a:p>
+          <a:p>
+            <a:r>
+              <a:rPr lang="de-DE" dirty="0"/>
+              <a:t>Patches (Änderungsdateien)</a:t>
+            </a:r>
+          </a:p>
+          <a:p>
+            <a:pPr lvl="1"/>
+            <a:r>
+              <a:rPr lang="de-DE" dirty="0"/>
+              <a:t>Ermöglicht schnell große Änderungen zu übertragen und zu integrieren</a:t>
+            </a:r>
+          </a:p>
+          <a:p>
+            <a:pPr lvl="1"/>
+            <a:r>
               <a:rPr lang="de-DE" dirty="0"/>
               <a:t>Kommando: </a:t>
             </a:r>
+            <a:br>
+              <a:rPr lang="de-DE" dirty="0"/>
+            </a:br>
             <a:r>
               <a:rPr lang="de-DE" b="1" i="1" dirty="0" err="1"/>
               <a:t>git</a:t>
             </a:r>
             <a:r>
               <a:rPr lang="de-DE" b="1" i="1" dirty="0"/>
-              <a:t> </a:t>
+              <a:t> format-patch -&lt;Anzahl </a:t>
             </a:r>
             <a:r>
               <a:rPr lang="de-DE" b="1" i="1" dirty="0" err="1"/>
-              <a:t>diff</a:t>
-            </a:r>
-            <a:endParaRPr lang="de-DE" b="1" i="1" dirty="0"/>
+              <a:t>Commits</a:t>
+            </a:r>
+            <a:r>
+              <a:rPr lang="de-DE" b="1" i="1" dirty="0"/>
+              <a:t>&gt; &lt;Prüfsumme </a:t>
+            </a:r>
+            <a:r>
+              <a:rPr lang="de-DE" b="1" i="1" dirty="0" err="1"/>
+              <a:t>Startcommit</a:t>
+            </a:r>
+            <a:r>
+              <a:rPr lang="de-DE" b="1" i="1" dirty="0"/>
+              <a:t>&gt;</a:t>
+            </a:r>
           </a:p>
           <a:p>
             <a:pPr lvl="1"/>
             <a:r>
-              <a:rPr lang="de-DE" b="1" i="1" dirty="0"/>
-              <a:t>--</a:t>
-            </a:r>
-            <a:r>
-              <a:rPr lang="de-DE" b="1" i="1" dirty="0" err="1"/>
-              <a:t>staged</a:t>
-            </a:r>
-            <a:r>
-              <a:rPr lang="de-DE" b="1" i="1" dirty="0"/>
-              <a:t> </a:t>
-            </a:r>
-            <a:r>
-              <a:rPr lang="de-DE" dirty="0"/>
-              <a:t>ermöglicht das einsehen von Änderungen im Index Bereich</a:t>
-            </a:r>
-          </a:p>
-          <a:p>
-            <a:pPr lvl="1"/>
-            <a:r>
-              <a:rPr lang="de-DE" b="1" i="1" dirty="0"/>
-              <a:t>--</a:t>
-            </a:r>
-            <a:r>
-              <a:rPr lang="de-DE" b="1" i="1" dirty="0" err="1"/>
-              <a:t>binary</a:t>
-            </a:r>
-            <a:r>
-              <a:rPr lang="de-DE" b="1" i="1" dirty="0"/>
-              <a:t> </a:t>
-            </a:r>
-            <a:r>
-              <a:rPr lang="de-DE" dirty="0"/>
-              <a:t>einbezieht binäre Dateien</a:t>
-            </a:r>
-            <a:endParaRPr lang="de-DE" b="1" dirty="0"/>
-          </a:p>
-          <a:p>
-            <a:r>
-              <a:rPr lang="de-DE" dirty="0"/>
-              <a:t>Patch</a:t>
-            </a:r>
-          </a:p>
-          <a:p>
-            <a:pPr lvl="1"/>
-            <a:r>
-              <a:rPr lang="de-DE" dirty="0"/>
-              <a:t>Ermöglicht schnell große Änderungen von Host-Anbietern zu übertragen und zu integrieren</a:t>
-            </a:r>
-          </a:p>
-          <a:p>
-            <a:pPr lvl="1"/>
-            <a:r>
-              <a:rPr lang="de-DE" dirty="0"/>
-              <a:t>Kommando: </a:t>
+              <a:rPr lang="de-DE" dirty="0"/>
+              <a:t>Erstellt Änderungsdatei wird mit </a:t>
             </a:r>
             <a:r>
               <a:rPr lang="de-DE" b="1" i="1" dirty="0" err="1"/>
@@ -11555,8 +11750,50 @@
             </a:r>
             <a:r>
               <a:rPr lang="de-DE" b="1" i="1" dirty="0"/>
-              <a:t> format-patch &lt;Zweig&gt; -1 &lt;Prüfsumme&gt;</a:t>
-            </a:r>
+              <a:t> am &lt; &lt;Datei&gt; </a:t>
+            </a:r>
+            <a:r>
+              <a:rPr lang="de-DE" dirty="0"/>
+              <a:t>angewendet </a:t>
+            </a:r>
+          </a:p>
+          <a:p>
+            <a:pPr lvl="1"/>
+            <a:r>
+              <a:rPr lang="de-DE" dirty="0"/>
+              <a:t>Datei für abweichende </a:t>
+            </a:r>
+            <a:r>
+              <a:rPr lang="de-DE" dirty="0" err="1"/>
+              <a:t>Commits</a:t>
+            </a:r>
+            <a:r>
+              <a:rPr lang="de-DE" dirty="0"/>
+              <a:t> zweier Zweige: </a:t>
+            </a:r>
+            <a:br>
+              <a:rPr lang="de-DE" dirty="0"/>
+            </a:br>
+            <a:r>
+              <a:rPr lang="de-DE" b="1" i="1" dirty="0" err="1"/>
+              <a:t>git</a:t>
+            </a:r>
+            <a:r>
+              <a:rPr lang="de-DE" b="1" i="1" dirty="0"/>
+              <a:t> format-patch &lt;</a:t>
+            </a:r>
+            <a:r>
+              <a:rPr lang="de-DE" b="1" i="1" dirty="0" err="1"/>
+              <a:t>ZielZweig</a:t>
+            </a:r>
+            <a:r>
+              <a:rPr lang="de-DE" b="1" i="1" dirty="0"/>
+              <a:t>&gt;</a:t>
+            </a:r>
+            <a:br>
+              <a:rPr lang="de-DE" b="1" i="1" dirty="0"/>
+            </a:br>
+            <a:endParaRPr lang="de-DE" dirty="0"/>
           </a:p>
         </p:txBody>
       </p:sp>
@@ -12047,7 +12284,7 @@
           <a:p>
             <a:fld id="{6F7941D6-DDCD-4FEB-B76A-6EA7C7E1DF91}" type="datetime1">
               <a:rPr lang="de-DE" smtClean="0"/>
-              <a:t>20.03.2020</a:t>
+              <a:t>21.03.2020</a:t>
             </a:fld>
             <a:endParaRPr lang="de-DE" dirty="0"/>
           </a:p>
@@ -12602,8 +12839,8 @@
         </p:blipFill>
         <p:spPr>
           <a:xfrm>
-            <a:off x="2355912" y="3920870"/>
-            <a:ext cx="4432176" cy="659519"/>
+            <a:off x="1904898" y="3895703"/>
+            <a:ext cx="5334204" cy="793743"/>
           </a:xfrm>
           <a:prstGeom prst="rect">
             <a:avLst/>
@@ -12663,7 +12900,7 @@
           <a:p>
             <a:r>
               <a:rPr lang="de-DE" dirty="0"/>
-              <a:t>Setzt den lokalen Stand zurück</a:t>
+              <a:t>Setzt das lokale Arbeitsverzeichnis zurück</a:t>
             </a:r>
           </a:p>
           <a:p>
@@ -12685,7 +12922,7 @@
             </a:r>
             <a:r>
               <a:rPr lang="de-DE" dirty="0"/>
-              <a:t> verworfen werden auf die sich sonst Andere beziehen könnten</a:t>
+              <a:t> verworfen werden auf die sich Andere beziehen könnten</a:t>
             </a:r>
           </a:p>
           <a:p>
@@ -12781,6 +13018,36 @@
           </a:p>
         </p:txBody>
       </p:sp>
+      <p:pic>
+        <p:nvPicPr>
+          <p:cNvPr id="2" name="Grafik 1">
+            <a:extLst>
+              <a:ext uri="{FF2B5EF4-FFF2-40B4-BE49-F238E27FC236}">
+                <a16:creationId xmlns:a16="http://schemas.microsoft.com/office/drawing/2014/main" id="{AA917CA4-9600-40FC-9932-E732D5231194}"/>
+              </a:ext>
+            </a:extLst>
+          </p:cNvPr>
+          <p:cNvPicPr>
+            <a:picLocks noChangeAspect="1"/>
+          </p:cNvPicPr>
+          <p:nvPr/>
+        </p:nvPicPr>
+        <p:blipFill>
+          <a:blip r:embed="rId2"/>
+          <a:stretch>
+            <a:fillRect/>
+          </a:stretch>
+        </p:blipFill>
+        <p:spPr>
+          <a:xfrm>
+            <a:off x="2042667" y="5126825"/>
+            <a:ext cx="5058666" cy="720301"/>
+          </a:xfrm>
+          <a:prstGeom prst="rect">
+            <a:avLst/>
+          </a:prstGeom>
+        </p:spPr>
+      </p:pic>
     </p:spTree>
     <p:extLst>
       <p:ext uri="{BB962C8B-B14F-4D97-AF65-F5344CB8AC3E}">
@@ -12813,10 +13080,10 @@
       </p:grpSpPr>
       <p:sp>
         <p:nvSpPr>
-          <p:cNvPr id="5" name="Inhaltsplatzhalter 4">
-            <a:extLst>
-              <a:ext uri="{FF2B5EF4-FFF2-40B4-BE49-F238E27FC236}">
-                <a16:creationId xmlns:a16="http://schemas.microsoft.com/office/drawing/2014/main" id="{16798678-B877-4133-914B-E07392A40335}"/>
+          <p:cNvPr id="2" name="Titel 1">
+            <a:extLst>
+              <a:ext uri="{FF2B5EF4-FFF2-40B4-BE49-F238E27FC236}">
+                <a16:creationId xmlns:a16="http://schemas.microsoft.com/office/drawing/2014/main" id="{55DCA8B4-8412-4C61-8E1B-A6CDF1580F20}"/>
               </a:ext>
             </a:extLst>
           </p:cNvPr>
@@ -12824,7 +13091,7 @@
             <a:spLocks noGrp="1"/>
           </p:cNvSpPr>
           <p:nvPr>
-            <p:ph idx="13"/>
+            <p:ph type="title"/>
           </p:nvPr>
         </p:nvSpPr>
         <p:spPr/>
@@ -12832,52 +13099,9 @@
           <a:bodyPr/>
           <a:lstStyle/>
           <a:p>
-            <a:endParaRPr lang="de-DE"/>
-          </a:p>
-        </p:txBody>
-      </p:sp>
-      <p:sp>
-        <p:nvSpPr>
-          <p:cNvPr id="3" name="Titel 2">
-            <a:extLst>
-              <a:ext uri="{FF2B5EF4-FFF2-40B4-BE49-F238E27FC236}">
-                <a16:creationId xmlns:a16="http://schemas.microsoft.com/office/drawing/2014/main" id="{AEF45C4A-B7FA-4978-A8CD-BE8F7E8F49D9}"/>
-              </a:ext>
-            </a:extLst>
-          </p:cNvPr>
-          <p:cNvSpPr>
-            <a:spLocks noGrp="1"/>
-          </p:cNvSpPr>
-          <p:nvPr>
-            <p:ph type="title" idx="4294967295"/>
-          </p:nvPr>
-        </p:nvSpPr>
-        <p:spPr>
-          <a:xfrm>
-            <a:off x="628650" y="365126"/>
-            <a:ext cx="7886700" cy="698903"/>
-          </a:xfrm>
-          <a:prstGeom prst="rect">
-            <a:avLst/>
-          </a:prstGeom>
-        </p:spPr>
-        <p:txBody>
-          <a:bodyPr>
-            <a:normAutofit/>
-          </a:bodyPr>
-          <a:lstStyle/>
-          <a:p>
-            <a:r>
-              <a:rPr lang="de-DE" dirty="0"/>
-              <a:t>(</a:t>
-            </a:r>
-            <a:r>
-              <a:rPr lang="de-DE" dirty="0" err="1"/>
-              <a:t>reflog</a:t>
-            </a:r>
-            <a:r>
-              <a:rPr lang="de-DE" dirty="0"/>
-              <a:t>)</a:t>
+            <a:r>
+              <a:rPr lang="de-DE" dirty="0"/>
+              <a:t>Workflow</a:t>
             </a:r>
           </a:p>
         </p:txBody>
@@ -12885,7 +13109,7 @@
     </p:spTree>
     <p:extLst>
       <p:ext uri="{BB962C8B-B14F-4D97-AF65-F5344CB8AC3E}">
-        <p14:creationId xmlns:p14="http://schemas.microsoft.com/office/powerpoint/2010/main" val="1856339443"/>
+        <p14:creationId xmlns:p14="http://schemas.microsoft.com/office/powerpoint/2010/main" val="1007972795"/>
       </p:ext>
     </p:extLst>
   </p:cSld>
@@ -12914,10 +13138,10 @@
       </p:grpSpPr>
       <p:sp>
         <p:nvSpPr>
-          <p:cNvPr id="2" name="Titel 1">
-            <a:extLst>
-              <a:ext uri="{FF2B5EF4-FFF2-40B4-BE49-F238E27FC236}">
-                <a16:creationId xmlns:a16="http://schemas.microsoft.com/office/drawing/2014/main" id="{55DCA8B4-8412-4C61-8E1B-A6CDF1580F20}"/>
+          <p:cNvPr id="5" name="Inhaltsplatzhalter 4">
+            <a:extLst>
+              <a:ext uri="{FF2B5EF4-FFF2-40B4-BE49-F238E27FC236}">
+                <a16:creationId xmlns:a16="http://schemas.microsoft.com/office/drawing/2014/main" id="{023C353D-27D2-4156-878C-265100BA9848}"/>
               </a:ext>
             </a:extLst>
           </p:cNvPr>
@@ -12925,17 +13149,180 @@
             <a:spLocks noGrp="1"/>
           </p:cNvSpPr>
           <p:nvPr>
-            <p:ph type="title"/>
+            <p:ph idx="13"/>
           </p:nvPr>
         </p:nvSpPr>
-        <p:spPr/>
+        <p:spPr>
+          <a:xfrm>
+            <a:off x="1011836" y="1245328"/>
+            <a:ext cx="7169010" cy="4931635"/>
+          </a:xfrm>
+        </p:spPr>
         <p:txBody>
           <a:bodyPr/>
           <a:lstStyle/>
           <a:p>
             <a:r>
               <a:rPr lang="de-DE" dirty="0"/>
-              <a:t>Workflow</a:t>
+              <a:t>Bietet Richtlinie für ein gut durchdachtes und schlank strukturiertes Projektarchiv</a:t>
+            </a:r>
+          </a:p>
+          <a:p>
+            <a:r>
+              <a:rPr lang="de-DE" dirty="0"/>
+              <a:t>Projekt besitzt 5 Arten von Zweigen:</a:t>
+            </a:r>
+          </a:p>
+          <a:p>
+            <a:pPr lvl="1"/>
+            <a:r>
+              <a:rPr lang="de-DE" dirty="0"/>
+              <a:t>Hauptzweig </a:t>
+            </a:r>
+            <a:r>
+              <a:rPr lang="de-DE" i="1" dirty="0" err="1"/>
+              <a:t>master</a:t>
+            </a:r>
+            <a:r>
+              <a:rPr lang="de-DE" dirty="0"/>
+              <a:t>: </a:t>
+            </a:r>
+            <a:br>
+              <a:rPr lang="de-DE" dirty="0"/>
+            </a:br>
+            <a:r>
+              <a:rPr lang="de-DE" dirty="0"/>
+              <a:t>wird für fertige Veröffentlichungen verwendet und ist einmalig</a:t>
+            </a:r>
+          </a:p>
+          <a:p>
+            <a:pPr lvl="1"/>
+            <a:r>
+              <a:rPr lang="de-DE" dirty="0"/>
+              <a:t>Entwicklungszweig </a:t>
+            </a:r>
+            <a:r>
+              <a:rPr lang="de-DE" i="1" dirty="0" err="1"/>
+              <a:t>development</a:t>
+            </a:r>
+            <a:r>
+              <a:rPr lang="de-DE" dirty="0"/>
+              <a:t>: </a:t>
+            </a:r>
+            <a:br>
+              <a:rPr lang="de-DE" dirty="0"/>
+            </a:br>
+            <a:r>
+              <a:rPr lang="de-DE" dirty="0"/>
+              <a:t>führt Änderungen und Neuerungen zusammen und ist einmalig</a:t>
+            </a:r>
+          </a:p>
+          <a:p>
+            <a:pPr lvl="1"/>
+            <a:r>
+              <a:rPr lang="de-DE" dirty="0"/>
+              <a:t>Veröffentlichungszweig</a:t>
+            </a:r>
+            <a:r>
+              <a:rPr lang="de-DE" i="1" dirty="0"/>
+              <a:t> release</a:t>
+            </a:r>
+            <a:r>
+              <a:rPr lang="de-DE" dirty="0"/>
+              <a:t>: </a:t>
+            </a:r>
+            <a:br>
+              <a:rPr lang="de-DE" dirty="0"/>
+            </a:br>
+            <a:r>
+              <a:rPr lang="de-DE" dirty="0"/>
+              <a:t>beinhaltet Änderungen aus dem Entwicklungszweig, welche in die nächste Version einfließen</a:t>
+            </a:r>
+          </a:p>
+          <a:p>
+            <a:pPr lvl="1"/>
+            <a:r>
+              <a:rPr lang="de-DE" dirty="0"/>
+              <a:t>Funktionszweig </a:t>
+            </a:r>
+            <a:r>
+              <a:rPr lang="de-DE" i="1" dirty="0"/>
+              <a:t>feature</a:t>
+            </a:r>
+            <a:r>
+              <a:rPr lang="de-DE" dirty="0"/>
+              <a:t>: </a:t>
+            </a:r>
+            <a:br>
+              <a:rPr lang="de-DE" dirty="0"/>
+            </a:br>
+            <a:r>
+              <a:rPr lang="de-DE" dirty="0"/>
+              <a:t>basierend auf dem Entwicklungszweig, beinhalten diese Zweige Änderungen die anhand Personen, Themen und Funktionen separiert werden </a:t>
+            </a:r>
+          </a:p>
+          <a:p>
+            <a:pPr lvl="1"/>
+            <a:r>
+              <a:rPr lang="de-DE" dirty="0"/>
+              <a:t>Korrekturzweig </a:t>
+            </a:r>
+            <a:r>
+              <a:rPr lang="de-DE" i="1" dirty="0" err="1"/>
+              <a:t>bugfix</a:t>
+            </a:r>
+            <a:r>
+              <a:rPr lang="de-DE" dirty="0"/>
+              <a:t>: </a:t>
+            </a:r>
+            <a:br>
+              <a:rPr lang="de-DE" dirty="0"/>
+            </a:br>
+            <a:r>
+              <a:rPr lang="de-DE" dirty="0"/>
+              <a:t>ermöglicht kleine Änderungen direkt an der Veröffentlichung</a:t>
+            </a:r>
+          </a:p>
+        </p:txBody>
+      </p:sp>
+      <p:sp>
+        <p:nvSpPr>
+          <p:cNvPr id="3" name="Titel 2">
+            <a:extLst>
+              <a:ext uri="{FF2B5EF4-FFF2-40B4-BE49-F238E27FC236}">
+                <a16:creationId xmlns:a16="http://schemas.microsoft.com/office/drawing/2014/main" id="{625B6011-E5CD-40F8-BED3-233D5BEBC703}"/>
+              </a:ext>
+            </a:extLst>
+          </p:cNvPr>
+          <p:cNvSpPr>
+            <a:spLocks noGrp="1"/>
+          </p:cNvSpPr>
+          <p:nvPr>
+            <p:ph type="title" idx="4294967295"/>
+          </p:nvPr>
+        </p:nvSpPr>
+        <p:spPr>
+          <a:xfrm>
+            <a:off x="628650" y="365126"/>
+            <a:ext cx="7886700" cy="698903"/>
+          </a:xfrm>
+          <a:prstGeom prst="rect">
+            <a:avLst/>
+          </a:prstGeom>
+        </p:spPr>
+        <p:txBody>
+          <a:bodyPr>
+            <a:normAutofit/>
+          </a:bodyPr>
+          <a:lstStyle/>
+          <a:p>
+            <a:r>
+              <a:rPr lang="de-DE" dirty="0" err="1"/>
+              <a:t>Git</a:t>
+            </a:r>
+            <a:r>
+              <a:rPr lang="de-DE" dirty="0"/>
+              <a:t>-Flow</a:t>
             </a:r>
           </a:p>
         </p:txBody>
@@ -12943,7 +13330,7 @@
     </p:spTree>
     <p:extLst>
       <p:ext uri="{BB962C8B-B14F-4D97-AF65-F5344CB8AC3E}">
-        <p14:creationId xmlns:p14="http://schemas.microsoft.com/office/powerpoint/2010/main" val="1007972795"/>
+        <p14:creationId xmlns:p14="http://schemas.microsoft.com/office/powerpoint/2010/main" val="149155477"/>
       </p:ext>
     </p:extLst>
   </p:cSld>
@@ -12970,118 +13357,47 @@
           <a:chExt cx="0" cy="0"/>
         </a:xfrm>
       </p:grpSpPr>
-      <p:sp>
-        <p:nvSpPr>
+      <p:pic>
+        <p:nvPicPr>
           <p:cNvPr id="5" name="Inhaltsplatzhalter 4">
             <a:extLst>
               <a:ext uri="{FF2B5EF4-FFF2-40B4-BE49-F238E27FC236}">
-                <a16:creationId xmlns:a16="http://schemas.microsoft.com/office/drawing/2014/main" id="{023C353D-27D2-4156-878C-265100BA9848}"/>
-              </a:ext>
-            </a:extLst>
-          </p:cNvPr>
-          <p:cNvSpPr>
-            <a:spLocks noGrp="1"/>
-          </p:cNvSpPr>
+                <a16:creationId xmlns:a16="http://schemas.microsoft.com/office/drawing/2014/main" id="{F3FD5A71-F73D-4CF7-9489-B8D5B70CC78C}"/>
+              </a:ext>
+            </a:extLst>
+          </p:cNvPr>
+          <p:cNvPicPr>
+            <a:picLocks noGrp="1" noChangeAspect="1"/>
+          </p:cNvPicPr>
           <p:nvPr>
             <p:ph idx="13"/>
           </p:nvPr>
-        </p:nvSpPr>
+        </p:nvPicPr>
+        <p:blipFill>
+          <a:blip r:embed="rId2">
+            <a:extLst>
+              <a:ext uri="{28A0092B-C50C-407E-A947-70E740481C1C}">
+                <a14:useLocalDpi xmlns:a14="http://schemas.microsoft.com/office/drawing/2010/main" val="0"/>
+              </a:ext>
+            </a:extLst>
+          </a:blip>
+          <a:stretch>
+            <a:fillRect/>
+          </a:stretch>
+        </p:blipFill>
         <p:spPr>
           <a:xfrm>
-            <a:off x="1011836" y="1245328"/>
-            <a:ext cx="7169010" cy="4931635"/>
-          </a:xfrm>
-        </p:spPr>
-        <p:txBody>
-          <a:bodyPr/>
-          <a:lstStyle/>
-          <a:p>
-            <a:r>
-              <a:rPr lang="de-DE" dirty="0"/>
-              <a:t>Bietet Richtlinie für ein gut durchdachtes und schlank strukturiertes Projektarchiv</a:t>
-            </a:r>
-          </a:p>
-          <a:p>
-            <a:r>
-              <a:rPr lang="de-DE" dirty="0"/>
-              <a:t>Projekt besitzt 5 Arten von Zweigen</a:t>
-            </a:r>
-          </a:p>
-          <a:p>
-            <a:pPr lvl="1"/>
-            <a:r>
-              <a:rPr lang="de-DE" dirty="0"/>
-              <a:t>Hauptzweig </a:t>
-            </a:r>
-            <a:r>
-              <a:rPr lang="de-DE" i="1" dirty="0" err="1"/>
-              <a:t>master</a:t>
-            </a:r>
-            <a:r>
-              <a:rPr lang="de-DE" dirty="0"/>
-              <a:t>: wird für fertige Veröffentlichungen verwendet und ist einmalig</a:t>
-            </a:r>
-          </a:p>
-          <a:p>
-            <a:pPr lvl="1"/>
-            <a:r>
-              <a:rPr lang="de-DE" dirty="0"/>
-              <a:t>Entwicklungszweig </a:t>
-            </a:r>
-            <a:r>
-              <a:rPr lang="de-DE" i="1" dirty="0" err="1"/>
-              <a:t>development</a:t>
-            </a:r>
-            <a:r>
-              <a:rPr lang="de-DE" dirty="0"/>
-              <a:t>: führt Änderungen und Neuerungen zusammen und ist einmalig</a:t>
-            </a:r>
-          </a:p>
-          <a:p>
-            <a:pPr lvl="1"/>
-            <a:r>
-              <a:rPr lang="de-DE" i="1" dirty="0"/>
-              <a:t>Release</a:t>
-            </a:r>
-            <a:r>
-              <a:rPr lang="de-DE" dirty="0"/>
-              <a:t>: beinhaltet Änderungen aus dem Entwicklungszweig, welche auf dem Hauptzweig kommen sollen</a:t>
-            </a:r>
-          </a:p>
-          <a:p>
-            <a:pPr lvl="1"/>
-            <a:r>
-              <a:rPr lang="de-DE" i="1" dirty="0"/>
-              <a:t>Feature Branch</a:t>
-            </a:r>
-            <a:r>
-              <a:rPr lang="de-DE" dirty="0"/>
-              <a:t>: basierend auf dem Entwicklungszweig, beinhalten diese Zweige Änderungen die anhand Personen und Themen separiert werden sollen</a:t>
-            </a:r>
-          </a:p>
-          <a:p>
-            <a:pPr lvl="1"/>
-            <a:r>
-              <a:rPr lang="de-DE" dirty="0"/>
-              <a:t>Korrekturzweig </a:t>
-            </a:r>
-            <a:r>
-              <a:rPr lang="de-DE" i="1" dirty="0" err="1"/>
-              <a:t>bugfix</a:t>
-            </a:r>
-            <a:r>
-              <a:rPr lang="de-DE" dirty="0"/>
-              <a:t>: ermöglicht kleine Änderungen direkt an der Veröffentlichung</a:t>
-            </a:r>
-          </a:p>
-        </p:txBody>
-      </p:sp>
+            <a:off x="923720" y="1271857"/>
+            <a:ext cx="7257125" cy="4491380"/>
+          </a:xfrm>
+        </p:spPr>
+      </p:pic>
       <p:sp>
         <p:nvSpPr>
           <p:cNvPr id="3" name="Titel 2">
             <a:extLst>
               <a:ext uri="{FF2B5EF4-FFF2-40B4-BE49-F238E27FC236}">
-                <a16:creationId xmlns:a16="http://schemas.microsoft.com/office/drawing/2014/main" id="{625B6011-E5CD-40F8-BED3-233D5BEBC703}"/>
+                <a16:creationId xmlns:a16="http://schemas.microsoft.com/office/drawing/2014/main" id="{2AF6D1B3-335A-493E-9891-37AE011B202D}"/>
               </a:ext>
             </a:extLst>
           </p:cNvPr>
@@ -13092,97 +13408,26 @@
             <p:ph type="title" idx="4294967295"/>
           </p:nvPr>
         </p:nvSpPr>
-        <p:spPr>
-          <a:xfrm>
-            <a:off x="628650" y="365126"/>
-            <a:ext cx="7886700" cy="698903"/>
-          </a:xfrm>
-          <a:prstGeom prst="rect">
-            <a:avLst/>
-          </a:prstGeom>
-        </p:spPr>
-        <p:txBody>
-          <a:bodyPr>
-            <a:normAutofit/>
-          </a:bodyPr>
+        <p:spPr/>
+        <p:txBody>
+          <a:bodyPr/>
           <a:lstStyle/>
           <a:p>
             <a:r>
-              <a:rPr lang="de-DE" dirty="0"/>
-              <a:t>Git-</a:t>
-            </a:r>
-            <a:r>
               <a:rPr lang="de-DE" dirty="0" err="1"/>
-              <a:t>flow</a:t>
-            </a:r>
-            <a:endParaRPr lang="de-DE" dirty="0"/>
-          </a:p>
-        </p:txBody>
-      </p:sp>
-      <p:pic>
-        <p:nvPicPr>
-          <p:cNvPr id="2" name="Grafik 1">
-            <a:extLst>
-              <a:ext uri="{FF2B5EF4-FFF2-40B4-BE49-F238E27FC236}">
-                <a16:creationId xmlns:a16="http://schemas.microsoft.com/office/drawing/2014/main" id="{0FB6BF15-CBEC-40A7-8B97-BACA56D3C967}"/>
-              </a:ext>
-            </a:extLst>
-          </p:cNvPr>
-          <p:cNvPicPr>
-            <a:picLocks noChangeAspect="1"/>
-          </p:cNvPicPr>
-          <p:nvPr/>
-        </p:nvPicPr>
-        <p:blipFill>
-          <a:blip r:embed="rId2"/>
-          <a:stretch>
-            <a:fillRect/>
-          </a:stretch>
-        </p:blipFill>
-        <p:spPr>
-          <a:xfrm>
-            <a:off x="8180846" y="1245328"/>
-            <a:ext cx="3209443" cy="1167729"/>
-          </a:xfrm>
-          <a:prstGeom prst="rect">
-            <a:avLst/>
-          </a:prstGeom>
-        </p:spPr>
-      </p:pic>
-      <p:pic>
-        <p:nvPicPr>
-          <p:cNvPr id="6" name="Grafik 5">
-            <a:extLst>
-              <a:ext uri="{FF2B5EF4-FFF2-40B4-BE49-F238E27FC236}">
-                <a16:creationId xmlns:a16="http://schemas.microsoft.com/office/drawing/2014/main" id="{C852A811-5EA0-44A3-AA1C-8F171705EF22}"/>
-              </a:ext>
-            </a:extLst>
-          </p:cNvPr>
-          <p:cNvPicPr>
-            <a:picLocks noChangeAspect="1"/>
-          </p:cNvPicPr>
-          <p:nvPr/>
-        </p:nvPicPr>
-        <p:blipFill>
-          <a:blip r:embed="rId3"/>
-          <a:stretch>
-            <a:fillRect/>
-          </a:stretch>
-        </p:blipFill>
-        <p:spPr>
-          <a:xfrm>
-            <a:off x="5303284" y="4884137"/>
-            <a:ext cx="5755123" cy="1457070"/>
-          </a:xfrm>
-          <a:prstGeom prst="rect">
-            <a:avLst/>
-          </a:prstGeom>
-        </p:spPr>
-      </p:pic>
+              <a:t>Git</a:t>
+            </a:r>
+            <a:r>
+              <a:rPr lang="de-DE" dirty="0"/>
+              <a:t>-Flow – Grafische Darstellung</a:t>
+            </a:r>
+          </a:p>
+        </p:txBody>
+      </p:sp>
     </p:spTree>
     <p:extLst>
       <p:ext uri="{BB962C8B-B14F-4D97-AF65-F5344CB8AC3E}">
-        <p14:creationId xmlns:p14="http://schemas.microsoft.com/office/powerpoint/2010/main" val="149155477"/>
+        <p14:creationId xmlns:p14="http://schemas.microsoft.com/office/powerpoint/2010/main" val="2222249360"/>
       </p:ext>
     </p:extLst>
   </p:cSld>
@@ -13409,7 +13654,7 @@
           <p:cNvPr id="2" name="Titel 1">
             <a:extLst>
               <a:ext uri="{FF2B5EF4-FFF2-40B4-BE49-F238E27FC236}">
-                <a16:creationId xmlns:a16="http://schemas.microsoft.com/office/drawing/2014/main" id="{6C8483CF-1B0E-4C5D-98AE-63877A3A3D1A}"/>
+                <a16:creationId xmlns:a16="http://schemas.microsoft.com/office/drawing/2014/main" id="{CFC30C4B-71C7-4535-8A5A-F0F266237AFD}"/>
               </a:ext>
             </a:extLst>
           </p:cNvPr>
@@ -13427,7 +13672,7 @@
           <a:p>
             <a:r>
               <a:rPr lang="de-DE" dirty="0"/>
-              <a:t>(weitere Befehle)</a:t>
+              <a:t>Interne Datenverwaltung</a:t>
             </a:r>
           </a:p>
         </p:txBody>
@@ -13435,7 +13680,7 @@
     </p:spTree>
     <p:extLst>
       <p:ext uri="{BB962C8B-B14F-4D97-AF65-F5344CB8AC3E}">
-        <p14:creationId xmlns:p14="http://schemas.microsoft.com/office/powerpoint/2010/main" val="2812503263"/>
+        <p14:creationId xmlns:p14="http://schemas.microsoft.com/office/powerpoint/2010/main" val="3431436470"/>
       </p:ext>
     </p:extLst>
   </p:cSld>
@@ -13464,10 +13709,10 @@
       </p:grpSpPr>
       <p:sp>
         <p:nvSpPr>
-          <p:cNvPr id="2" name="Titel 1">
-            <a:extLst>
-              <a:ext uri="{FF2B5EF4-FFF2-40B4-BE49-F238E27FC236}">
-                <a16:creationId xmlns:a16="http://schemas.microsoft.com/office/drawing/2014/main" id="{CFC30C4B-71C7-4535-8A5A-F0F266237AFD}"/>
+          <p:cNvPr id="4" name="Inhaltsplatzhalter 3">
+            <a:extLst>
+              <a:ext uri="{FF2B5EF4-FFF2-40B4-BE49-F238E27FC236}">
+                <a16:creationId xmlns:a16="http://schemas.microsoft.com/office/drawing/2014/main" id="{68907F8E-2FC4-4FEA-BE11-BBC2972A10FE}"/>
               </a:ext>
             </a:extLst>
           </p:cNvPr>
@@ -13475,7 +13720,7 @@
             <a:spLocks noGrp="1"/>
           </p:cNvSpPr>
           <p:nvPr>
-            <p:ph type="title"/>
+            <p:ph idx="13"/>
           </p:nvPr>
         </p:nvSpPr>
         <p:spPr/>
@@ -13483,17 +13728,49 @@
           <a:bodyPr/>
           <a:lstStyle/>
           <a:p>
-            <a:r>
-              <a:rPr lang="de-DE" dirty="0"/>
-              <a:t>Interne Datenverwaltung</a:t>
-            </a:r>
+            <a:endParaRPr lang="de-DE"/>
+          </a:p>
+        </p:txBody>
+      </p:sp>
+      <p:sp>
+        <p:nvSpPr>
+          <p:cNvPr id="5" name="Titel 4">
+            <a:extLst>
+              <a:ext uri="{FF2B5EF4-FFF2-40B4-BE49-F238E27FC236}">
+                <a16:creationId xmlns:a16="http://schemas.microsoft.com/office/drawing/2014/main" id="{86E22394-880D-4500-AA8D-A412EFE36D95}"/>
+              </a:ext>
+            </a:extLst>
+          </p:cNvPr>
+          <p:cNvSpPr>
+            <a:spLocks noGrp="1"/>
+          </p:cNvSpPr>
+          <p:nvPr>
+            <p:ph type="title" idx="4294967295"/>
+          </p:nvPr>
+        </p:nvSpPr>
+        <p:spPr>
+          <a:xfrm>
+            <a:off x="628650" y="365126"/>
+            <a:ext cx="7886700" cy="698903"/>
+          </a:xfrm>
+          <a:prstGeom prst="rect">
+            <a:avLst/>
+          </a:prstGeom>
+        </p:spPr>
+        <p:txBody>
+          <a:bodyPr>
+            <a:normAutofit/>
+          </a:bodyPr>
+          <a:lstStyle/>
+          <a:p>
+            <a:endParaRPr lang="de-DE"/>
           </a:p>
         </p:txBody>
       </p:sp>
     </p:spTree>
     <p:extLst>
       <p:ext uri="{BB962C8B-B14F-4D97-AF65-F5344CB8AC3E}">
-        <p14:creationId xmlns:p14="http://schemas.microsoft.com/office/powerpoint/2010/main" val="3431436470"/>
+        <p14:creationId xmlns:p14="http://schemas.microsoft.com/office/powerpoint/2010/main" val="2659165292"/>
       </p:ext>
     </p:extLst>
   </p:cSld>
@@ -13676,96 +13953,6 @@
     <p:extLst>
       <p:ext uri="{BB962C8B-B14F-4D97-AF65-F5344CB8AC3E}">
         <p14:creationId xmlns:p14="http://schemas.microsoft.com/office/powerpoint/2010/main" val="1683181932"/>
-      </p:ext>
-    </p:extLst>
-  </p:cSld>
-  <p:clrMapOvr>
-    <a:masterClrMapping/>
-  </p:clrMapOvr>
-</p:sld>
-</file>
-
-<file path=ppt/slides/slide40.xml><?xml version="1.0" encoding="utf-8"?>
-<p:sld xmlns:a="http://schemas.openxmlformats.org/drawingml/2006/main" xmlns:r="http://schemas.openxmlformats.org/officeDocument/2006/relationships" xmlns:p="http://schemas.openxmlformats.org/presentationml/2006/main">
-  <p:cSld>
-    <p:spTree>
-      <p:nvGrpSpPr>
-        <p:cNvPr id="1" name=""/>
-        <p:cNvGrpSpPr/>
-        <p:nvPr/>
-      </p:nvGrpSpPr>
-      <p:grpSpPr>
-        <a:xfrm>
-          <a:off x="0" y="0"/>
-          <a:ext cx="0" cy="0"/>
-          <a:chOff x="0" y="0"/>
-          <a:chExt cx="0" cy="0"/>
-        </a:xfrm>
-      </p:grpSpPr>
-      <p:sp>
-        <p:nvSpPr>
-          <p:cNvPr id="4" name="Inhaltsplatzhalter 3">
-            <a:extLst>
-              <a:ext uri="{FF2B5EF4-FFF2-40B4-BE49-F238E27FC236}">
-                <a16:creationId xmlns:a16="http://schemas.microsoft.com/office/drawing/2014/main" id="{68907F8E-2FC4-4FEA-BE11-BBC2972A10FE}"/>
-              </a:ext>
-            </a:extLst>
-          </p:cNvPr>
-          <p:cNvSpPr>
-            <a:spLocks noGrp="1"/>
-          </p:cNvSpPr>
-          <p:nvPr>
-            <p:ph idx="13"/>
-          </p:nvPr>
-        </p:nvSpPr>
-        <p:spPr/>
-        <p:txBody>
-          <a:bodyPr/>
-          <a:lstStyle/>
-          <a:p>
-            <a:endParaRPr lang="de-DE"/>
-          </a:p>
-        </p:txBody>
-      </p:sp>
-      <p:sp>
-        <p:nvSpPr>
-          <p:cNvPr id="5" name="Titel 4">
-            <a:extLst>
-              <a:ext uri="{FF2B5EF4-FFF2-40B4-BE49-F238E27FC236}">
-                <a16:creationId xmlns:a16="http://schemas.microsoft.com/office/drawing/2014/main" id="{86E22394-880D-4500-AA8D-A412EFE36D95}"/>
-              </a:ext>
-            </a:extLst>
-          </p:cNvPr>
-          <p:cNvSpPr>
-            <a:spLocks noGrp="1"/>
-          </p:cNvSpPr>
-          <p:nvPr>
-            <p:ph type="title" idx="4294967295"/>
-          </p:nvPr>
-        </p:nvSpPr>
-        <p:spPr>
-          <a:xfrm>
-            <a:off x="628650" y="365126"/>
-            <a:ext cx="7886700" cy="698903"/>
-          </a:xfrm>
-          <a:prstGeom prst="rect">
-            <a:avLst/>
-          </a:prstGeom>
-        </p:spPr>
-        <p:txBody>
-          <a:bodyPr>
-            <a:normAutofit/>
-          </a:bodyPr>
-          <a:lstStyle/>
-          <a:p>
-            <a:endParaRPr lang="de-DE"/>
-          </a:p>
-        </p:txBody>
-      </p:sp>
-    </p:spTree>
-    <p:extLst>
-      <p:ext uri="{BB962C8B-B14F-4D97-AF65-F5344CB8AC3E}">
-        <p14:creationId xmlns:p14="http://schemas.microsoft.com/office/powerpoint/2010/main" val="2659165292"/>
       </p:ext>
     </p:extLst>
   </p:cSld>

</xml_diff>